<commit_message>
Updated pizzabot, decom pics, and powerpoint
pizzabot:
increased list of names
added name randomizer
added print code

decom pics:
added two more screenshots

powerpoint:
added screenshots into powerpoint
</commit_message>
<xml_diff>
--- a/022_91893+_+91897+Documentation.pptx
+++ b/022_91893+_+91897+Documentation.pptx
@@ -266,12 +266,20 @@
 </p:presentation>
 </file>
 
+<file path=ppt/revisionInfo.xml><?xml version="1.0" encoding="utf-8"?>
+<p1510:revInfo xmlns:a="http://schemas.openxmlformats.org/drawingml/2006/main" xmlns:r="http://schemas.openxmlformats.org/officeDocument/2006/relationships" xmlns:p1510="http://schemas.microsoft.com/office/powerpoint/2015/10/main">
+  <p1510:revLst>
+    <p1510:client id="{21F4134A-65B8-48FA-BC64-94661A83E768}" v="6" dt="2023-05-04T00:19:43.795"/>
+  </p1510:revLst>
+</p1510:revInfo>
+</file>
+
 <file path=ppt/changesInfos/changesInfo1.xml><?xml version="1.0" encoding="utf-8"?>
 <pc:chgInfo xmlns:a="http://schemas.openxmlformats.org/drawingml/2006/main" xmlns:r="http://schemas.openxmlformats.org/officeDocument/2006/relationships" xmlns:ac="http://schemas.microsoft.com/office/drawing/2013/main/command" xmlns:pc="http://schemas.microsoft.com/office/powerpoint/2013/main/command">
   <pc:docChgLst>
     <pc:chgData name="Bronson Wharepapa" userId="fc604165-d948-4f79-adb1-ca2376f8e399" providerId="ADAL" clId="{21F4134A-65B8-48FA-BC64-94661A83E768}"/>
-    <pc:docChg chg="modSld">
-      <pc:chgData name="Bronson Wharepapa" userId="fc604165-d948-4f79-adb1-ca2376f8e399" providerId="ADAL" clId="{21F4134A-65B8-48FA-BC64-94661A83E768}" dt="2023-05-03T02:49:24.868" v="11"/>
+    <pc:docChg chg="custSel modSld">
+      <pc:chgData name="Bronson Wharepapa" userId="fc604165-d948-4f79-adb1-ca2376f8e399" providerId="ADAL" clId="{21F4134A-65B8-48FA-BC64-94661A83E768}" dt="2023-05-04T00:19:47.597" v="20" actId="27614"/>
       <pc:docMkLst>
         <pc:docMk/>
       </pc:docMkLst>
@@ -297,6 +305,52 @@
             <ac:spMk id="55" creationId="{00000000-0000-0000-0000-000000000000}"/>
           </ac:spMkLst>
         </pc:spChg>
+      </pc:sldChg>
+      <pc:sldChg chg="addSp delSp modSp mod">
+        <pc:chgData name="Bronson Wharepapa" userId="fc604165-d948-4f79-adb1-ca2376f8e399" providerId="ADAL" clId="{21F4134A-65B8-48FA-BC64-94661A83E768}" dt="2023-05-04T00:11:23.635" v="18" actId="478"/>
+        <pc:sldMkLst>
+          <pc:docMk/>
+          <pc:sldMk cId="0" sldId="258"/>
+        </pc:sldMkLst>
+        <pc:spChg chg="add del mod">
+          <ac:chgData name="Bronson Wharepapa" userId="fc604165-d948-4f79-adb1-ca2376f8e399" providerId="ADAL" clId="{21F4134A-65B8-48FA-BC64-94661A83E768}" dt="2023-05-04T00:11:23.635" v="18" actId="478"/>
+          <ac:spMkLst>
+            <pc:docMk/>
+            <pc:sldMk cId="0" sldId="258"/>
+            <ac:spMk id="3" creationId="{B1072A8F-CEA8-6E25-13E4-55A528D2526F}"/>
+          </ac:spMkLst>
+        </pc:spChg>
+        <pc:spChg chg="del">
+          <ac:chgData name="Bronson Wharepapa" userId="fc604165-d948-4f79-adb1-ca2376f8e399" providerId="ADAL" clId="{21F4134A-65B8-48FA-BC64-94661A83E768}" dt="2023-05-04T00:06:45.954" v="12" actId="478"/>
+          <ac:spMkLst>
+            <pc:docMk/>
+            <pc:sldMk cId="0" sldId="258"/>
+            <ac:spMk id="68" creationId="{00000000-0000-0000-0000-000000000000}"/>
+          </ac:spMkLst>
+        </pc:spChg>
+        <pc:picChg chg="add mod">
+          <ac:chgData name="Bronson Wharepapa" userId="fc604165-d948-4f79-adb1-ca2376f8e399" providerId="ADAL" clId="{21F4134A-65B8-48FA-BC64-94661A83E768}" dt="2023-05-04T00:11:20.867" v="17" actId="1076"/>
+          <ac:picMkLst>
+            <pc:docMk/>
+            <pc:sldMk cId="0" sldId="258"/>
+            <ac:picMk id="5" creationId="{C8E8B351-606C-5F69-7989-34B46A727C8B}"/>
+          </ac:picMkLst>
+        </pc:picChg>
+      </pc:sldChg>
+      <pc:sldChg chg="addSp modSp mod">
+        <pc:chgData name="Bronson Wharepapa" userId="fc604165-d948-4f79-adb1-ca2376f8e399" providerId="ADAL" clId="{21F4134A-65B8-48FA-BC64-94661A83E768}" dt="2023-05-04T00:19:47.597" v="20" actId="27614"/>
+        <pc:sldMkLst>
+          <pc:docMk/>
+          <pc:sldMk cId="0" sldId="259"/>
+        </pc:sldMkLst>
+        <pc:picChg chg="add mod">
+          <ac:chgData name="Bronson Wharepapa" userId="fc604165-d948-4f79-adb1-ca2376f8e399" providerId="ADAL" clId="{21F4134A-65B8-48FA-BC64-94661A83E768}" dt="2023-05-04T00:19:47.597" v="20" actId="27614"/>
+          <ac:picMkLst>
+            <pc:docMk/>
+            <pc:sldMk cId="0" sldId="259"/>
+            <ac:picMk id="3" creationId="{E624514A-6C52-34C9-6D91-CCD9BFF818CC}"/>
+          </ac:picMkLst>
+        </pc:picChg>
       </pc:sldChg>
     </pc:docChg>
   </pc:docChgLst>
@@ -6393,28 +6447,10 @@
               <a:t>Link to github Repository: </a:t>
             </a:r>
             <a:r>
-              <a:rPr lang="en-NZ" sz="2000" dirty="0" err="1">
-                <a:hlinkClick r:id="rId3"/>
-              </a:rPr>
-              <a:t>BronsonLovesCode</a:t>
-            </a:r>
-            <a:r>
               <a:rPr lang="en-NZ" sz="2000" dirty="0">
                 <a:hlinkClick r:id="rId3"/>
               </a:rPr>
-              <a:t>/</a:t>
-            </a:r>
-            <a:r>
-              <a:rPr lang="en-NZ" sz="2000" dirty="0" err="1">
-                <a:hlinkClick r:id="rId3"/>
-              </a:rPr>
-              <a:t>Pizza_Bot</a:t>
-            </a:r>
-            <a:r>
-              <a:rPr lang="en-NZ" sz="2000" dirty="0">
-                <a:hlinkClick r:id="rId3"/>
-              </a:rPr>
-              <a:t>: A bot for ordering pizzas (github.com)</a:t>
+              <a:t>GitHub</a:t>
             </a:r>
             <a:endParaRPr sz="2000" b="1" dirty="0">
               <a:solidFill>
@@ -6476,7 +6512,7 @@
               <a:rPr lang="en-NZ" sz="2000" dirty="0">
                 <a:hlinkClick r:id="rId4"/>
               </a:rPr>
-              <a:t>Pizza Bot Initial Plan | Trello</a:t>
+              <a:t>Trello Board</a:t>
             </a:r>
             <a:endParaRPr sz="2000" dirty="0"/>
           </a:p>
@@ -6794,48 +6830,36 @@
           </a:p>
         </p:txBody>
       </p:sp>
-      <p:sp>
-        <p:nvSpPr>
-          <p:cNvPr id="68" name="Google Shape;68;p15"/>
-          <p:cNvSpPr txBox="1">
-            <a:spLocks noGrp="1"/>
-          </p:cNvSpPr>
-          <p:nvPr>
-            <p:ph type="body" idx="1"/>
-          </p:nvPr>
-        </p:nvSpPr>
+      <p:pic>
+        <p:nvPicPr>
+          <p:cNvPr id="5" name="Picture 4" descr="Graphical user interface, application, PowerPoint&#10;&#10;Description automatically generated">
+            <a:extLst>
+              <a:ext uri="{FF2B5EF4-FFF2-40B4-BE49-F238E27FC236}">
+                <a16:creationId xmlns:a16="http://schemas.microsoft.com/office/drawing/2014/main" id="{C8E8B351-606C-5F69-7989-34B46A727C8B}"/>
+              </a:ext>
+            </a:extLst>
+          </p:cNvPr>
+          <p:cNvPicPr>
+            <a:picLocks noChangeAspect="1"/>
+          </p:cNvPicPr>
+          <p:nvPr/>
+        </p:nvPicPr>
+        <p:blipFill>
+          <a:blip r:embed="rId3"/>
+          <a:stretch>
+            <a:fillRect/>
+          </a:stretch>
+        </p:blipFill>
         <p:spPr>
           <a:xfrm>
-            <a:off x="311700" y="1152475"/>
-            <a:ext cx="8424300" cy="1180800"/>
+            <a:off x="1662721" y="1017725"/>
+            <a:ext cx="5818558" cy="3944785"/>
           </a:xfrm>
           <a:prstGeom prst="rect">
             <a:avLst/>
           </a:prstGeom>
         </p:spPr>
-        <p:txBody>
-          <a:bodyPr spcFirstLastPara="1" wrap="square" lIns="91425" tIns="91425" rIns="91425" bIns="91425" anchor="t" anchorCtr="0">
-            <a:noAutofit/>
-          </a:bodyPr>
-          <a:lstStyle/>
-          <a:p>
-            <a:pPr marL="0" lvl="0" indent="0" algn="l" rtl="0">
-              <a:spcBef>
-                <a:spcPts val="0"/>
-              </a:spcBef>
-              <a:spcAft>
-                <a:spcPts val="1600"/>
-              </a:spcAft>
-              <a:buNone/>
-            </a:pPr>
-            <a:r>
-              <a:rPr lang="en" i="1"/>
-              <a:t>Paste screenshots of your initial Trello board / task decomposition on this slide.  If you have a long list, you might need to break it up into several columns.  Delete this instruction when you are done.</a:t>
-            </a:r>
-            <a:endParaRPr i="1"/>
-          </a:p>
-        </p:txBody>
-      </p:sp>
+      </p:pic>
     </p:spTree>
   </p:cSld>
   <p:clrMapOvr>
@@ -6911,6 +6935,36 @@
           </a:p>
         </p:txBody>
       </p:sp>
+      <p:pic>
+        <p:nvPicPr>
+          <p:cNvPr id="3" name="Picture 2" descr="Graphical user interface, application&#10;&#10;Description automatically generated">
+            <a:extLst>
+              <a:ext uri="{FF2B5EF4-FFF2-40B4-BE49-F238E27FC236}">
+                <a16:creationId xmlns:a16="http://schemas.microsoft.com/office/drawing/2014/main" id="{E624514A-6C52-34C9-6D91-CCD9BFF818CC}"/>
+              </a:ext>
+            </a:extLst>
+          </p:cNvPr>
+          <p:cNvPicPr>
+            <a:picLocks noChangeAspect="1"/>
+          </p:cNvPicPr>
+          <p:nvPr/>
+        </p:nvPicPr>
+        <p:blipFill>
+          <a:blip r:embed="rId3"/>
+          <a:stretch>
+            <a:fillRect/>
+          </a:stretch>
+        </p:blipFill>
+        <p:spPr>
+          <a:xfrm>
+            <a:off x="0" y="1095750"/>
+            <a:ext cx="9144000" cy="2952000"/>
+          </a:xfrm>
+          <a:prstGeom prst="rect">
+            <a:avLst/>
+          </a:prstGeom>
+        </p:spPr>
+      </p:pic>
     </p:spTree>
   </p:cSld>
   <p:clrMapOvr>

</xml_diff>

<commit_message>
Added comments for each section
Comments for each section
</commit_message>
<xml_diff>
--- a/022_91893+_+91897+Documentation.pptx
+++ b/022_91893+_+91897+Documentation.pptx
@@ -271,7 +271,7 @@
 <p1510:revInfo xmlns:a="http://schemas.openxmlformats.org/drawingml/2006/main" xmlns:r="http://schemas.openxmlformats.org/officeDocument/2006/relationships" xmlns:p1510="http://schemas.microsoft.com/office/powerpoint/2015/10/main">
   <p1510:revLst>
     <p1510:client id="{21F4134A-65B8-48FA-BC64-94661A83E768}" v="7" dt="2023-05-07T23:48:36.417"/>
-    <p1510:client id="{81A2BCD6-527D-A88D-67B8-C94274A60B24}" v="92" dt="2023-05-08T00:15:48.992"/>
+    <p1510:client id="{81A2BCD6-527D-A88D-67B8-C94274A60B24}" v="95" dt="2023-05-08T00:15:52.898"/>
   </p1510:revLst>
 </p1510:revInfo>
 </file>
@@ -390,12 +390,12 @@
   <pc:docChgLst>
     <pc:chgData name="Bronson Wharepapa" userId="S::18114@my.sanctamaria.school.nz::fc604165-d948-4f79-adb1-ca2376f8e399" providerId="AD" clId="Web-{81A2BCD6-527D-A88D-67B8-C94274A60B24}"/>
     <pc:docChg chg="addSld modSld">
-      <pc:chgData name="Bronson Wharepapa" userId="S::18114@my.sanctamaria.school.nz::fc604165-d948-4f79-adb1-ca2376f8e399" providerId="AD" clId="Web-{81A2BCD6-527D-A88D-67B8-C94274A60B24}" dt="2023-05-08T00:15:48.992" v="84" actId="14100"/>
+      <pc:chgData name="Bronson Wharepapa" userId="S::18114@my.sanctamaria.school.nz::fc604165-d948-4f79-adb1-ca2376f8e399" providerId="AD" clId="Web-{81A2BCD6-527D-A88D-67B8-C94274A60B24}" dt="2023-05-08T00:15:51.851" v="86" actId="20577"/>
       <pc:docMkLst>
         <pc:docMk/>
       </pc:docMkLst>
       <pc:sldChg chg="addSp modSp">
-        <pc:chgData name="Bronson Wharepapa" userId="S::18114@my.sanctamaria.school.nz::fc604165-d948-4f79-adb1-ca2376f8e399" providerId="AD" clId="Web-{81A2BCD6-527D-A88D-67B8-C94274A60B24}" dt="2023-05-08T00:15:48.992" v="84" actId="14100"/>
+        <pc:chgData name="Bronson Wharepapa" userId="S::18114@my.sanctamaria.school.nz::fc604165-d948-4f79-adb1-ca2376f8e399" providerId="AD" clId="Web-{81A2BCD6-527D-A88D-67B8-C94274A60B24}" dt="2023-05-08T00:15:51.851" v="86" actId="20577"/>
         <pc:sldMkLst>
           <pc:docMk/>
           <pc:sldMk cId="0" sldId="259"/>
@@ -409,7 +409,7 @@
           </ac:spMkLst>
         </pc:spChg>
         <pc:spChg chg="add mod">
-          <ac:chgData name="Bronson Wharepapa" userId="S::18114@my.sanctamaria.school.nz::fc604165-d948-4f79-adb1-ca2376f8e399" providerId="AD" clId="Web-{81A2BCD6-527D-A88D-67B8-C94274A60B24}" dt="2023-05-08T00:15:48.992" v="84" actId="14100"/>
+          <ac:chgData name="Bronson Wharepapa" userId="S::18114@my.sanctamaria.school.nz::fc604165-d948-4f79-adb1-ca2376f8e399" providerId="AD" clId="Web-{81A2BCD6-527D-A88D-67B8-C94274A60B24}" dt="2023-05-08T00:15:51.851" v="86" actId="20577"/>
           <ac:spMkLst>
             <pc:docMk/>
             <pc:sldMk cId="0" sldId="259"/>
@@ -7809,7 +7809,7 @@
             <a:pPr algn="ctr"/>
             <a:r>
               <a:rPr lang="en-US" dirty="0"/>
-              <a:t>Version 1</a:t>
+              <a:t>Version 2</a:t>
             </a:r>
           </a:p>
         </p:txBody>

</xml_diff>

<commit_message>
Created pickup or delivery menu
Created different versions of menu, refining it in version 4.
</commit_message>
<xml_diff>
--- a/022_91893+_+91897+Documentation.pptx
+++ b/022_91893+_+91897+Documentation.pptx
@@ -5,7 +5,7 @@
     <p:sldMasterId id="2147483659" r:id="rId1"/>
   </p:sldMasterIdLst>
   <p:notesMasterIdLst>
-    <p:notesMasterId r:id="rId10"/>
+    <p:notesMasterId r:id="rId16"/>
   </p:notesMasterIdLst>
   <p:sldIdLst>
     <p:sldId id="256" r:id="rId2"/>
@@ -14,8 +14,14 @@
     <p:sldId id="259" r:id="rId5"/>
     <p:sldId id="260" r:id="rId6"/>
     <p:sldId id="263" r:id="rId7"/>
-    <p:sldId id="261" r:id="rId8"/>
-    <p:sldId id="262" r:id="rId9"/>
+    <p:sldId id="265" r:id="rId8"/>
+    <p:sldId id="264" r:id="rId9"/>
+    <p:sldId id="266" r:id="rId10"/>
+    <p:sldId id="267" r:id="rId11"/>
+    <p:sldId id="268" r:id="rId12"/>
+    <p:sldId id="269" r:id="rId13"/>
+    <p:sldId id="261" r:id="rId14"/>
+    <p:sldId id="262" r:id="rId15"/>
   </p:sldIdLst>
   <p:sldSz cx="9144000" cy="5143500" type="screen16x9"/>
   <p:notesSz cx="6858000" cy="9144000"/>
@@ -271,13 +277,158 @@
 <p1510:revInfo xmlns:a="http://schemas.openxmlformats.org/drawingml/2006/main" xmlns:r="http://schemas.openxmlformats.org/officeDocument/2006/relationships" xmlns:p1510="http://schemas.microsoft.com/office/powerpoint/2015/10/main">
   <p1510:revLst>
     <p1510:client id="{21F4134A-65B8-48FA-BC64-94661A83E768}" v="7" dt="2023-05-07T23:48:36.417"/>
+    <p1510:client id="{2554FBCC-49BD-FBDF-D538-CE3319AF18E1}" v="227" dt="2023-05-10T01:20:44.771"/>
     <p1510:client id="{81A2BCD6-527D-A88D-67B8-C94274A60B24}" v="95" dt="2023-05-08T00:15:52.898"/>
+    <p1510:client id="{B82B93A9-7EAF-C4B5-E540-07BEAF1A0FB5}" v="161" dt="2023-05-11T22:43:08.631"/>
   </p1510:revLst>
 </p1510:revInfo>
 </file>
 
 <file path=ppt/changesInfos/changesInfo1.xml><?xml version="1.0" encoding="utf-8"?>
 <pc:chgInfo xmlns:a="http://schemas.openxmlformats.org/drawingml/2006/main" xmlns:r="http://schemas.openxmlformats.org/officeDocument/2006/relationships" xmlns:ac="http://schemas.microsoft.com/office/drawing/2013/main/command" xmlns:pc="http://schemas.microsoft.com/office/powerpoint/2013/main/command">
+  <pc:docChgLst>
+    <pc:chgData name="Bronson Wharepapa" userId="S::18114@my.sanctamaria.school.nz::fc604165-d948-4f79-adb1-ca2376f8e399" providerId="AD" clId="Web-{B82B93A9-7EAF-C4B5-E540-07BEAF1A0FB5}"/>
+    <pc:docChg chg="addSld modSld">
+      <pc:chgData name="Bronson Wharepapa" userId="S::18114@my.sanctamaria.school.nz::fc604165-d948-4f79-adb1-ca2376f8e399" providerId="AD" clId="Web-{B82B93A9-7EAF-C4B5-E540-07BEAF1A0FB5}" dt="2023-05-11T22:43:08.631" v="143" actId="1076"/>
+      <pc:docMkLst>
+        <pc:docMk/>
+      </pc:docMkLst>
+      <pc:sldChg chg="addSp delSp modSp">
+        <pc:chgData name="Bronson Wharepapa" userId="S::18114@my.sanctamaria.school.nz::fc604165-d948-4f79-adb1-ca2376f8e399" providerId="AD" clId="Web-{B82B93A9-7EAF-C4B5-E540-07BEAF1A0FB5}" dt="2023-05-11T22:31:12.394" v="58" actId="1076"/>
+        <pc:sldMkLst>
+          <pc:docMk/>
+          <pc:sldMk cId="2733379314" sldId="268"/>
+        </pc:sldMkLst>
+        <pc:graphicFrameChg chg="mod modGraphic">
+          <ac:chgData name="Bronson Wharepapa" userId="S::18114@my.sanctamaria.school.nz::fc604165-d948-4f79-adb1-ca2376f8e399" providerId="AD" clId="Web-{B82B93A9-7EAF-C4B5-E540-07BEAF1A0FB5}" dt="2023-05-11T22:30:55.534" v="52"/>
+          <ac:graphicFrameMkLst>
+            <pc:docMk/>
+            <pc:sldMk cId="2733379314" sldId="268"/>
+            <ac:graphicFrameMk id="79" creationId="{00000000-0000-0000-0000-000000000000}"/>
+          </ac:graphicFrameMkLst>
+        </pc:graphicFrameChg>
+        <pc:picChg chg="del">
+          <ac:chgData name="Bronson Wharepapa" userId="S::18114@my.sanctamaria.school.nz::fc604165-d948-4f79-adb1-ca2376f8e399" providerId="AD" clId="Web-{B82B93A9-7EAF-C4B5-E540-07BEAF1A0FB5}" dt="2023-05-11T22:29:36.172" v="5"/>
+          <ac:picMkLst>
+            <pc:docMk/>
+            <pc:sldMk cId="2733379314" sldId="268"/>
+            <ac:picMk id="2" creationId="{E111B32D-7F1B-D387-8E59-5C8AFC3AF5C5}"/>
+          </ac:picMkLst>
+        </pc:picChg>
+        <pc:picChg chg="add del mod">
+          <ac:chgData name="Bronson Wharepapa" userId="S::18114@my.sanctamaria.school.nz::fc604165-d948-4f79-adb1-ca2376f8e399" providerId="AD" clId="Web-{B82B93A9-7EAF-C4B5-E540-07BEAF1A0FB5}" dt="2023-05-11T22:06:21.325" v="3"/>
+          <ac:picMkLst>
+            <pc:docMk/>
+            <pc:sldMk cId="2733379314" sldId="268"/>
+            <ac:picMk id="3" creationId="{20A896BB-728A-7BC6-769A-A2DD000BD529}"/>
+          </ac:picMkLst>
+        </pc:picChg>
+        <pc:picChg chg="add mod">
+          <ac:chgData name="Bronson Wharepapa" userId="S::18114@my.sanctamaria.school.nz::fc604165-d948-4f79-adb1-ca2376f8e399" providerId="AD" clId="Web-{B82B93A9-7EAF-C4B5-E540-07BEAF1A0FB5}" dt="2023-05-11T22:31:12.394" v="58" actId="1076"/>
+          <ac:picMkLst>
+            <pc:docMk/>
+            <pc:sldMk cId="2733379314" sldId="268"/>
+            <ac:picMk id="3" creationId="{630A4DD1-33B3-7510-EC5A-DACE2FD914EC}"/>
+          </ac:picMkLst>
+        </pc:picChg>
+        <pc:picChg chg="del">
+          <ac:chgData name="Bronson Wharepapa" userId="S::18114@my.sanctamaria.school.nz::fc604165-d948-4f79-adb1-ca2376f8e399" providerId="AD" clId="Web-{B82B93A9-7EAF-C4B5-E540-07BEAF1A0FB5}" dt="2023-05-11T22:29:36.532" v="6"/>
+          <ac:picMkLst>
+            <pc:docMk/>
+            <pc:sldMk cId="2733379314" sldId="268"/>
+            <ac:picMk id="4" creationId="{8170FDD6-077D-14D1-ADB7-673229001DC5}"/>
+          </ac:picMkLst>
+        </pc:picChg>
+        <pc:picChg chg="add del mod">
+          <ac:chgData name="Bronson Wharepapa" userId="S::18114@my.sanctamaria.school.nz::fc604165-d948-4f79-adb1-ca2376f8e399" providerId="AD" clId="Web-{B82B93A9-7EAF-C4B5-E540-07BEAF1A0FB5}" dt="2023-05-11T22:06:22.044" v="4"/>
+          <ac:picMkLst>
+            <pc:docMk/>
+            <pc:sldMk cId="2733379314" sldId="268"/>
+            <ac:picMk id="5" creationId="{4F1624E8-35CD-81C9-2A81-6436DCCFD480}"/>
+          </ac:picMkLst>
+        </pc:picChg>
+        <pc:picChg chg="add mod">
+          <ac:chgData name="Bronson Wharepapa" userId="S::18114@my.sanctamaria.school.nz::fc604165-d948-4f79-adb1-ca2376f8e399" providerId="AD" clId="Web-{B82B93A9-7EAF-C4B5-E540-07BEAF1A0FB5}" dt="2023-05-11T22:31:06.222" v="54" actId="1076"/>
+          <ac:picMkLst>
+            <pc:docMk/>
+            <pc:sldMk cId="2733379314" sldId="268"/>
+            <ac:picMk id="5" creationId="{95025F67-1D2D-50FD-9EEE-C3F468056DE6}"/>
+          </ac:picMkLst>
+        </pc:picChg>
+      </pc:sldChg>
+      <pc:sldChg chg="addSp delSp modSp add replId">
+        <pc:chgData name="Bronson Wharepapa" userId="S::18114@my.sanctamaria.school.nz::fc604165-d948-4f79-adb1-ca2376f8e399" providerId="AD" clId="Web-{B82B93A9-7EAF-C4B5-E540-07BEAF1A0FB5}" dt="2023-05-11T22:43:08.631" v="143" actId="1076"/>
+        <pc:sldMkLst>
+          <pc:docMk/>
+          <pc:sldMk cId="2208231927" sldId="269"/>
+        </pc:sldMkLst>
+        <pc:spChg chg="mod">
+          <ac:chgData name="Bronson Wharepapa" userId="S::18114@my.sanctamaria.school.nz::fc604165-d948-4f79-adb1-ca2376f8e399" providerId="AD" clId="Web-{B82B93A9-7EAF-C4B5-E540-07BEAF1A0FB5}" dt="2023-05-11T22:37:34.997" v="61" actId="20577"/>
+          <ac:spMkLst>
+            <pc:docMk/>
+            <pc:sldMk cId="2208231927" sldId="269"/>
+            <ac:spMk id="78" creationId="{00000000-0000-0000-0000-000000000000}"/>
+          </ac:spMkLst>
+        </pc:spChg>
+        <pc:graphicFrameChg chg="mod modGraphic">
+          <ac:chgData name="Bronson Wharepapa" userId="S::18114@my.sanctamaria.school.nz::fc604165-d948-4f79-adb1-ca2376f8e399" providerId="AD" clId="Web-{B82B93A9-7EAF-C4B5-E540-07BEAF1A0FB5}" dt="2023-05-11T22:40:00.454" v="126"/>
+          <ac:graphicFrameMkLst>
+            <pc:docMk/>
+            <pc:sldMk cId="2208231927" sldId="269"/>
+            <ac:graphicFrameMk id="79" creationId="{00000000-0000-0000-0000-000000000000}"/>
+          </ac:graphicFrameMkLst>
+        </pc:graphicFrameChg>
+        <pc:picChg chg="add mod">
+          <ac:chgData name="Bronson Wharepapa" userId="S::18114@my.sanctamaria.school.nz::fc604165-d948-4f79-adb1-ca2376f8e399" providerId="AD" clId="Web-{B82B93A9-7EAF-C4B5-E540-07BEAF1A0FB5}" dt="2023-05-11T22:42:21.833" v="135" actId="1076"/>
+          <ac:picMkLst>
+            <pc:docMk/>
+            <pc:sldMk cId="2208231927" sldId="269"/>
+            <ac:picMk id="2" creationId="{84AF239A-D08F-17B1-41A6-F5C4EFBB0DC4}"/>
+          </ac:picMkLst>
+        </pc:picChg>
+        <pc:picChg chg="del">
+          <ac:chgData name="Bronson Wharepapa" userId="S::18114@my.sanctamaria.school.nz::fc604165-d948-4f79-adb1-ca2376f8e399" providerId="AD" clId="Web-{B82B93A9-7EAF-C4B5-E540-07BEAF1A0FB5}" dt="2023-05-11T22:37:35.935" v="62"/>
+          <ac:picMkLst>
+            <pc:docMk/>
+            <pc:sldMk cId="2208231927" sldId="269"/>
+            <ac:picMk id="3" creationId="{630A4DD1-33B3-7510-EC5A-DACE2FD914EC}"/>
+          </ac:picMkLst>
+        </pc:picChg>
+        <pc:picChg chg="add mod">
+          <ac:chgData name="Bronson Wharepapa" userId="S::18114@my.sanctamaria.school.nz::fc604165-d948-4f79-adb1-ca2376f8e399" providerId="AD" clId="Web-{B82B93A9-7EAF-C4B5-E540-07BEAF1A0FB5}" dt="2023-05-11T22:42:25.958" v="136" actId="1076"/>
+          <ac:picMkLst>
+            <pc:docMk/>
+            <pc:sldMk cId="2208231927" sldId="269"/>
+            <ac:picMk id="4" creationId="{08C31B73-1401-DDE5-34CB-6AF67AC68CB1}"/>
+          </ac:picMkLst>
+        </pc:picChg>
+        <pc:picChg chg="del">
+          <ac:chgData name="Bronson Wharepapa" userId="S::18114@my.sanctamaria.school.nz::fc604165-d948-4f79-adb1-ca2376f8e399" providerId="AD" clId="Web-{B82B93A9-7EAF-C4B5-E540-07BEAF1A0FB5}" dt="2023-05-11T22:37:36.388" v="63"/>
+          <ac:picMkLst>
+            <pc:docMk/>
+            <pc:sldMk cId="2208231927" sldId="269"/>
+            <ac:picMk id="5" creationId="{95025F67-1D2D-50FD-9EEE-C3F468056DE6}"/>
+          </ac:picMkLst>
+        </pc:picChg>
+        <pc:picChg chg="add del mod">
+          <ac:chgData name="Bronson Wharepapa" userId="S::18114@my.sanctamaria.school.nz::fc604165-d948-4f79-adb1-ca2376f8e399" providerId="AD" clId="Web-{B82B93A9-7EAF-C4B5-E540-07BEAF1A0FB5}" dt="2023-05-11T22:42:38.505" v="139"/>
+          <ac:picMkLst>
+            <pc:docMk/>
+            <pc:sldMk cId="2208231927" sldId="269"/>
+            <ac:picMk id="6" creationId="{8CEDC507-FBDB-D899-525C-4AE687E3C425}"/>
+          </ac:picMkLst>
+        </pc:picChg>
+        <pc:picChg chg="add mod">
+          <ac:chgData name="Bronson Wharepapa" userId="S::18114@my.sanctamaria.school.nz::fc604165-d948-4f79-adb1-ca2376f8e399" providerId="AD" clId="Web-{B82B93A9-7EAF-C4B5-E540-07BEAF1A0FB5}" dt="2023-05-11T22:43:08.631" v="143" actId="1076"/>
+          <ac:picMkLst>
+            <pc:docMk/>
+            <pc:sldMk cId="2208231927" sldId="269"/>
+            <ac:picMk id="7" creationId="{B4792892-6EFA-2BA5-7627-E67A76F70801}"/>
+          </ac:picMkLst>
+        </pc:picChg>
+      </pc:sldChg>
+    </pc:docChg>
+  </pc:docChgLst>
   <pc:docChgLst>
     <pc:chgData name="Bronson Wharepapa" userId="fc604165-d948-4f79-adb1-ca2376f8e399" providerId="ADAL" clId="{21F4134A-65B8-48FA-BC64-94661A83E768}"/>
     <pc:docChg chg="custSel modSld">
@@ -487,6 +638,232 @@
             <ac:picMk id="5" creationId="{B81B4D5F-955C-BC86-7057-41A8B5F890B1}"/>
           </ac:picMkLst>
         </pc:picChg>
+      </pc:sldChg>
+    </pc:docChg>
+  </pc:docChgLst>
+  <pc:docChgLst>
+    <pc:chgData name="Bronson Wharepapa" userId="S::18114@my.sanctamaria.school.nz::fc604165-d948-4f79-adb1-ca2376f8e399" providerId="AD" clId="Web-{2554FBCC-49BD-FBDF-D538-CE3319AF18E1}"/>
+    <pc:docChg chg="addSld modSld sldOrd">
+      <pc:chgData name="Bronson Wharepapa" userId="S::18114@my.sanctamaria.school.nz::fc604165-d948-4f79-adb1-ca2376f8e399" providerId="AD" clId="Web-{2554FBCC-49BD-FBDF-D538-CE3319AF18E1}" dt="2023-05-10T01:20:44.771" v="205" actId="20577"/>
+      <pc:docMkLst>
+        <pc:docMk/>
+      </pc:docMkLst>
+      <pc:sldChg chg="modSp">
+        <pc:chgData name="Bronson Wharepapa" userId="S::18114@my.sanctamaria.school.nz::fc604165-d948-4f79-adb1-ca2376f8e399" providerId="AD" clId="Web-{2554FBCC-49BD-FBDF-D538-CE3319AF18E1}" dt="2023-05-10T01:01:43.397" v="18"/>
+        <pc:sldMkLst>
+          <pc:docMk/>
+          <pc:sldMk cId="0" sldId="260"/>
+        </pc:sldMkLst>
+        <pc:spChg chg="mod">
+          <ac:chgData name="Bronson Wharepapa" userId="S::18114@my.sanctamaria.school.nz::fc604165-d948-4f79-adb1-ca2376f8e399" providerId="AD" clId="Web-{2554FBCC-49BD-FBDF-D538-CE3319AF18E1}" dt="2023-05-10T01:01:43.397" v="18"/>
+          <ac:spMkLst>
+            <pc:docMk/>
+            <pc:sldMk cId="0" sldId="260"/>
+            <ac:spMk id="78" creationId="{00000000-0000-0000-0000-000000000000}"/>
+          </ac:spMkLst>
+        </pc:spChg>
+      </pc:sldChg>
+      <pc:sldChg chg="modSp">
+        <pc:chgData name="Bronson Wharepapa" userId="S::18114@my.sanctamaria.school.nz::fc604165-d948-4f79-adb1-ca2376f8e399" providerId="AD" clId="Web-{2554FBCC-49BD-FBDF-D538-CE3319AF18E1}" dt="2023-05-10T01:01:16.693" v="13"/>
+        <pc:sldMkLst>
+          <pc:docMk/>
+          <pc:sldMk cId="3543283963" sldId="263"/>
+        </pc:sldMkLst>
+        <pc:spChg chg="mod">
+          <ac:chgData name="Bronson Wharepapa" userId="S::18114@my.sanctamaria.school.nz::fc604165-d948-4f79-adb1-ca2376f8e399" providerId="AD" clId="Web-{2554FBCC-49BD-FBDF-D538-CE3319AF18E1}" dt="2023-05-10T01:01:16.693" v="13"/>
+          <ac:spMkLst>
+            <pc:docMk/>
+            <pc:sldMk cId="3543283963" sldId="263"/>
+            <ac:spMk id="78" creationId="{00000000-0000-0000-0000-000000000000}"/>
+          </ac:spMkLst>
+        </pc:spChg>
+      </pc:sldChg>
+      <pc:sldChg chg="addSp delSp modSp add ord replId">
+        <pc:chgData name="Bronson Wharepapa" userId="S::18114@my.sanctamaria.school.nz::fc604165-d948-4f79-adb1-ca2376f8e399" providerId="AD" clId="Web-{2554FBCC-49BD-FBDF-D538-CE3319AF18E1}" dt="2023-05-10T01:11:56.569" v="146" actId="1076"/>
+        <pc:sldMkLst>
+          <pc:docMk/>
+          <pc:sldMk cId="3907607226" sldId="264"/>
+        </pc:sldMkLst>
+        <pc:spChg chg="mod">
+          <ac:chgData name="Bronson Wharepapa" userId="S::18114@my.sanctamaria.school.nz::fc604165-d948-4f79-adb1-ca2376f8e399" providerId="AD" clId="Web-{2554FBCC-49BD-FBDF-D538-CE3319AF18E1}" dt="2023-05-10T01:00:23.973" v="8"/>
+          <ac:spMkLst>
+            <pc:docMk/>
+            <pc:sldMk cId="3907607226" sldId="264"/>
+            <ac:spMk id="78" creationId="{00000000-0000-0000-0000-000000000000}"/>
+          </ac:spMkLst>
+        </pc:spChg>
+        <pc:graphicFrameChg chg="mod modGraphic">
+          <ac:chgData name="Bronson Wharepapa" userId="S::18114@my.sanctamaria.school.nz::fc604165-d948-4f79-adb1-ca2376f8e399" providerId="AD" clId="Web-{2554FBCC-49BD-FBDF-D538-CE3319AF18E1}" dt="2023-05-10T01:09:39.566" v="143"/>
+          <ac:graphicFrameMkLst>
+            <pc:docMk/>
+            <pc:sldMk cId="3907607226" sldId="264"/>
+            <ac:graphicFrameMk id="79" creationId="{00000000-0000-0000-0000-000000000000}"/>
+          </ac:graphicFrameMkLst>
+        </pc:graphicFrameChg>
+        <pc:picChg chg="add mod">
+          <ac:chgData name="Bronson Wharepapa" userId="S::18114@my.sanctamaria.school.nz::fc604165-d948-4f79-adb1-ca2376f8e399" providerId="AD" clId="Web-{2554FBCC-49BD-FBDF-D538-CE3319AF18E1}" dt="2023-05-10T01:11:56.569" v="146" actId="1076"/>
+          <ac:picMkLst>
+            <pc:docMk/>
+            <pc:sldMk cId="3907607226" sldId="264"/>
+            <ac:picMk id="2" creationId="{AED4FB38-61A0-7B26-2EFC-9C82A5EB2C96}"/>
+          </ac:picMkLst>
+        </pc:picChg>
+        <pc:picChg chg="del">
+          <ac:chgData name="Bronson Wharepapa" userId="S::18114@my.sanctamaria.school.nz::fc604165-d948-4f79-adb1-ca2376f8e399" providerId="AD" clId="Web-{2554FBCC-49BD-FBDF-D538-CE3319AF18E1}" dt="2023-05-10T01:08:18.251" v="29"/>
+          <ac:picMkLst>
+            <pc:docMk/>
+            <pc:sldMk cId="3907607226" sldId="264"/>
+            <ac:picMk id="3" creationId="{D880C62B-C670-8435-3123-62FD5EBAE978}"/>
+          </ac:picMkLst>
+        </pc:picChg>
+        <pc:picChg chg="del">
+          <ac:chgData name="Bronson Wharepapa" userId="S::18114@my.sanctamaria.school.nz::fc604165-d948-4f79-adb1-ca2376f8e399" providerId="AD" clId="Web-{2554FBCC-49BD-FBDF-D538-CE3319AF18E1}" dt="2023-05-10T01:08:18.829" v="30"/>
+          <ac:picMkLst>
+            <pc:docMk/>
+            <pc:sldMk cId="3907607226" sldId="264"/>
+            <ac:picMk id="5" creationId="{B81B4D5F-955C-BC86-7057-41A8B5F890B1}"/>
+          </ac:picMkLst>
+        </pc:picChg>
+      </pc:sldChg>
+      <pc:sldChg chg="addSp delSp modSp add replId">
+        <pc:chgData name="Bronson Wharepapa" userId="S::18114@my.sanctamaria.school.nz::fc604165-d948-4f79-adb1-ca2376f8e399" providerId="AD" clId="Web-{2554FBCC-49BD-FBDF-D538-CE3319AF18E1}" dt="2023-05-10T01:05:51.184" v="28" actId="1076"/>
+        <pc:sldMkLst>
+          <pc:docMk/>
+          <pc:sldMk cId="1390132799" sldId="265"/>
+        </pc:sldMkLst>
+        <pc:spChg chg="mod">
+          <ac:chgData name="Bronson Wharepapa" userId="S::18114@my.sanctamaria.school.nz::fc604165-d948-4f79-adb1-ca2376f8e399" providerId="AD" clId="Web-{2554FBCC-49BD-FBDF-D538-CE3319AF18E1}" dt="2023-05-10T01:05:24.387" v="22" actId="20577"/>
+          <ac:spMkLst>
+            <pc:docMk/>
+            <pc:sldMk cId="1390132799" sldId="265"/>
+            <ac:spMk id="73" creationId="{00000000-0000-0000-0000-000000000000}"/>
+          </ac:spMkLst>
+        </pc:spChg>
+        <pc:picChg chg="del">
+          <ac:chgData name="Bronson Wharepapa" userId="S::18114@my.sanctamaria.school.nz::fc604165-d948-4f79-adb1-ca2376f8e399" providerId="AD" clId="Web-{2554FBCC-49BD-FBDF-D538-CE3319AF18E1}" dt="2023-05-10T01:05:25.824" v="23"/>
+          <ac:picMkLst>
+            <pc:docMk/>
+            <pc:sldMk cId="1390132799" sldId="265"/>
+            <ac:picMk id="2" creationId="{7487E561-84D9-24EA-34F8-8C8729A743FB}"/>
+          </ac:picMkLst>
+        </pc:picChg>
+        <pc:picChg chg="del">
+          <ac:chgData name="Bronson Wharepapa" userId="S::18114@my.sanctamaria.school.nz::fc604165-d948-4f79-adb1-ca2376f8e399" providerId="AD" clId="Web-{2554FBCC-49BD-FBDF-D538-CE3319AF18E1}" dt="2023-05-10T01:05:46.169" v="27"/>
+          <ac:picMkLst>
+            <pc:docMk/>
+            <pc:sldMk cId="1390132799" sldId="265"/>
+            <ac:picMk id="3" creationId="{E624514A-6C52-34C9-6D91-CCD9BFF818CC}"/>
+          </ac:picMkLst>
+        </pc:picChg>
+        <pc:picChg chg="add mod">
+          <ac:chgData name="Bronson Wharepapa" userId="S::18114@my.sanctamaria.school.nz::fc604165-d948-4f79-adb1-ca2376f8e399" providerId="AD" clId="Web-{2554FBCC-49BD-FBDF-D538-CE3319AF18E1}" dt="2023-05-10T01:05:51.184" v="28" actId="1076"/>
+          <ac:picMkLst>
+            <pc:docMk/>
+            <pc:sldMk cId="1390132799" sldId="265"/>
+            <ac:picMk id="4" creationId="{F0D1DE80-0CCE-9E41-BE45-6E14F007F838}"/>
+          </ac:picMkLst>
+        </pc:picChg>
+      </pc:sldChg>
+      <pc:sldChg chg="addSp delSp modSp add replId">
+        <pc:chgData name="Bronson Wharepapa" userId="S::18114@my.sanctamaria.school.nz::fc604165-d948-4f79-adb1-ca2376f8e399" providerId="AD" clId="Web-{2554FBCC-49BD-FBDF-D538-CE3319AF18E1}" dt="2023-05-10T01:12:52.164" v="169" actId="1076"/>
+        <pc:sldMkLst>
+          <pc:docMk/>
+          <pc:sldMk cId="2992748332" sldId="266"/>
+        </pc:sldMkLst>
+        <pc:spChg chg="mod">
+          <ac:chgData name="Bronson Wharepapa" userId="S::18114@my.sanctamaria.school.nz::fc604165-d948-4f79-adb1-ca2376f8e399" providerId="AD" clId="Web-{2554FBCC-49BD-FBDF-D538-CE3319AF18E1}" dt="2023-05-10T01:12:03.022" v="147" actId="20577"/>
+          <ac:spMkLst>
+            <pc:docMk/>
+            <pc:sldMk cId="2992748332" sldId="266"/>
+            <ac:spMk id="78" creationId="{00000000-0000-0000-0000-000000000000}"/>
+          </ac:spMkLst>
+        </pc:spChg>
+        <pc:graphicFrameChg chg="mod modGraphic">
+          <ac:chgData name="Bronson Wharepapa" userId="S::18114@my.sanctamaria.school.nz::fc604165-d948-4f79-adb1-ca2376f8e399" providerId="AD" clId="Web-{2554FBCC-49BD-FBDF-D538-CE3319AF18E1}" dt="2023-05-10T01:12:47.227" v="168"/>
+          <ac:graphicFrameMkLst>
+            <pc:docMk/>
+            <pc:sldMk cId="2992748332" sldId="266"/>
+            <ac:graphicFrameMk id="79" creationId="{00000000-0000-0000-0000-000000000000}"/>
+          </ac:graphicFrameMkLst>
+        </pc:graphicFrameChg>
+        <pc:picChg chg="del">
+          <ac:chgData name="Bronson Wharepapa" userId="S::18114@my.sanctamaria.school.nz::fc604165-d948-4f79-adb1-ca2376f8e399" providerId="AD" clId="Web-{2554FBCC-49BD-FBDF-D538-CE3319AF18E1}" dt="2023-05-10T01:12:05.148" v="148"/>
+          <ac:picMkLst>
+            <pc:docMk/>
+            <pc:sldMk cId="2992748332" sldId="266"/>
+            <ac:picMk id="2" creationId="{AED4FB38-61A0-7B26-2EFC-9C82A5EB2C96}"/>
+          </ac:picMkLst>
+        </pc:picChg>
+        <pc:picChg chg="add mod">
+          <ac:chgData name="Bronson Wharepapa" userId="S::18114@my.sanctamaria.school.nz::fc604165-d948-4f79-adb1-ca2376f8e399" providerId="AD" clId="Web-{2554FBCC-49BD-FBDF-D538-CE3319AF18E1}" dt="2023-05-10T01:12:52.164" v="169" actId="1076"/>
+          <ac:picMkLst>
+            <pc:docMk/>
+            <pc:sldMk cId="2992748332" sldId="266"/>
+            <ac:picMk id="3" creationId="{BFF90D11-7F51-C6BB-912D-5C5889BAD0B2}"/>
+          </ac:picMkLst>
+        </pc:picChg>
+      </pc:sldChg>
+      <pc:sldChg chg="addSp delSp modSp add replId">
+        <pc:chgData name="Bronson Wharepapa" userId="S::18114@my.sanctamaria.school.nz::fc604165-d948-4f79-adb1-ca2376f8e399" providerId="AD" clId="Web-{2554FBCC-49BD-FBDF-D538-CE3319AF18E1}" dt="2023-05-10T01:20:37.005" v="203" actId="14100"/>
+        <pc:sldMkLst>
+          <pc:docMk/>
+          <pc:sldMk cId="1895178351" sldId="267"/>
+        </pc:sldMkLst>
+        <pc:spChg chg="mod">
+          <ac:chgData name="Bronson Wharepapa" userId="S::18114@my.sanctamaria.school.nz::fc604165-d948-4f79-adb1-ca2376f8e399" providerId="AD" clId="Web-{2554FBCC-49BD-FBDF-D538-CE3319AF18E1}" dt="2023-05-10T01:18:33.752" v="172" actId="20577"/>
+          <ac:spMkLst>
+            <pc:docMk/>
+            <pc:sldMk cId="1895178351" sldId="267"/>
+            <ac:spMk id="78" creationId="{00000000-0000-0000-0000-000000000000}"/>
+          </ac:spMkLst>
+        </pc:spChg>
+        <pc:graphicFrameChg chg="mod modGraphic">
+          <ac:chgData name="Bronson Wharepapa" userId="S::18114@my.sanctamaria.school.nz::fc604165-d948-4f79-adb1-ca2376f8e399" providerId="AD" clId="Web-{2554FBCC-49BD-FBDF-D538-CE3319AF18E1}" dt="2023-05-10T01:19:44.113" v="198"/>
+          <ac:graphicFrameMkLst>
+            <pc:docMk/>
+            <pc:sldMk cId="1895178351" sldId="267"/>
+            <ac:graphicFrameMk id="79" creationId="{00000000-0000-0000-0000-000000000000}"/>
+          </ac:graphicFrameMkLst>
+        </pc:graphicFrameChg>
+        <pc:picChg chg="add mod">
+          <ac:chgData name="Bronson Wharepapa" userId="S::18114@my.sanctamaria.school.nz::fc604165-d948-4f79-adb1-ca2376f8e399" providerId="AD" clId="Web-{2554FBCC-49BD-FBDF-D538-CE3319AF18E1}" dt="2023-05-10T01:18:49.221" v="178" actId="1076"/>
+          <ac:picMkLst>
+            <pc:docMk/>
+            <pc:sldMk cId="1895178351" sldId="267"/>
+            <ac:picMk id="2" creationId="{E111B32D-7F1B-D387-8E59-5C8AFC3AF5C5}"/>
+          </ac:picMkLst>
+        </pc:picChg>
+        <pc:picChg chg="del">
+          <ac:chgData name="Bronson Wharepapa" userId="S::18114@my.sanctamaria.school.nz::fc604165-d948-4f79-adb1-ca2376f8e399" providerId="AD" clId="Web-{2554FBCC-49BD-FBDF-D538-CE3319AF18E1}" dt="2023-05-10T01:18:34.564" v="173"/>
+          <ac:picMkLst>
+            <pc:docMk/>
+            <pc:sldMk cId="1895178351" sldId="267"/>
+            <ac:picMk id="3" creationId="{BFF90D11-7F51-C6BB-912D-5C5889BAD0B2}"/>
+          </ac:picMkLst>
+        </pc:picChg>
+        <pc:picChg chg="add mod">
+          <ac:chgData name="Bronson Wharepapa" userId="S::18114@my.sanctamaria.school.nz::fc604165-d948-4f79-adb1-ca2376f8e399" providerId="AD" clId="Web-{2554FBCC-49BD-FBDF-D538-CE3319AF18E1}" dt="2023-05-10T01:20:37.005" v="203" actId="14100"/>
+          <ac:picMkLst>
+            <pc:docMk/>
+            <pc:sldMk cId="1895178351" sldId="267"/>
+            <ac:picMk id="4" creationId="{8170FDD6-077D-14D1-ADB7-673229001DC5}"/>
+          </ac:picMkLst>
+        </pc:picChg>
+      </pc:sldChg>
+      <pc:sldChg chg="modSp add replId">
+        <pc:chgData name="Bronson Wharepapa" userId="S::18114@my.sanctamaria.school.nz::fc604165-d948-4f79-adb1-ca2376f8e399" providerId="AD" clId="Web-{2554FBCC-49BD-FBDF-D538-CE3319AF18E1}" dt="2023-05-10T01:20:44.771" v="205" actId="20577"/>
+        <pc:sldMkLst>
+          <pc:docMk/>
+          <pc:sldMk cId="2733379314" sldId="268"/>
+        </pc:sldMkLst>
+        <pc:spChg chg="mod">
+          <ac:chgData name="Bronson Wharepapa" userId="S::18114@my.sanctamaria.school.nz::fc604165-d948-4f79-adb1-ca2376f8e399" providerId="AD" clId="Web-{2554FBCC-49BD-FBDF-D538-CE3319AF18E1}" dt="2023-05-10T01:20:44.771" v="205" actId="20577"/>
+          <ac:spMkLst>
+            <pc:docMk/>
+            <pc:sldMk cId="2733379314" sldId="268"/>
+            <ac:spMk id="78" creationId="{00000000-0000-0000-0000-000000000000}"/>
+          </ac:spMkLst>
+        </pc:spChg>
       </pc:sldChg>
     </pc:docChg>
   </pc:docChgLst>
@@ -1038,6 +1415,566 @@
 </p:notes>
 </file>
 
+<file path=ppt/notesSlides/notesSlide10.xml><?xml version="1.0" encoding="utf-8"?>
+<p:notes xmlns:a="http://schemas.openxmlformats.org/drawingml/2006/main" xmlns:r="http://schemas.openxmlformats.org/officeDocument/2006/relationships" xmlns:p="http://schemas.openxmlformats.org/presentationml/2006/main" showMasterSp="0" showMasterPhAnim="0">
+  <p:cSld>
+    <p:spTree>
+      <p:nvGrpSpPr>
+        <p:cNvPr id="1" name="Shape 74"/>
+        <p:cNvGrpSpPr/>
+        <p:nvPr/>
+      </p:nvGrpSpPr>
+      <p:grpSpPr>
+        <a:xfrm>
+          <a:off x="0" y="0"/>
+          <a:ext cx="0" cy="0"/>
+          <a:chOff x="0" y="0"/>
+          <a:chExt cx="0" cy="0"/>
+        </a:xfrm>
+      </p:grpSpPr>
+      <p:sp>
+        <p:nvSpPr>
+          <p:cNvPr id="75" name="Google Shape;75;gac10fef634_0_20:notes"/>
+          <p:cNvSpPr>
+            <a:spLocks noGrp="1" noRot="1" noChangeAspect="1"/>
+          </p:cNvSpPr>
+          <p:nvPr>
+            <p:ph type="sldImg" idx="2"/>
+          </p:nvPr>
+        </p:nvSpPr>
+        <p:spPr>
+          <a:xfrm>
+            <a:off x="381000" y="685800"/>
+            <a:ext cx="6096000" cy="3429000"/>
+          </a:xfrm>
+          <a:custGeom>
+            <a:avLst/>
+            <a:gdLst/>
+            <a:ahLst/>
+            <a:cxnLst/>
+            <a:rect l="l" t="t" r="r" b="b"/>
+            <a:pathLst>
+              <a:path w="120000" h="120000" extrusionOk="0">
+                <a:moveTo>
+                  <a:pt x="0" y="0"/>
+                </a:moveTo>
+                <a:lnTo>
+                  <a:pt x="120000" y="0"/>
+                </a:lnTo>
+                <a:lnTo>
+                  <a:pt x="120000" y="120000"/>
+                </a:lnTo>
+                <a:lnTo>
+                  <a:pt x="0" y="120000"/>
+                </a:lnTo>
+                <a:close/>
+              </a:path>
+            </a:pathLst>
+          </a:custGeom>
+        </p:spPr>
+      </p:sp>
+      <p:sp>
+        <p:nvSpPr>
+          <p:cNvPr id="76" name="Google Shape;76;gac10fef634_0_20:notes"/>
+          <p:cNvSpPr txBox="1">
+            <a:spLocks noGrp="1"/>
+          </p:cNvSpPr>
+          <p:nvPr>
+            <p:ph type="body" idx="1"/>
+          </p:nvPr>
+        </p:nvSpPr>
+        <p:spPr>
+          <a:xfrm>
+            <a:off x="685800" y="4343400"/>
+            <a:ext cx="5486400" cy="4114800"/>
+          </a:xfrm>
+          <a:prstGeom prst="rect">
+            <a:avLst/>
+          </a:prstGeom>
+        </p:spPr>
+        <p:txBody>
+          <a:bodyPr spcFirstLastPara="1" wrap="square" lIns="91425" tIns="91425" rIns="91425" bIns="91425" anchor="t" anchorCtr="0">
+            <a:noAutofit/>
+          </a:bodyPr>
+          <a:lstStyle/>
+          <a:p>
+            <a:pPr marL="0" lvl="0" indent="0" algn="l" rtl="0">
+              <a:spcBef>
+                <a:spcPts val="0"/>
+              </a:spcBef>
+              <a:spcAft>
+                <a:spcPts val="0"/>
+              </a:spcAft>
+              <a:buNone/>
+            </a:pPr>
+            <a:endParaRPr/>
+          </a:p>
+        </p:txBody>
+      </p:sp>
+    </p:spTree>
+    <p:extLst>
+      <p:ext uri="{BB962C8B-B14F-4D97-AF65-F5344CB8AC3E}">
+        <p14:creationId xmlns:p14="http://schemas.microsoft.com/office/powerpoint/2010/main" val="3823436704"/>
+      </p:ext>
+    </p:extLst>
+  </p:cSld>
+  <p:clrMapOvr>
+    <a:masterClrMapping/>
+  </p:clrMapOvr>
+</p:notes>
+</file>
+
+<file path=ppt/notesSlides/notesSlide11.xml><?xml version="1.0" encoding="utf-8"?>
+<p:notes xmlns:a="http://schemas.openxmlformats.org/drawingml/2006/main" xmlns:r="http://schemas.openxmlformats.org/officeDocument/2006/relationships" xmlns:p="http://schemas.openxmlformats.org/presentationml/2006/main" showMasterSp="0" showMasterPhAnim="0">
+  <p:cSld>
+    <p:spTree>
+      <p:nvGrpSpPr>
+        <p:cNvPr id="1" name="Shape 74"/>
+        <p:cNvGrpSpPr/>
+        <p:nvPr/>
+      </p:nvGrpSpPr>
+      <p:grpSpPr>
+        <a:xfrm>
+          <a:off x="0" y="0"/>
+          <a:ext cx="0" cy="0"/>
+          <a:chOff x="0" y="0"/>
+          <a:chExt cx="0" cy="0"/>
+        </a:xfrm>
+      </p:grpSpPr>
+      <p:sp>
+        <p:nvSpPr>
+          <p:cNvPr id="75" name="Google Shape;75;gac10fef634_0_20:notes"/>
+          <p:cNvSpPr>
+            <a:spLocks noGrp="1" noRot="1" noChangeAspect="1"/>
+          </p:cNvSpPr>
+          <p:nvPr>
+            <p:ph type="sldImg" idx="2"/>
+          </p:nvPr>
+        </p:nvSpPr>
+        <p:spPr>
+          <a:xfrm>
+            <a:off x="381000" y="685800"/>
+            <a:ext cx="6096000" cy="3429000"/>
+          </a:xfrm>
+          <a:custGeom>
+            <a:avLst/>
+            <a:gdLst/>
+            <a:ahLst/>
+            <a:cxnLst/>
+            <a:rect l="l" t="t" r="r" b="b"/>
+            <a:pathLst>
+              <a:path w="120000" h="120000" extrusionOk="0">
+                <a:moveTo>
+                  <a:pt x="0" y="0"/>
+                </a:moveTo>
+                <a:lnTo>
+                  <a:pt x="120000" y="0"/>
+                </a:lnTo>
+                <a:lnTo>
+                  <a:pt x="120000" y="120000"/>
+                </a:lnTo>
+                <a:lnTo>
+                  <a:pt x="0" y="120000"/>
+                </a:lnTo>
+                <a:close/>
+              </a:path>
+            </a:pathLst>
+          </a:custGeom>
+        </p:spPr>
+      </p:sp>
+      <p:sp>
+        <p:nvSpPr>
+          <p:cNvPr id="76" name="Google Shape;76;gac10fef634_0_20:notes"/>
+          <p:cNvSpPr txBox="1">
+            <a:spLocks noGrp="1"/>
+          </p:cNvSpPr>
+          <p:nvPr>
+            <p:ph type="body" idx="1"/>
+          </p:nvPr>
+        </p:nvSpPr>
+        <p:spPr>
+          <a:xfrm>
+            <a:off x="685800" y="4343400"/>
+            <a:ext cx="5486400" cy="4114800"/>
+          </a:xfrm>
+          <a:prstGeom prst="rect">
+            <a:avLst/>
+          </a:prstGeom>
+        </p:spPr>
+        <p:txBody>
+          <a:bodyPr spcFirstLastPara="1" wrap="square" lIns="91425" tIns="91425" rIns="91425" bIns="91425" anchor="t" anchorCtr="0">
+            <a:noAutofit/>
+          </a:bodyPr>
+          <a:lstStyle/>
+          <a:p>
+            <a:pPr marL="0" lvl="0" indent="0" algn="l" rtl="0">
+              <a:spcBef>
+                <a:spcPts val="0"/>
+              </a:spcBef>
+              <a:spcAft>
+                <a:spcPts val="0"/>
+              </a:spcAft>
+              <a:buNone/>
+            </a:pPr>
+            <a:endParaRPr/>
+          </a:p>
+        </p:txBody>
+      </p:sp>
+    </p:spTree>
+    <p:extLst>
+      <p:ext uri="{BB962C8B-B14F-4D97-AF65-F5344CB8AC3E}">
+        <p14:creationId xmlns:p14="http://schemas.microsoft.com/office/powerpoint/2010/main" val="305422845"/>
+      </p:ext>
+    </p:extLst>
+  </p:cSld>
+  <p:clrMapOvr>
+    <a:masterClrMapping/>
+  </p:clrMapOvr>
+</p:notes>
+</file>
+
+<file path=ppt/notesSlides/notesSlide12.xml><?xml version="1.0" encoding="utf-8"?>
+<p:notes xmlns:a="http://schemas.openxmlformats.org/drawingml/2006/main" xmlns:r="http://schemas.openxmlformats.org/officeDocument/2006/relationships" xmlns:p="http://schemas.openxmlformats.org/presentationml/2006/main" showMasterSp="0" showMasterPhAnim="0">
+  <p:cSld>
+    <p:spTree>
+      <p:nvGrpSpPr>
+        <p:cNvPr id="1" name="Shape 74"/>
+        <p:cNvGrpSpPr/>
+        <p:nvPr/>
+      </p:nvGrpSpPr>
+      <p:grpSpPr>
+        <a:xfrm>
+          <a:off x="0" y="0"/>
+          <a:ext cx="0" cy="0"/>
+          <a:chOff x="0" y="0"/>
+          <a:chExt cx="0" cy="0"/>
+        </a:xfrm>
+      </p:grpSpPr>
+      <p:sp>
+        <p:nvSpPr>
+          <p:cNvPr id="75" name="Google Shape;75;gac10fef634_0_20:notes"/>
+          <p:cNvSpPr>
+            <a:spLocks noGrp="1" noRot="1" noChangeAspect="1"/>
+          </p:cNvSpPr>
+          <p:nvPr>
+            <p:ph type="sldImg" idx="2"/>
+          </p:nvPr>
+        </p:nvSpPr>
+        <p:spPr>
+          <a:xfrm>
+            <a:off x="381000" y="685800"/>
+            <a:ext cx="6096000" cy="3429000"/>
+          </a:xfrm>
+          <a:custGeom>
+            <a:avLst/>
+            <a:gdLst/>
+            <a:ahLst/>
+            <a:cxnLst/>
+            <a:rect l="l" t="t" r="r" b="b"/>
+            <a:pathLst>
+              <a:path w="120000" h="120000" extrusionOk="0">
+                <a:moveTo>
+                  <a:pt x="0" y="0"/>
+                </a:moveTo>
+                <a:lnTo>
+                  <a:pt x="120000" y="0"/>
+                </a:lnTo>
+                <a:lnTo>
+                  <a:pt x="120000" y="120000"/>
+                </a:lnTo>
+                <a:lnTo>
+                  <a:pt x="0" y="120000"/>
+                </a:lnTo>
+                <a:close/>
+              </a:path>
+            </a:pathLst>
+          </a:custGeom>
+        </p:spPr>
+      </p:sp>
+      <p:sp>
+        <p:nvSpPr>
+          <p:cNvPr id="76" name="Google Shape;76;gac10fef634_0_20:notes"/>
+          <p:cNvSpPr txBox="1">
+            <a:spLocks noGrp="1"/>
+          </p:cNvSpPr>
+          <p:nvPr>
+            <p:ph type="body" idx="1"/>
+          </p:nvPr>
+        </p:nvSpPr>
+        <p:spPr>
+          <a:xfrm>
+            <a:off x="685800" y="4343400"/>
+            <a:ext cx="5486400" cy="4114800"/>
+          </a:xfrm>
+          <a:prstGeom prst="rect">
+            <a:avLst/>
+          </a:prstGeom>
+        </p:spPr>
+        <p:txBody>
+          <a:bodyPr spcFirstLastPara="1" wrap="square" lIns="91425" tIns="91425" rIns="91425" bIns="91425" anchor="t" anchorCtr="0">
+            <a:noAutofit/>
+          </a:bodyPr>
+          <a:lstStyle/>
+          <a:p>
+            <a:pPr marL="0" lvl="0" indent="0" algn="l" rtl="0">
+              <a:spcBef>
+                <a:spcPts val="0"/>
+              </a:spcBef>
+              <a:spcAft>
+                <a:spcPts val="0"/>
+              </a:spcAft>
+              <a:buNone/>
+            </a:pPr>
+            <a:endParaRPr/>
+          </a:p>
+        </p:txBody>
+      </p:sp>
+    </p:spTree>
+    <p:extLst>
+      <p:ext uri="{BB962C8B-B14F-4D97-AF65-F5344CB8AC3E}">
+        <p14:creationId xmlns:p14="http://schemas.microsoft.com/office/powerpoint/2010/main" val="804834033"/>
+      </p:ext>
+    </p:extLst>
+  </p:cSld>
+  <p:clrMapOvr>
+    <a:masterClrMapping/>
+  </p:clrMapOvr>
+</p:notes>
+</file>
+
+<file path=ppt/notesSlides/notesSlide13.xml><?xml version="1.0" encoding="utf-8"?>
+<p:notes xmlns:a="http://schemas.openxmlformats.org/drawingml/2006/main" xmlns:r="http://schemas.openxmlformats.org/officeDocument/2006/relationships" xmlns:p="http://schemas.openxmlformats.org/presentationml/2006/main" showMasterSp="0" showMasterPhAnim="0">
+  <p:cSld>
+    <p:spTree>
+      <p:nvGrpSpPr>
+        <p:cNvPr id="1" name="Shape 80"/>
+        <p:cNvGrpSpPr/>
+        <p:nvPr/>
+      </p:nvGrpSpPr>
+      <p:grpSpPr>
+        <a:xfrm>
+          <a:off x="0" y="0"/>
+          <a:ext cx="0" cy="0"/>
+          <a:chOff x="0" y="0"/>
+          <a:chExt cx="0" cy="0"/>
+        </a:xfrm>
+      </p:grpSpPr>
+      <p:sp>
+        <p:nvSpPr>
+          <p:cNvPr id="81" name="Google Shape;81;gac10fef634_0_25:notes"/>
+          <p:cNvSpPr>
+            <a:spLocks noGrp="1" noRot="1" noChangeAspect="1"/>
+          </p:cNvSpPr>
+          <p:nvPr>
+            <p:ph type="sldImg" idx="2"/>
+          </p:nvPr>
+        </p:nvSpPr>
+        <p:spPr>
+          <a:xfrm>
+            <a:off x="381000" y="685800"/>
+            <a:ext cx="6096000" cy="3429000"/>
+          </a:xfrm>
+          <a:custGeom>
+            <a:avLst/>
+            <a:gdLst/>
+            <a:ahLst/>
+            <a:cxnLst/>
+            <a:rect l="l" t="t" r="r" b="b"/>
+            <a:pathLst>
+              <a:path w="120000" h="120000" extrusionOk="0">
+                <a:moveTo>
+                  <a:pt x="0" y="0"/>
+                </a:moveTo>
+                <a:lnTo>
+                  <a:pt x="120000" y="0"/>
+                </a:lnTo>
+                <a:lnTo>
+                  <a:pt x="120000" y="120000"/>
+                </a:lnTo>
+                <a:lnTo>
+                  <a:pt x="0" y="120000"/>
+                </a:lnTo>
+                <a:close/>
+              </a:path>
+            </a:pathLst>
+          </a:custGeom>
+        </p:spPr>
+      </p:sp>
+      <p:sp>
+        <p:nvSpPr>
+          <p:cNvPr id="82" name="Google Shape;82;gac10fef634_0_25:notes"/>
+          <p:cNvSpPr txBox="1">
+            <a:spLocks noGrp="1"/>
+          </p:cNvSpPr>
+          <p:nvPr>
+            <p:ph type="body" idx="1"/>
+          </p:nvPr>
+        </p:nvSpPr>
+        <p:spPr>
+          <a:xfrm>
+            <a:off x="685800" y="4343400"/>
+            <a:ext cx="5486400" cy="4114800"/>
+          </a:xfrm>
+          <a:prstGeom prst="rect">
+            <a:avLst/>
+          </a:prstGeom>
+        </p:spPr>
+        <p:txBody>
+          <a:bodyPr spcFirstLastPara="1" wrap="square" lIns="91425" tIns="91425" rIns="91425" bIns="91425" anchor="t" anchorCtr="0">
+            <a:noAutofit/>
+          </a:bodyPr>
+          <a:lstStyle/>
+          <a:p>
+            <a:pPr marL="0" lvl="0" indent="0" algn="l" rtl="0">
+              <a:spcBef>
+                <a:spcPts val="0"/>
+              </a:spcBef>
+              <a:spcAft>
+                <a:spcPts val="0"/>
+              </a:spcAft>
+              <a:buClr>
+                <a:schemeClr val="dk1"/>
+              </a:buClr>
+              <a:buSzPts val="1100"/>
+              <a:buFont typeface="Arial"/>
+              <a:buNone/>
+            </a:pPr>
+            <a:r>
+              <a:rPr lang="en"/>
+              <a:t>Your version control evidence should go here.  This could be in the form of annotated screenshots which show you you managed this process or you could make a brief screencast explaining how you implemented version control.</a:t>
+            </a:r>
+            <a:endParaRPr/>
+          </a:p>
+          <a:p>
+            <a:pPr marL="0" lvl="0" indent="0" algn="l" rtl="0">
+              <a:spcBef>
+                <a:spcPts val="0"/>
+              </a:spcBef>
+              <a:spcAft>
+                <a:spcPts val="0"/>
+              </a:spcAft>
+              <a:buNone/>
+            </a:pPr>
+            <a:endParaRPr/>
+          </a:p>
+        </p:txBody>
+      </p:sp>
+    </p:spTree>
+  </p:cSld>
+  <p:clrMapOvr>
+    <a:masterClrMapping/>
+  </p:clrMapOvr>
+</p:notes>
+</file>
+
+<file path=ppt/notesSlides/notesSlide14.xml><?xml version="1.0" encoding="utf-8"?>
+<p:notes xmlns:a="http://schemas.openxmlformats.org/drawingml/2006/main" xmlns:r="http://schemas.openxmlformats.org/officeDocument/2006/relationships" xmlns:p="http://schemas.openxmlformats.org/presentationml/2006/main" showMasterSp="0" showMasterPhAnim="0">
+  <p:cSld>
+    <p:spTree>
+      <p:nvGrpSpPr>
+        <p:cNvPr id="1" name="Shape 86"/>
+        <p:cNvGrpSpPr/>
+        <p:nvPr/>
+      </p:nvGrpSpPr>
+      <p:grpSpPr>
+        <a:xfrm>
+          <a:off x="0" y="0"/>
+          <a:ext cx="0" cy="0"/>
+          <a:chOff x="0" y="0"/>
+          <a:chExt cx="0" cy="0"/>
+        </a:xfrm>
+      </p:grpSpPr>
+      <p:sp>
+        <p:nvSpPr>
+          <p:cNvPr id="87" name="Google Shape;87;gac10fef634_0_30:notes"/>
+          <p:cNvSpPr>
+            <a:spLocks noGrp="1" noRot="1" noChangeAspect="1"/>
+          </p:cNvSpPr>
+          <p:nvPr>
+            <p:ph type="sldImg" idx="2"/>
+          </p:nvPr>
+        </p:nvSpPr>
+        <p:spPr>
+          <a:xfrm>
+            <a:off x="381000" y="685800"/>
+            <a:ext cx="6096000" cy="3429000"/>
+          </a:xfrm>
+          <a:custGeom>
+            <a:avLst/>
+            <a:gdLst/>
+            <a:ahLst/>
+            <a:cxnLst/>
+            <a:rect l="l" t="t" r="r" b="b"/>
+            <a:pathLst>
+              <a:path w="120000" h="120000" extrusionOk="0">
+                <a:moveTo>
+                  <a:pt x="0" y="0"/>
+                </a:moveTo>
+                <a:lnTo>
+                  <a:pt x="120000" y="0"/>
+                </a:lnTo>
+                <a:lnTo>
+                  <a:pt x="120000" y="120000"/>
+                </a:lnTo>
+                <a:lnTo>
+                  <a:pt x="0" y="120000"/>
+                </a:lnTo>
+                <a:close/>
+              </a:path>
+            </a:pathLst>
+          </a:custGeom>
+        </p:spPr>
+      </p:sp>
+      <p:sp>
+        <p:nvSpPr>
+          <p:cNvPr id="88" name="Google Shape;88;gac10fef634_0_30:notes"/>
+          <p:cNvSpPr txBox="1">
+            <a:spLocks noGrp="1"/>
+          </p:cNvSpPr>
+          <p:nvPr>
+            <p:ph type="body" idx="1"/>
+          </p:nvPr>
+        </p:nvSpPr>
+        <p:spPr>
+          <a:xfrm>
+            <a:off x="685800" y="4343400"/>
+            <a:ext cx="5486400" cy="4114800"/>
+          </a:xfrm>
+          <a:prstGeom prst="rect">
+            <a:avLst/>
+          </a:prstGeom>
+        </p:spPr>
+        <p:txBody>
+          <a:bodyPr spcFirstLastPara="1" wrap="square" lIns="91425" tIns="91425" rIns="91425" bIns="91425" anchor="t" anchorCtr="0">
+            <a:noAutofit/>
+          </a:bodyPr>
+          <a:lstStyle/>
+          <a:p>
+            <a:pPr marL="0" lvl="0" indent="0" algn="l" rtl="0">
+              <a:spcBef>
+                <a:spcPts val="0"/>
+              </a:spcBef>
+              <a:spcAft>
+                <a:spcPts val="0"/>
+              </a:spcAft>
+              <a:buNone/>
+            </a:pPr>
+            <a:r>
+              <a:rPr lang="en"/>
+              <a:t>Discusses how the information from planning, testing and trialling of components assisted in the development of a high-quality outcome</a:t>
+            </a:r>
+            <a:endParaRPr/>
+          </a:p>
+        </p:txBody>
+      </p:sp>
+    </p:spTree>
+  </p:cSld>
+  <p:clrMapOvr>
+    <a:masterClrMapping/>
+  </p:clrMapOvr>
+</p:notes>
+</file>
+
 <file path=ppt/notesSlides/notesSlide2.xml><?xml version="1.0" encoding="utf-8"?>
 <p:notes xmlns:a="http://schemas.openxmlformats.org/drawingml/2006/main" xmlns:r="http://schemas.openxmlformats.org/officeDocument/2006/relationships" xmlns:p="http://schemas.openxmlformats.org/presentationml/2006/main" showMasterSp="0" showMasterPhAnim="0">
   <p:cSld>
@@ -1593,7 +2530,7 @@
   <p:cSld>
     <p:spTree>
       <p:nvGrpSpPr>
-        <p:cNvPr id="1" name="Shape 80"/>
+        <p:cNvPr id="1" name="Shape 69"/>
         <p:cNvGrpSpPr/>
         <p:nvPr/>
       </p:nvGrpSpPr>
@@ -1607,7 +2544,7 @@
       </p:grpSpPr>
       <p:sp>
         <p:nvSpPr>
-          <p:cNvPr id="81" name="Google Shape;81;gac10fef634_0_25:notes"/>
+          <p:cNvPr id="70" name="Google Shape;70;gac10fef634_0_16:notes"/>
           <p:cNvSpPr>
             <a:spLocks noGrp="1" noRot="1" noChangeAspect="1"/>
           </p:cNvSpPr>
@@ -1648,7 +2585,7 @@
       </p:sp>
       <p:sp>
         <p:nvSpPr>
-          <p:cNvPr id="82" name="Google Shape;82;gac10fef634_0_25:notes"/>
+          <p:cNvPr id="71" name="Google Shape;71;gac10fef634_0_16:notes"/>
           <p:cNvSpPr txBox="1">
             <a:spLocks noGrp="1"/>
           </p:cNvSpPr>
@@ -1678,27 +2615,6 @@
               <a:spcAft>
                 <a:spcPts val="0"/>
               </a:spcAft>
-              <a:buClr>
-                <a:schemeClr val="dk1"/>
-              </a:buClr>
-              <a:buSzPts val="1100"/>
-              <a:buFont typeface="Arial"/>
-              <a:buNone/>
-            </a:pPr>
-            <a:r>
-              <a:rPr lang="en"/>
-              <a:t>Your version control evidence should go here.  This could be in the form of annotated screenshots which show you you managed this process or you could make a brief screencast explaining how you implemented version control.</a:t>
-            </a:r>
-            <a:endParaRPr/>
-          </a:p>
-          <a:p>
-            <a:pPr marL="0" lvl="0" indent="0" algn="l" rtl="0">
-              <a:spcBef>
-                <a:spcPts val="0"/>
-              </a:spcBef>
-              <a:spcAft>
-                <a:spcPts val="0"/>
-              </a:spcAft>
               <a:buNone/>
             </a:pPr>
             <a:endParaRPr/>
@@ -1706,6 +2622,11 @@
         </p:txBody>
       </p:sp>
     </p:spTree>
+    <p:extLst>
+      <p:ext uri="{BB962C8B-B14F-4D97-AF65-F5344CB8AC3E}">
+        <p14:creationId xmlns:p14="http://schemas.microsoft.com/office/powerpoint/2010/main" val="2798801511"/>
+      </p:ext>
+    </p:extLst>
   </p:cSld>
   <p:clrMapOvr>
     <a:masterClrMapping/>
@@ -1718,7 +2639,7 @@
   <p:cSld>
     <p:spTree>
       <p:nvGrpSpPr>
-        <p:cNvPr id="1" name="Shape 86"/>
+        <p:cNvPr id="1" name="Shape 74"/>
         <p:cNvGrpSpPr/>
         <p:nvPr/>
       </p:nvGrpSpPr>
@@ -1732,7 +2653,7 @@
       </p:grpSpPr>
       <p:sp>
         <p:nvSpPr>
-          <p:cNvPr id="87" name="Google Shape;87;gac10fef634_0_30:notes"/>
+          <p:cNvPr id="75" name="Google Shape;75;gac10fef634_0_20:notes"/>
           <p:cNvSpPr>
             <a:spLocks noGrp="1" noRot="1" noChangeAspect="1"/>
           </p:cNvSpPr>
@@ -1773,7 +2694,7 @@
       </p:sp>
       <p:sp>
         <p:nvSpPr>
-          <p:cNvPr id="88" name="Google Shape;88;gac10fef634_0_30:notes"/>
+          <p:cNvPr id="76" name="Google Shape;76;gac10fef634_0_20:notes"/>
           <p:cNvSpPr txBox="1">
             <a:spLocks noGrp="1"/>
           </p:cNvSpPr>
@@ -1805,15 +2726,125 @@
               </a:spcAft>
               <a:buNone/>
             </a:pPr>
-            <a:r>
-              <a:rPr lang="en"/>
-              <a:t>Discusses how the information from planning, testing and trialling of components assisted in the development of a high-quality outcome</a:t>
-            </a:r>
             <a:endParaRPr/>
           </a:p>
         </p:txBody>
       </p:sp>
     </p:spTree>
+    <p:extLst>
+      <p:ext uri="{BB962C8B-B14F-4D97-AF65-F5344CB8AC3E}">
+        <p14:creationId xmlns:p14="http://schemas.microsoft.com/office/powerpoint/2010/main" val="3916077762"/>
+      </p:ext>
+    </p:extLst>
+  </p:cSld>
+  <p:clrMapOvr>
+    <a:masterClrMapping/>
+  </p:clrMapOvr>
+</p:notes>
+</file>
+
+<file path=ppt/notesSlides/notesSlide9.xml><?xml version="1.0" encoding="utf-8"?>
+<p:notes xmlns:a="http://schemas.openxmlformats.org/drawingml/2006/main" xmlns:r="http://schemas.openxmlformats.org/officeDocument/2006/relationships" xmlns:p="http://schemas.openxmlformats.org/presentationml/2006/main" showMasterSp="0" showMasterPhAnim="0">
+  <p:cSld>
+    <p:spTree>
+      <p:nvGrpSpPr>
+        <p:cNvPr id="1" name="Shape 74"/>
+        <p:cNvGrpSpPr/>
+        <p:nvPr/>
+      </p:nvGrpSpPr>
+      <p:grpSpPr>
+        <a:xfrm>
+          <a:off x="0" y="0"/>
+          <a:ext cx="0" cy="0"/>
+          <a:chOff x="0" y="0"/>
+          <a:chExt cx="0" cy="0"/>
+        </a:xfrm>
+      </p:grpSpPr>
+      <p:sp>
+        <p:nvSpPr>
+          <p:cNvPr id="75" name="Google Shape;75;gac10fef634_0_20:notes"/>
+          <p:cNvSpPr>
+            <a:spLocks noGrp="1" noRot="1" noChangeAspect="1"/>
+          </p:cNvSpPr>
+          <p:nvPr>
+            <p:ph type="sldImg" idx="2"/>
+          </p:nvPr>
+        </p:nvSpPr>
+        <p:spPr>
+          <a:xfrm>
+            <a:off x="381000" y="685800"/>
+            <a:ext cx="6096000" cy="3429000"/>
+          </a:xfrm>
+          <a:custGeom>
+            <a:avLst/>
+            <a:gdLst/>
+            <a:ahLst/>
+            <a:cxnLst/>
+            <a:rect l="l" t="t" r="r" b="b"/>
+            <a:pathLst>
+              <a:path w="120000" h="120000" extrusionOk="0">
+                <a:moveTo>
+                  <a:pt x="0" y="0"/>
+                </a:moveTo>
+                <a:lnTo>
+                  <a:pt x="120000" y="0"/>
+                </a:lnTo>
+                <a:lnTo>
+                  <a:pt x="120000" y="120000"/>
+                </a:lnTo>
+                <a:lnTo>
+                  <a:pt x="0" y="120000"/>
+                </a:lnTo>
+                <a:close/>
+              </a:path>
+            </a:pathLst>
+          </a:custGeom>
+        </p:spPr>
+      </p:sp>
+      <p:sp>
+        <p:nvSpPr>
+          <p:cNvPr id="76" name="Google Shape;76;gac10fef634_0_20:notes"/>
+          <p:cNvSpPr txBox="1">
+            <a:spLocks noGrp="1"/>
+          </p:cNvSpPr>
+          <p:nvPr>
+            <p:ph type="body" idx="1"/>
+          </p:nvPr>
+        </p:nvSpPr>
+        <p:spPr>
+          <a:xfrm>
+            <a:off x="685800" y="4343400"/>
+            <a:ext cx="5486400" cy="4114800"/>
+          </a:xfrm>
+          <a:prstGeom prst="rect">
+            <a:avLst/>
+          </a:prstGeom>
+        </p:spPr>
+        <p:txBody>
+          <a:bodyPr spcFirstLastPara="1" wrap="square" lIns="91425" tIns="91425" rIns="91425" bIns="91425" anchor="t" anchorCtr="0">
+            <a:noAutofit/>
+          </a:bodyPr>
+          <a:lstStyle/>
+          <a:p>
+            <a:pPr marL="0" lvl="0" indent="0" algn="l" rtl="0">
+              <a:spcBef>
+                <a:spcPts val="0"/>
+              </a:spcBef>
+              <a:spcAft>
+                <a:spcPts val="0"/>
+              </a:spcAft>
+              <a:buNone/>
+            </a:pPr>
+            <a:endParaRPr/>
+          </a:p>
+        </p:txBody>
+      </p:sp>
+    </p:spTree>
+    <p:extLst>
+      <p:ext uri="{BB962C8B-B14F-4D97-AF65-F5344CB8AC3E}">
+        <p14:creationId xmlns:p14="http://schemas.microsoft.com/office/powerpoint/2010/main" val="547679649"/>
+      </p:ext>
+    </p:extLst>
   </p:cSld>
   <p:clrMapOvr>
     <a:masterClrMapping/>
@@ -6846,6 +7877,1189 @@
 </p:sld>
 </file>
 
+<file path=ppt/slides/slide10.xml><?xml version="1.0" encoding="utf-8"?>
+<p:sld xmlns:a="http://schemas.openxmlformats.org/drawingml/2006/main" xmlns:r="http://schemas.openxmlformats.org/officeDocument/2006/relationships" xmlns:p="http://schemas.openxmlformats.org/presentationml/2006/main">
+  <p:cSld>
+    <p:spTree>
+      <p:nvGrpSpPr>
+        <p:cNvPr id="1" name="Shape 77"/>
+        <p:cNvGrpSpPr/>
+        <p:nvPr/>
+      </p:nvGrpSpPr>
+      <p:grpSpPr>
+        <a:xfrm>
+          <a:off x="0" y="0"/>
+          <a:ext cx="0" cy="0"/>
+          <a:chOff x="0" y="0"/>
+          <a:chExt cx="0" cy="0"/>
+        </a:xfrm>
+      </p:grpSpPr>
+      <p:sp>
+        <p:nvSpPr>
+          <p:cNvPr id="78" name="Google Shape;78;p17"/>
+          <p:cNvSpPr txBox="1">
+            <a:spLocks noGrp="1"/>
+          </p:cNvSpPr>
+          <p:nvPr>
+            <p:ph type="title"/>
+          </p:nvPr>
+        </p:nvSpPr>
+        <p:spPr>
+          <a:xfrm>
+            <a:off x="311700" y="445025"/>
+            <a:ext cx="8520600" cy="572700"/>
+          </a:xfrm>
+          <a:prstGeom prst="rect">
+            <a:avLst/>
+          </a:prstGeom>
+        </p:spPr>
+        <p:txBody>
+          <a:bodyPr spcFirstLastPara="1" wrap="square" lIns="91425" tIns="91425" rIns="91425" bIns="91425" anchor="t" anchorCtr="0">
+            <a:noAutofit/>
+          </a:bodyPr>
+          <a:lstStyle/>
+          <a:p>
+            <a:r>
+              <a:rPr lang="en" sz="2400" dirty="0"/>
+              <a:t>Component 2 Version 3 - Test Plan (?and screenshot)</a:t>
+            </a:r>
+            <a:endParaRPr sz="2400" dirty="0"/>
+          </a:p>
+        </p:txBody>
+      </p:sp>
+      <p:graphicFrame>
+        <p:nvGraphicFramePr>
+          <p:cNvPr id="79" name="Google Shape;79;p17"/>
+          <p:cNvGraphicFramePr/>
+          <p:nvPr>
+            <p:extLst>
+              <p:ext uri="{D42A27DB-BD31-4B8C-83A1-F6EECF244321}">
+                <p14:modId xmlns:p14="http://schemas.microsoft.com/office/powerpoint/2010/main" val="4073989715"/>
+              </p:ext>
+            </p:extLst>
+          </p:nvPr>
+        </p:nvGraphicFramePr>
+        <p:xfrm>
+          <a:off x="382475" y="1267725"/>
+          <a:ext cx="8520600" cy="1341060"/>
+        </p:xfrm>
+        <a:graphic>
+          <a:graphicData uri="http://schemas.openxmlformats.org/drawingml/2006/table">
+            <a:tbl>
+              <a:tblPr>
+                <a:noFill/>
+                <a:tableStyleId>{E1099E06-0E6B-448D-9D27-60429F06E6F4}</a:tableStyleId>
+              </a:tblPr>
+              <a:tblGrid>
+                <a:gridCol w="4260300">
+                  <a:extLst>
+                    <a:ext uri="{9D8B030D-6E8A-4147-A177-3AD203B41FA5}">
+                      <a16:colId xmlns:a16="http://schemas.microsoft.com/office/drawing/2014/main" val="20000"/>
+                    </a:ext>
+                  </a:extLst>
+                </a:gridCol>
+                <a:gridCol w="4260300">
+                  <a:extLst>
+                    <a:ext uri="{9D8B030D-6E8A-4147-A177-3AD203B41FA5}">
+                      <a16:colId xmlns:a16="http://schemas.microsoft.com/office/drawing/2014/main" val="20001"/>
+                    </a:ext>
+                  </a:extLst>
+                </a:gridCol>
+              </a:tblGrid>
+              <a:tr h="381000">
+                <a:tc>
+                  <a:txBody>
+                    <a:bodyPr/>
+                    <a:lstStyle/>
+                    <a:p>
+                      <a:pPr marL="0" lvl="0" indent="0" algn="l" rtl="0">
+                        <a:spcBef>
+                          <a:spcPts val="0"/>
+                        </a:spcBef>
+                        <a:spcAft>
+                          <a:spcPts val="0"/>
+                        </a:spcAft>
+                        <a:buNone/>
+                      </a:pPr>
+                      <a:r>
+                        <a:rPr lang="en" sz="1600" b="1" dirty="0"/>
+                        <a:t>Test Case</a:t>
+                      </a:r>
+                      <a:endParaRPr sz="1600" b="1"/>
+                    </a:p>
+                  </a:txBody>
+                  <a:tcPr marL="91425" marR="91425" marT="91425" marB="91425">
+                    <a:solidFill>
+                      <a:srgbClr val="CCCCCC"/>
+                    </a:solidFill>
+                  </a:tcPr>
+                </a:tc>
+                <a:tc>
+                  <a:txBody>
+                    <a:bodyPr/>
+                    <a:lstStyle/>
+                    <a:p>
+                      <a:pPr marL="0" lvl="0" indent="0" algn="l" rtl="0">
+                        <a:spcBef>
+                          <a:spcPts val="0"/>
+                        </a:spcBef>
+                        <a:spcAft>
+                          <a:spcPts val="0"/>
+                        </a:spcAft>
+                        <a:buNone/>
+                      </a:pPr>
+                      <a:r>
+                        <a:rPr lang="en" sz="1600" b="1" dirty="0"/>
+                        <a:t>Expected Values</a:t>
+                      </a:r>
+                      <a:endParaRPr sz="1600" b="1"/>
+                    </a:p>
+                  </a:txBody>
+                  <a:tcPr marL="91425" marR="91425" marT="91425" marB="91425">
+                    <a:solidFill>
+                      <a:srgbClr val="CCCCCC"/>
+                    </a:solidFill>
+                  </a:tcPr>
+                </a:tc>
+                <a:extLst>
+                  <a:ext uri="{0D108BD9-81ED-4DB2-BD59-A6C34878D82A}">
+                    <a16:rowId xmlns:a16="http://schemas.microsoft.com/office/drawing/2014/main" val="10000"/>
+                  </a:ext>
+                </a:extLst>
+              </a:tr>
+              <a:tr h="396200">
+                <a:tc>
+                  <a:txBody>
+                    <a:bodyPr/>
+                    <a:lstStyle/>
+                    <a:p>
+                      <a:pPr marL="0" lvl="0" indent="0" algn="l" rtl="0">
+                        <a:spcBef>
+                          <a:spcPts val="0"/>
+                        </a:spcBef>
+                        <a:spcAft>
+                          <a:spcPts val="0"/>
+                        </a:spcAft>
+                        <a:buNone/>
+                      </a:pPr>
+                      <a:r>
+                        <a:rPr lang="en-NZ" sz="1600" dirty="0"/>
+                        <a:t>Ran program</a:t>
+                      </a:r>
+                      <a:endParaRPr sz="1600"/>
+                    </a:p>
+                  </a:txBody>
+                  <a:tcPr marL="91425" marR="91425" marT="91425" marB="91425"/>
+                </a:tc>
+                <a:tc>
+                  <a:txBody>
+                    <a:bodyPr/>
+                    <a:lstStyle/>
+                    <a:p>
+                      <a:pPr marL="0" lvl="0" indent="0" algn="l" rtl="0">
+                        <a:spcBef>
+                          <a:spcPts val="0"/>
+                        </a:spcBef>
+                        <a:spcAft>
+                          <a:spcPts val="0"/>
+                        </a:spcAft>
+                        <a:buNone/>
+                      </a:pPr>
+                      <a:r>
+                        <a:rPr lang="en-NZ" sz="1600" dirty="0"/>
+                        <a:t>Entered 1 – Program prints pickup</a:t>
+                      </a:r>
+                    </a:p>
+                    <a:p>
+                      <a:pPr marL="0" lvl="0" indent="0" algn="l">
+                        <a:spcBef>
+                          <a:spcPts val="0"/>
+                        </a:spcBef>
+                        <a:spcAft>
+                          <a:spcPts val="0"/>
+                        </a:spcAft>
+                        <a:buNone/>
+                      </a:pPr>
+                      <a:r>
+                        <a:rPr lang="en-NZ" sz="1600" dirty="0"/>
+                        <a:t>Entered 2 – Program prints delivery</a:t>
+                      </a:r>
+                    </a:p>
+                    <a:p>
+                      <a:pPr marL="0" lvl="0" indent="0" algn="l">
+                        <a:spcBef>
+                          <a:spcPts val="0"/>
+                        </a:spcBef>
+                        <a:spcAft>
+                          <a:spcPts val="0"/>
+                        </a:spcAft>
+                        <a:buNone/>
+                      </a:pPr>
+                      <a:r>
+                        <a:rPr lang="en-NZ" sz="1600" dirty="0"/>
+                        <a:t>Enter invalid – Program displays value error</a:t>
+                      </a:r>
+                    </a:p>
+                  </a:txBody>
+                  <a:tcPr marL="91425" marR="91425" marT="91425" marB="91425"/>
+                </a:tc>
+                <a:extLst>
+                  <a:ext uri="{0D108BD9-81ED-4DB2-BD59-A6C34878D82A}">
+                    <a16:rowId xmlns:a16="http://schemas.microsoft.com/office/drawing/2014/main" val="10001"/>
+                  </a:ext>
+                </a:extLst>
+              </a:tr>
+            </a:tbl>
+          </a:graphicData>
+        </a:graphic>
+      </p:graphicFrame>
+      <p:pic>
+        <p:nvPicPr>
+          <p:cNvPr id="2" name="Picture 3" descr="Text&#10;&#10;Description automatically generated">
+            <a:extLst>
+              <a:ext uri="{FF2B5EF4-FFF2-40B4-BE49-F238E27FC236}">
+                <a16:creationId xmlns:a16="http://schemas.microsoft.com/office/drawing/2014/main" id="{E111B32D-7F1B-D387-8E59-5C8AFC3AF5C5}"/>
+              </a:ext>
+            </a:extLst>
+          </p:cNvPr>
+          <p:cNvPicPr>
+            <a:picLocks noChangeAspect="1"/>
+          </p:cNvPicPr>
+          <p:nvPr/>
+        </p:nvPicPr>
+        <p:blipFill>
+          <a:blip r:embed="rId3"/>
+          <a:stretch>
+            <a:fillRect/>
+          </a:stretch>
+        </p:blipFill>
+        <p:spPr>
+          <a:xfrm>
+            <a:off x="376518" y="2615000"/>
+            <a:ext cx="2743200" cy="1742303"/>
+          </a:xfrm>
+          <a:prstGeom prst="rect">
+            <a:avLst/>
+          </a:prstGeom>
+        </p:spPr>
+      </p:pic>
+      <p:pic>
+        <p:nvPicPr>
+          <p:cNvPr id="4" name="Picture 4" descr="Text&#10;&#10;Description automatically generated">
+            <a:extLst>
+              <a:ext uri="{FF2B5EF4-FFF2-40B4-BE49-F238E27FC236}">
+                <a16:creationId xmlns:a16="http://schemas.microsoft.com/office/drawing/2014/main" id="{8170FDD6-077D-14D1-ADB7-673229001DC5}"/>
+              </a:ext>
+            </a:extLst>
+          </p:cNvPr>
+          <p:cNvPicPr>
+            <a:picLocks noChangeAspect="1"/>
+          </p:cNvPicPr>
+          <p:nvPr/>
+        </p:nvPicPr>
+        <p:blipFill>
+          <a:blip r:embed="rId4"/>
+          <a:stretch>
+            <a:fillRect/>
+          </a:stretch>
+        </p:blipFill>
+        <p:spPr>
+          <a:xfrm>
+            <a:off x="4639236" y="2614872"/>
+            <a:ext cx="4269440" cy="1224843"/>
+          </a:xfrm>
+          <a:prstGeom prst="rect">
+            <a:avLst/>
+          </a:prstGeom>
+        </p:spPr>
+      </p:pic>
+    </p:spTree>
+    <p:extLst>
+      <p:ext uri="{BB962C8B-B14F-4D97-AF65-F5344CB8AC3E}">
+        <p14:creationId xmlns:p14="http://schemas.microsoft.com/office/powerpoint/2010/main" val="1895178351"/>
+      </p:ext>
+    </p:extLst>
+  </p:cSld>
+  <p:clrMapOvr>
+    <a:masterClrMapping/>
+  </p:clrMapOvr>
+</p:sld>
+</file>
+
+<file path=ppt/slides/slide11.xml><?xml version="1.0" encoding="utf-8"?>
+<p:sld xmlns:a="http://schemas.openxmlformats.org/drawingml/2006/main" xmlns:r="http://schemas.openxmlformats.org/officeDocument/2006/relationships" xmlns:p="http://schemas.openxmlformats.org/presentationml/2006/main">
+  <p:cSld>
+    <p:spTree>
+      <p:nvGrpSpPr>
+        <p:cNvPr id="1" name="Shape 77"/>
+        <p:cNvGrpSpPr/>
+        <p:nvPr/>
+      </p:nvGrpSpPr>
+      <p:grpSpPr>
+        <a:xfrm>
+          <a:off x="0" y="0"/>
+          <a:ext cx="0" cy="0"/>
+          <a:chOff x="0" y="0"/>
+          <a:chExt cx="0" cy="0"/>
+        </a:xfrm>
+      </p:grpSpPr>
+      <p:sp>
+        <p:nvSpPr>
+          <p:cNvPr id="78" name="Google Shape;78;p17"/>
+          <p:cNvSpPr txBox="1">
+            <a:spLocks noGrp="1"/>
+          </p:cNvSpPr>
+          <p:nvPr>
+            <p:ph type="title"/>
+          </p:nvPr>
+        </p:nvSpPr>
+        <p:spPr>
+          <a:xfrm>
+            <a:off x="311700" y="445025"/>
+            <a:ext cx="8520600" cy="572700"/>
+          </a:xfrm>
+          <a:prstGeom prst="rect">
+            <a:avLst/>
+          </a:prstGeom>
+        </p:spPr>
+        <p:txBody>
+          <a:bodyPr spcFirstLastPara="1" wrap="square" lIns="91425" tIns="91425" rIns="91425" bIns="91425" anchor="t" anchorCtr="0">
+            <a:noAutofit/>
+          </a:bodyPr>
+          <a:lstStyle/>
+          <a:p>
+            <a:r>
+              <a:rPr lang="en" sz="2400"/>
+              <a:t>Component 2 Version 4 - Test Plan (?and screenshot)</a:t>
+            </a:r>
+            <a:endParaRPr sz="2400"/>
+          </a:p>
+        </p:txBody>
+      </p:sp>
+      <p:graphicFrame>
+        <p:nvGraphicFramePr>
+          <p:cNvPr id="79" name="Google Shape;79;p17"/>
+          <p:cNvGraphicFramePr/>
+          <p:nvPr>
+            <p:extLst>
+              <p:ext uri="{D42A27DB-BD31-4B8C-83A1-F6EECF244321}">
+                <p14:modId xmlns:p14="http://schemas.microsoft.com/office/powerpoint/2010/main" val="4042369035"/>
+              </p:ext>
+            </p:extLst>
+          </p:nvPr>
+        </p:nvGraphicFramePr>
+        <p:xfrm>
+          <a:off x="382475" y="1267725"/>
+          <a:ext cx="8520600" cy="1828740"/>
+        </p:xfrm>
+        <a:graphic>
+          <a:graphicData uri="http://schemas.openxmlformats.org/drawingml/2006/table">
+            <a:tbl>
+              <a:tblPr>
+                <a:noFill/>
+                <a:tableStyleId>{E1099E06-0E6B-448D-9D27-60429F06E6F4}</a:tableStyleId>
+              </a:tblPr>
+              <a:tblGrid>
+                <a:gridCol w="4260300">
+                  <a:extLst>
+                    <a:ext uri="{9D8B030D-6E8A-4147-A177-3AD203B41FA5}">
+                      <a16:colId xmlns:a16="http://schemas.microsoft.com/office/drawing/2014/main" val="20000"/>
+                    </a:ext>
+                  </a:extLst>
+                </a:gridCol>
+                <a:gridCol w="4260300">
+                  <a:extLst>
+                    <a:ext uri="{9D8B030D-6E8A-4147-A177-3AD203B41FA5}">
+                      <a16:colId xmlns:a16="http://schemas.microsoft.com/office/drawing/2014/main" val="20001"/>
+                    </a:ext>
+                  </a:extLst>
+                </a:gridCol>
+              </a:tblGrid>
+              <a:tr h="381000">
+                <a:tc>
+                  <a:txBody>
+                    <a:bodyPr/>
+                    <a:lstStyle/>
+                    <a:p>
+                      <a:pPr marL="0" lvl="0" indent="0" algn="l" rtl="0">
+                        <a:spcBef>
+                          <a:spcPts val="0"/>
+                        </a:spcBef>
+                        <a:spcAft>
+                          <a:spcPts val="0"/>
+                        </a:spcAft>
+                        <a:buNone/>
+                      </a:pPr>
+                      <a:r>
+                        <a:rPr lang="en" sz="1600" b="1" dirty="0"/>
+                        <a:t>Test Case</a:t>
+                      </a:r>
+                      <a:endParaRPr sz="1600" b="1"/>
+                    </a:p>
+                  </a:txBody>
+                  <a:tcPr marL="91425" marR="91425" marT="91425" marB="91425">
+                    <a:solidFill>
+                      <a:srgbClr val="CCCCCC"/>
+                    </a:solidFill>
+                  </a:tcPr>
+                </a:tc>
+                <a:tc>
+                  <a:txBody>
+                    <a:bodyPr/>
+                    <a:lstStyle/>
+                    <a:p>
+                      <a:pPr marL="0" lvl="0" indent="0" algn="l" rtl="0">
+                        <a:spcBef>
+                          <a:spcPts val="0"/>
+                        </a:spcBef>
+                        <a:spcAft>
+                          <a:spcPts val="0"/>
+                        </a:spcAft>
+                        <a:buNone/>
+                      </a:pPr>
+                      <a:r>
+                        <a:rPr lang="en" sz="1600" b="1" dirty="0"/>
+                        <a:t>Expected Values</a:t>
+                      </a:r>
+                      <a:endParaRPr sz="1600" b="1"/>
+                    </a:p>
+                  </a:txBody>
+                  <a:tcPr marL="91425" marR="91425" marT="91425" marB="91425">
+                    <a:solidFill>
+                      <a:srgbClr val="CCCCCC"/>
+                    </a:solidFill>
+                  </a:tcPr>
+                </a:tc>
+                <a:extLst>
+                  <a:ext uri="{0D108BD9-81ED-4DB2-BD59-A6C34878D82A}">
+                    <a16:rowId xmlns:a16="http://schemas.microsoft.com/office/drawing/2014/main" val="10000"/>
+                  </a:ext>
+                </a:extLst>
+              </a:tr>
+              <a:tr h="396200">
+                <a:tc>
+                  <a:txBody>
+                    <a:bodyPr/>
+                    <a:lstStyle/>
+                    <a:p>
+                      <a:pPr marL="0" lvl="0" indent="0" algn="l" rtl="0">
+                        <a:spcBef>
+                          <a:spcPts val="0"/>
+                        </a:spcBef>
+                        <a:spcAft>
+                          <a:spcPts val="0"/>
+                        </a:spcAft>
+                        <a:buNone/>
+                      </a:pPr>
+                      <a:r>
+                        <a:rPr lang="en-NZ" sz="1600" dirty="0"/>
+                        <a:t>Ran program</a:t>
+                      </a:r>
+                      <a:endParaRPr sz="1600"/>
+                    </a:p>
+                  </a:txBody>
+                  <a:tcPr marL="91425" marR="91425" marT="91425" marB="91425"/>
+                </a:tc>
+                <a:tc>
+                  <a:txBody>
+                    <a:bodyPr/>
+                    <a:lstStyle/>
+                    <a:p>
+                      <a:pPr marL="0" lvl="0" indent="0" algn="l" rtl="0">
+                        <a:spcBef>
+                          <a:spcPts val="0"/>
+                        </a:spcBef>
+                        <a:spcAft>
+                          <a:spcPts val="0"/>
+                        </a:spcAft>
+                        <a:buNone/>
+                      </a:pPr>
+                      <a:r>
+                        <a:rPr lang="en-NZ" sz="1600" dirty="0"/>
+                        <a:t>Entered 1 – Program prints pickup</a:t>
+                      </a:r>
+                    </a:p>
+                    <a:p>
+                      <a:pPr marL="0" lvl="0" indent="0" algn="l">
+                        <a:spcBef>
+                          <a:spcPts val="0"/>
+                        </a:spcBef>
+                        <a:spcAft>
+                          <a:spcPts val="0"/>
+                        </a:spcAft>
+                        <a:buNone/>
+                      </a:pPr>
+                      <a:r>
+                        <a:rPr lang="en-NZ" sz="1600" dirty="0"/>
+                        <a:t>Entered 2 – Program prints delivery</a:t>
+                      </a:r>
+                    </a:p>
+                    <a:p>
+                      <a:pPr marL="0" lvl="0" indent="0" algn="l">
+                        <a:spcBef>
+                          <a:spcPts val="0"/>
+                        </a:spcBef>
+                        <a:spcAft>
+                          <a:spcPts val="0"/>
+                        </a:spcAft>
+                        <a:buNone/>
+                      </a:pPr>
+                      <a:r>
+                        <a:rPr lang="en-NZ" sz="1600" dirty="0"/>
+                        <a:t>Enter invalid – Program displays value error</a:t>
+                      </a:r>
+                    </a:p>
+                    <a:p>
+                      <a:pPr marL="0" lvl="0" indent="0" algn="l">
+                        <a:spcBef>
+                          <a:spcPts val="0"/>
+                        </a:spcBef>
+                        <a:spcAft>
+                          <a:spcPts val="0"/>
+                        </a:spcAft>
+                        <a:buNone/>
+                      </a:pPr>
+                      <a:r>
+                        <a:rPr lang="en-NZ" sz="1600" dirty="0"/>
+                        <a:t>Enter number other than 1 or 2 does not work</a:t>
+                      </a:r>
+                    </a:p>
+                  </a:txBody>
+                  <a:tcPr marL="91425" marR="91425" marT="91425" marB="91425"/>
+                </a:tc>
+                <a:extLst>
+                  <a:ext uri="{0D108BD9-81ED-4DB2-BD59-A6C34878D82A}">
+                    <a16:rowId xmlns:a16="http://schemas.microsoft.com/office/drawing/2014/main" val="10001"/>
+                  </a:ext>
+                </a:extLst>
+              </a:tr>
+            </a:tbl>
+          </a:graphicData>
+        </a:graphic>
+      </p:graphicFrame>
+      <p:pic>
+        <p:nvPicPr>
+          <p:cNvPr id="3" name="Picture 4" descr="Text&#10;&#10;Description automatically generated">
+            <a:extLst>
+              <a:ext uri="{FF2B5EF4-FFF2-40B4-BE49-F238E27FC236}">
+                <a16:creationId xmlns:a16="http://schemas.microsoft.com/office/drawing/2014/main" id="{630A4DD1-33B3-7510-EC5A-DACE2FD914EC}"/>
+              </a:ext>
+            </a:extLst>
+          </p:cNvPr>
+          <p:cNvPicPr>
+            <a:picLocks noChangeAspect="1"/>
+          </p:cNvPicPr>
+          <p:nvPr/>
+        </p:nvPicPr>
+        <p:blipFill>
+          <a:blip r:embed="rId3"/>
+          <a:stretch>
+            <a:fillRect/>
+          </a:stretch>
+        </p:blipFill>
+        <p:spPr>
+          <a:xfrm>
+            <a:off x="383239" y="3090240"/>
+            <a:ext cx="2191872" cy="1901202"/>
+          </a:xfrm>
+          <a:prstGeom prst="rect">
+            <a:avLst/>
+          </a:prstGeom>
+        </p:spPr>
+      </p:pic>
+      <p:pic>
+        <p:nvPicPr>
+          <p:cNvPr id="5" name="Picture 5" descr="Text&#10;&#10;Description automatically generated">
+            <a:extLst>
+              <a:ext uri="{FF2B5EF4-FFF2-40B4-BE49-F238E27FC236}">
+                <a16:creationId xmlns:a16="http://schemas.microsoft.com/office/drawing/2014/main" id="{95025F67-1D2D-50FD-9EEE-C3F468056DE6}"/>
+              </a:ext>
+            </a:extLst>
+          </p:cNvPr>
+          <p:cNvPicPr>
+            <a:picLocks noChangeAspect="1"/>
+          </p:cNvPicPr>
+          <p:nvPr/>
+        </p:nvPicPr>
+        <p:blipFill>
+          <a:blip r:embed="rId4"/>
+          <a:stretch>
+            <a:fillRect/>
+          </a:stretch>
+        </p:blipFill>
+        <p:spPr>
+          <a:xfrm>
+            <a:off x="5318311" y="3090058"/>
+            <a:ext cx="3583642" cy="1928460"/>
+          </a:xfrm>
+          <a:prstGeom prst="rect">
+            <a:avLst/>
+          </a:prstGeom>
+        </p:spPr>
+      </p:pic>
+    </p:spTree>
+    <p:extLst>
+      <p:ext uri="{BB962C8B-B14F-4D97-AF65-F5344CB8AC3E}">
+        <p14:creationId xmlns:p14="http://schemas.microsoft.com/office/powerpoint/2010/main" val="2733379314"/>
+      </p:ext>
+    </p:extLst>
+  </p:cSld>
+  <p:clrMapOvr>
+    <a:masterClrMapping/>
+  </p:clrMapOvr>
+</p:sld>
+</file>
+
+<file path=ppt/slides/slide12.xml><?xml version="1.0" encoding="utf-8"?>
+<p:sld xmlns:a="http://schemas.openxmlformats.org/drawingml/2006/main" xmlns:r="http://schemas.openxmlformats.org/officeDocument/2006/relationships" xmlns:p="http://schemas.openxmlformats.org/presentationml/2006/main">
+  <p:cSld>
+    <p:spTree>
+      <p:nvGrpSpPr>
+        <p:cNvPr id="1" name="Shape 77"/>
+        <p:cNvGrpSpPr/>
+        <p:nvPr/>
+      </p:nvGrpSpPr>
+      <p:grpSpPr>
+        <a:xfrm>
+          <a:off x="0" y="0"/>
+          <a:ext cx="0" cy="0"/>
+          <a:chOff x="0" y="0"/>
+          <a:chExt cx="0" cy="0"/>
+        </a:xfrm>
+      </p:grpSpPr>
+      <p:sp>
+        <p:nvSpPr>
+          <p:cNvPr id="78" name="Google Shape;78;p17"/>
+          <p:cNvSpPr txBox="1">
+            <a:spLocks noGrp="1"/>
+          </p:cNvSpPr>
+          <p:nvPr>
+            <p:ph type="title"/>
+          </p:nvPr>
+        </p:nvSpPr>
+        <p:spPr>
+          <a:xfrm>
+            <a:off x="311700" y="445025"/>
+            <a:ext cx="8520600" cy="572700"/>
+          </a:xfrm>
+          <a:prstGeom prst="rect">
+            <a:avLst/>
+          </a:prstGeom>
+        </p:spPr>
+        <p:txBody>
+          <a:bodyPr spcFirstLastPara="1" wrap="square" lIns="91425" tIns="91425" rIns="91425" bIns="91425" anchor="t" anchorCtr="0">
+            <a:noAutofit/>
+          </a:bodyPr>
+          <a:lstStyle/>
+          <a:p>
+            <a:r>
+              <a:rPr lang="en" sz="2400" dirty="0"/>
+              <a:t>Component 2 Version 5 - Test Plan (?and screenshot)</a:t>
+            </a:r>
+            <a:endParaRPr sz="2400" dirty="0"/>
+          </a:p>
+        </p:txBody>
+      </p:sp>
+      <p:graphicFrame>
+        <p:nvGraphicFramePr>
+          <p:cNvPr id="79" name="Google Shape;79;p17"/>
+          <p:cNvGraphicFramePr/>
+          <p:nvPr>
+            <p:extLst>
+              <p:ext uri="{D42A27DB-BD31-4B8C-83A1-F6EECF244321}">
+                <p14:modId xmlns:p14="http://schemas.microsoft.com/office/powerpoint/2010/main" val="1851502474"/>
+              </p:ext>
+            </p:extLst>
+          </p:nvPr>
+        </p:nvGraphicFramePr>
+        <p:xfrm>
+          <a:off x="382475" y="1267725"/>
+          <a:ext cx="8520600" cy="1478250"/>
+        </p:xfrm>
+        <a:graphic>
+          <a:graphicData uri="http://schemas.openxmlformats.org/drawingml/2006/table">
+            <a:tbl>
+              <a:tblPr>
+                <a:noFill/>
+                <a:tableStyleId>{E1099E06-0E6B-448D-9D27-60429F06E6F4}</a:tableStyleId>
+              </a:tblPr>
+              <a:tblGrid>
+                <a:gridCol w="4260300">
+                  <a:extLst>
+                    <a:ext uri="{9D8B030D-6E8A-4147-A177-3AD203B41FA5}">
+                      <a16:colId xmlns:a16="http://schemas.microsoft.com/office/drawing/2014/main" val="20000"/>
+                    </a:ext>
+                  </a:extLst>
+                </a:gridCol>
+                <a:gridCol w="4260300">
+                  <a:extLst>
+                    <a:ext uri="{9D8B030D-6E8A-4147-A177-3AD203B41FA5}">
+                      <a16:colId xmlns:a16="http://schemas.microsoft.com/office/drawing/2014/main" val="20001"/>
+                    </a:ext>
+                  </a:extLst>
+                </a:gridCol>
+              </a:tblGrid>
+              <a:tr h="381000">
+                <a:tc>
+                  <a:txBody>
+                    <a:bodyPr/>
+                    <a:lstStyle/>
+                    <a:p>
+                      <a:pPr marL="0" lvl="0" indent="0" algn="l" rtl="0">
+                        <a:spcBef>
+                          <a:spcPts val="0"/>
+                        </a:spcBef>
+                        <a:spcAft>
+                          <a:spcPts val="0"/>
+                        </a:spcAft>
+                        <a:buNone/>
+                      </a:pPr>
+                      <a:r>
+                        <a:rPr lang="en" sz="1200" b="1" dirty="0"/>
+                        <a:t>Test Case</a:t>
+                      </a:r>
+                      <a:endParaRPr sz="1200" b="1"/>
+                    </a:p>
+                  </a:txBody>
+                  <a:tcPr marL="91425" marR="91425" marT="91425" marB="91425">
+                    <a:solidFill>
+                      <a:srgbClr val="CCCCCC"/>
+                    </a:solidFill>
+                  </a:tcPr>
+                </a:tc>
+                <a:tc>
+                  <a:txBody>
+                    <a:bodyPr/>
+                    <a:lstStyle/>
+                    <a:p>
+                      <a:pPr marL="0" lvl="0" indent="0" algn="l" rtl="0">
+                        <a:spcBef>
+                          <a:spcPts val="0"/>
+                        </a:spcBef>
+                        <a:spcAft>
+                          <a:spcPts val="0"/>
+                        </a:spcAft>
+                        <a:buNone/>
+                      </a:pPr>
+                      <a:r>
+                        <a:rPr lang="en" sz="1200" b="1" dirty="0"/>
+                        <a:t>Expected Values</a:t>
+                      </a:r>
+                      <a:endParaRPr sz="1200" b="1"/>
+                    </a:p>
+                  </a:txBody>
+                  <a:tcPr marL="91425" marR="91425" marT="91425" marB="91425">
+                    <a:solidFill>
+                      <a:srgbClr val="CCCCCC"/>
+                    </a:solidFill>
+                  </a:tcPr>
+                </a:tc>
+                <a:extLst>
+                  <a:ext uri="{0D108BD9-81ED-4DB2-BD59-A6C34878D82A}">
+                    <a16:rowId xmlns:a16="http://schemas.microsoft.com/office/drawing/2014/main" val="10000"/>
+                  </a:ext>
+                </a:extLst>
+              </a:tr>
+              <a:tr h="396200">
+                <a:tc>
+                  <a:txBody>
+                    <a:bodyPr/>
+                    <a:lstStyle/>
+                    <a:p>
+                      <a:pPr marL="0" lvl="0" indent="0" algn="l" rtl="0">
+                        <a:spcBef>
+                          <a:spcPts val="0"/>
+                        </a:spcBef>
+                        <a:spcAft>
+                          <a:spcPts val="0"/>
+                        </a:spcAft>
+                        <a:buNone/>
+                      </a:pPr>
+                      <a:r>
+                        <a:rPr lang="en-NZ" sz="1200" dirty="0"/>
+                        <a:t>Ran program</a:t>
+                      </a:r>
+                      <a:endParaRPr sz="1200"/>
+                    </a:p>
+                  </a:txBody>
+                  <a:tcPr marL="91425" marR="91425" marT="91425" marB="91425"/>
+                </a:tc>
+                <a:tc>
+                  <a:txBody>
+                    <a:bodyPr/>
+                    <a:lstStyle/>
+                    <a:p>
+                      <a:pPr marL="0" lvl="0" indent="0" algn="l" rtl="0">
+                        <a:spcBef>
+                          <a:spcPts val="0"/>
+                        </a:spcBef>
+                        <a:spcAft>
+                          <a:spcPts val="0"/>
+                        </a:spcAft>
+                        <a:buNone/>
+                      </a:pPr>
+                      <a:r>
+                        <a:rPr lang="en-NZ" sz="1200" dirty="0"/>
+                        <a:t>Entered 1 – Program prints pickup</a:t>
+                      </a:r>
+                    </a:p>
+                    <a:p>
+                      <a:pPr marL="0" lvl="0" indent="0" algn="l">
+                        <a:spcBef>
+                          <a:spcPts val="0"/>
+                        </a:spcBef>
+                        <a:spcAft>
+                          <a:spcPts val="0"/>
+                        </a:spcAft>
+                        <a:buNone/>
+                      </a:pPr>
+                      <a:r>
+                        <a:rPr lang="en-NZ" sz="1200" dirty="0"/>
+                        <a:t>Entered 2 – Program prints delivery</a:t>
+                      </a:r>
+                    </a:p>
+                    <a:p>
+                      <a:pPr marL="0" lvl="0" indent="0" algn="l">
+                        <a:spcBef>
+                          <a:spcPts val="0"/>
+                        </a:spcBef>
+                        <a:spcAft>
+                          <a:spcPts val="0"/>
+                        </a:spcAft>
+                        <a:buNone/>
+                      </a:pPr>
+                      <a:r>
+                        <a:rPr lang="en-NZ" sz="1200" dirty="0"/>
+                        <a:t>Enter invalid – Error message asks for input again</a:t>
+                      </a:r>
+                    </a:p>
+                    <a:p>
+                      <a:pPr marL="0" lvl="0" indent="0" algn="l">
+                        <a:spcBef>
+                          <a:spcPts val="0"/>
+                        </a:spcBef>
+                        <a:spcAft>
+                          <a:spcPts val="0"/>
+                        </a:spcAft>
+                        <a:buNone/>
+                      </a:pPr>
+                      <a:r>
+                        <a:rPr lang="en-NZ" sz="1200" dirty="0"/>
+                        <a:t>Enter number other than 1 or 2 – Error message asks for entry again</a:t>
+                      </a:r>
+                    </a:p>
+                  </a:txBody>
+                  <a:tcPr marL="91425" marR="91425" marT="91425" marB="91425"/>
+                </a:tc>
+                <a:extLst>
+                  <a:ext uri="{0D108BD9-81ED-4DB2-BD59-A6C34878D82A}">
+                    <a16:rowId xmlns:a16="http://schemas.microsoft.com/office/drawing/2014/main" val="10001"/>
+                  </a:ext>
+                </a:extLst>
+              </a:tr>
+            </a:tbl>
+          </a:graphicData>
+        </a:graphic>
+      </p:graphicFrame>
+      <p:pic>
+        <p:nvPicPr>
+          <p:cNvPr id="2" name="Picture 3" descr="Text&#10;&#10;Description automatically generated">
+            <a:extLst>
+              <a:ext uri="{FF2B5EF4-FFF2-40B4-BE49-F238E27FC236}">
+                <a16:creationId xmlns:a16="http://schemas.microsoft.com/office/drawing/2014/main" id="{84AF239A-D08F-17B1-41A6-F5C4EFBB0DC4}"/>
+              </a:ext>
+            </a:extLst>
+          </p:cNvPr>
+          <p:cNvPicPr>
+            <a:picLocks noChangeAspect="1"/>
+          </p:cNvPicPr>
+          <p:nvPr/>
+        </p:nvPicPr>
+        <p:blipFill>
+          <a:blip r:embed="rId3"/>
+          <a:stretch>
+            <a:fillRect/>
+          </a:stretch>
+        </p:blipFill>
+        <p:spPr>
+          <a:xfrm>
+            <a:off x="6158753" y="2743113"/>
+            <a:ext cx="2743200" cy="1217132"/>
+          </a:xfrm>
+          <a:prstGeom prst="rect">
+            <a:avLst/>
+          </a:prstGeom>
+        </p:spPr>
+      </p:pic>
+      <p:pic>
+        <p:nvPicPr>
+          <p:cNvPr id="4" name="Picture 5" descr="Text&#10;&#10;Description automatically generated">
+            <a:extLst>
+              <a:ext uri="{FF2B5EF4-FFF2-40B4-BE49-F238E27FC236}">
+                <a16:creationId xmlns:a16="http://schemas.microsoft.com/office/drawing/2014/main" id="{08C31B73-1401-DDE5-34CB-6AF67AC68CB1}"/>
+              </a:ext>
+            </a:extLst>
+          </p:cNvPr>
+          <p:cNvPicPr>
+            <a:picLocks noChangeAspect="1"/>
+          </p:cNvPicPr>
+          <p:nvPr/>
+        </p:nvPicPr>
+        <p:blipFill>
+          <a:blip r:embed="rId4"/>
+          <a:stretch>
+            <a:fillRect/>
+          </a:stretch>
+        </p:blipFill>
+        <p:spPr>
+          <a:xfrm>
+            <a:off x="6293223" y="3957308"/>
+            <a:ext cx="2608730" cy="1121807"/>
+          </a:xfrm>
+          <a:prstGeom prst="rect">
+            <a:avLst/>
+          </a:prstGeom>
+        </p:spPr>
+      </p:pic>
+      <p:pic>
+        <p:nvPicPr>
+          <p:cNvPr id="7" name="Picture 7" descr="Text&#10;&#10;Description automatically generated">
+            <a:extLst>
+              <a:ext uri="{FF2B5EF4-FFF2-40B4-BE49-F238E27FC236}">
+                <a16:creationId xmlns:a16="http://schemas.microsoft.com/office/drawing/2014/main" id="{B4792892-6EFA-2BA5-7627-E67A76F70801}"/>
+              </a:ext>
+            </a:extLst>
+          </p:cNvPr>
+          <p:cNvPicPr>
+            <a:picLocks noChangeAspect="1"/>
+          </p:cNvPicPr>
+          <p:nvPr/>
+        </p:nvPicPr>
+        <p:blipFill>
+          <a:blip r:embed="rId5"/>
+          <a:stretch>
+            <a:fillRect/>
+          </a:stretch>
+        </p:blipFill>
+        <p:spPr>
+          <a:xfrm>
+            <a:off x="376517" y="2741986"/>
+            <a:ext cx="2407024" cy="2180853"/>
+          </a:xfrm>
+          <a:prstGeom prst="rect">
+            <a:avLst/>
+          </a:prstGeom>
+        </p:spPr>
+      </p:pic>
+    </p:spTree>
+    <p:extLst>
+      <p:ext uri="{BB962C8B-B14F-4D97-AF65-F5344CB8AC3E}">
+        <p14:creationId xmlns:p14="http://schemas.microsoft.com/office/powerpoint/2010/main" val="2208231927"/>
+      </p:ext>
+    </p:extLst>
+  </p:cSld>
+  <p:clrMapOvr>
+    <a:masterClrMapping/>
+  </p:clrMapOvr>
+</p:sld>
+</file>
+
+<file path=ppt/slides/slide13.xml><?xml version="1.0" encoding="utf-8"?>
+<p:sld xmlns:a="http://schemas.openxmlformats.org/drawingml/2006/main" xmlns:r="http://schemas.openxmlformats.org/officeDocument/2006/relationships" xmlns:p="http://schemas.openxmlformats.org/presentationml/2006/main">
+  <p:cSld>
+    <p:bg>
+      <p:bgPr>
+        <a:solidFill>
+          <a:srgbClr val="D9EAD3"/>
+        </a:solidFill>
+        <a:effectLst/>
+      </p:bgPr>
+    </p:bg>
+    <p:spTree>
+      <p:nvGrpSpPr>
+        <p:cNvPr id="1" name="Shape 83"/>
+        <p:cNvGrpSpPr/>
+        <p:nvPr/>
+      </p:nvGrpSpPr>
+      <p:grpSpPr>
+        <a:xfrm>
+          <a:off x="0" y="0"/>
+          <a:ext cx="0" cy="0"/>
+          <a:chOff x="0" y="0"/>
+          <a:chExt cx="0" cy="0"/>
+        </a:xfrm>
+      </p:grpSpPr>
+      <p:sp>
+        <p:nvSpPr>
+          <p:cNvPr id="84" name="Google Shape;84;p18"/>
+          <p:cNvSpPr txBox="1">
+            <a:spLocks noGrp="1"/>
+          </p:cNvSpPr>
+          <p:nvPr>
+            <p:ph type="title"/>
+          </p:nvPr>
+        </p:nvSpPr>
+        <p:spPr>
+          <a:xfrm>
+            <a:off x="311700" y="445025"/>
+            <a:ext cx="8520600" cy="572700"/>
+          </a:xfrm>
+          <a:prstGeom prst="rect">
+            <a:avLst/>
+          </a:prstGeom>
+        </p:spPr>
+        <p:txBody>
+          <a:bodyPr spcFirstLastPara="1" wrap="square" lIns="91425" tIns="91425" rIns="91425" bIns="91425" anchor="t" anchorCtr="0">
+            <a:noAutofit/>
+          </a:bodyPr>
+          <a:lstStyle/>
+          <a:p>
+            <a:pPr marL="0" lvl="0" indent="0" algn="l" rtl="0">
+              <a:spcBef>
+                <a:spcPts val="0"/>
+              </a:spcBef>
+              <a:spcAft>
+                <a:spcPts val="0"/>
+              </a:spcAft>
+              <a:buNone/>
+            </a:pPr>
+            <a:r>
+              <a:rPr lang="en"/>
+              <a:t>Version Control Evidence</a:t>
+            </a:r>
+            <a:endParaRPr/>
+          </a:p>
+        </p:txBody>
+      </p:sp>
+      <p:sp>
+        <p:nvSpPr>
+          <p:cNvPr id="85" name="Google Shape;85;p18"/>
+          <p:cNvSpPr txBox="1">
+            <a:spLocks noGrp="1"/>
+          </p:cNvSpPr>
+          <p:nvPr>
+            <p:ph type="body" idx="1"/>
+          </p:nvPr>
+        </p:nvSpPr>
+        <p:spPr>
+          <a:xfrm>
+            <a:off x="311700" y="1152475"/>
+            <a:ext cx="8464200" cy="3739200"/>
+          </a:xfrm>
+          <a:prstGeom prst="rect">
+            <a:avLst/>
+          </a:prstGeom>
+        </p:spPr>
+        <p:txBody>
+          <a:bodyPr spcFirstLastPara="1" wrap="square" lIns="91425" tIns="91425" rIns="91425" bIns="91425" anchor="t" anchorCtr="0">
+            <a:noAutofit/>
+          </a:bodyPr>
+          <a:lstStyle/>
+          <a:p>
+            <a:pPr marL="0" lvl="0" indent="0" algn="l" rtl="0">
+              <a:spcBef>
+                <a:spcPts val="0"/>
+              </a:spcBef>
+              <a:spcAft>
+                <a:spcPts val="1600"/>
+              </a:spcAft>
+              <a:buNone/>
+            </a:pPr>
+            <a:r>
+              <a:rPr lang="en" i="1"/>
+              <a:t>Your version control evidence should go here.  This could be in the form of annotated screenshots which show you you managed this process or you could make a brief screencast explaining how you implemented version control.</a:t>
+            </a:r>
+            <a:endParaRPr i="1"/>
+          </a:p>
+        </p:txBody>
+      </p:sp>
+    </p:spTree>
+  </p:cSld>
+  <p:clrMapOvr>
+    <a:masterClrMapping/>
+  </p:clrMapOvr>
+</p:sld>
+</file>
+
+<file path=ppt/slides/slide14.xml><?xml version="1.0" encoding="utf-8"?>
+<p:sld xmlns:a="http://schemas.openxmlformats.org/drawingml/2006/main" xmlns:r="http://schemas.openxmlformats.org/officeDocument/2006/relationships" xmlns:p="http://schemas.openxmlformats.org/presentationml/2006/main">
+  <p:cSld>
+    <p:bg>
+      <p:bgPr>
+        <a:solidFill>
+          <a:srgbClr val="FFE599"/>
+        </a:solidFill>
+        <a:effectLst/>
+      </p:bgPr>
+    </p:bg>
+    <p:spTree>
+      <p:nvGrpSpPr>
+        <p:cNvPr id="1" name="Shape 89"/>
+        <p:cNvGrpSpPr/>
+        <p:nvPr/>
+      </p:nvGrpSpPr>
+      <p:grpSpPr>
+        <a:xfrm>
+          <a:off x="0" y="0"/>
+          <a:ext cx="0" cy="0"/>
+          <a:chOff x="0" y="0"/>
+          <a:chExt cx="0" cy="0"/>
+        </a:xfrm>
+      </p:grpSpPr>
+      <p:sp>
+        <p:nvSpPr>
+          <p:cNvPr id="90" name="Google Shape;90;p19"/>
+          <p:cNvSpPr txBox="1">
+            <a:spLocks noGrp="1"/>
+          </p:cNvSpPr>
+          <p:nvPr>
+            <p:ph type="body" idx="1"/>
+          </p:nvPr>
+        </p:nvSpPr>
+        <p:spPr>
+          <a:xfrm>
+            <a:off x="311700" y="397700"/>
+            <a:ext cx="8520600" cy="4171200"/>
+          </a:xfrm>
+          <a:prstGeom prst="rect">
+            <a:avLst/>
+          </a:prstGeom>
+        </p:spPr>
+        <p:txBody>
+          <a:bodyPr spcFirstLastPara="1" wrap="square" lIns="91425" tIns="91425" rIns="91425" bIns="91425" anchor="t" anchorCtr="0">
+            <a:noAutofit/>
+          </a:bodyPr>
+          <a:lstStyle/>
+          <a:p>
+            <a:pPr marL="0" lvl="0" indent="0" algn="l" rtl="0">
+              <a:spcBef>
+                <a:spcPts val="0"/>
+              </a:spcBef>
+              <a:spcAft>
+                <a:spcPts val="1600"/>
+              </a:spcAft>
+              <a:buNone/>
+            </a:pPr>
+            <a:r>
+              <a:rPr lang="en" b="1" i="1">
+                <a:solidFill>
+                  <a:srgbClr val="595959"/>
+                </a:solidFill>
+              </a:rPr>
+              <a:t>Discusses how the information from planning, testing and trialling of components assisted in the development of a high-quality outcome</a:t>
+            </a:r>
+            <a:endParaRPr/>
+          </a:p>
+        </p:txBody>
+      </p:sp>
+    </p:spTree>
+  </p:cSld>
+  <p:clrMapOvr>
+    <a:masterClrMapping/>
+  </p:clrMapOvr>
+</p:sld>
+</file>
+
 <file path=ppt/slides/slide2.xml><?xml version="1.0" encoding="utf-8"?>
 <p:sld xmlns:a="http://schemas.openxmlformats.org/drawingml/2006/main" xmlns:r="http://schemas.openxmlformats.org/officeDocument/2006/relationships" xmlns:p="http://schemas.openxmlformats.org/presentationml/2006/main">
   <p:cSld>
@@ -7864,20 +10078,11 @@
           </a:bodyPr>
           <a:lstStyle/>
           <a:p>
-            <a:pPr marL="0" lvl="0" indent="0" algn="l" rtl="0">
-              <a:spcBef>
-                <a:spcPts val="0"/>
-              </a:spcBef>
-              <a:spcAft>
-                <a:spcPts val="0"/>
-              </a:spcAft>
-              <a:buNone/>
-            </a:pPr>
             <a:r>
-              <a:rPr lang="en"/>
-              <a:t>Component 1 - Test Plan (?and screenshot)</a:t>
+              <a:rPr lang="en" sz="2400" dirty="0"/>
+              <a:t>Component 1 Version 1 - Test Plan (?and screenshot)</a:t>
             </a:r>
-            <a:endParaRPr/>
+            <a:endParaRPr sz="2400" dirty="0"/>
           </a:p>
         </p:txBody>
       </p:sp>
@@ -8152,20 +10357,11 @@
           </a:bodyPr>
           <a:lstStyle/>
           <a:p>
-            <a:pPr marL="0" lvl="0" indent="0" algn="l" rtl="0">
-              <a:spcBef>
-                <a:spcPts val="0"/>
-              </a:spcBef>
-              <a:spcAft>
-                <a:spcPts val="0"/>
-              </a:spcAft>
-              <a:buNone/>
-            </a:pPr>
             <a:r>
-              <a:rPr lang="en" dirty="0"/>
-              <a:t>Component 2 - Test Plan (?and screenshot)</a:t>
+              <a:rPr lang="en" sz="2400" dirty="0"/>
+              <a:t>Component 1 Version 2 - Test Plan (?and screenshot)</a:t>
             </a:r>
-            <a:endParaRPr dirty="0"/>
+            <a:endParaRPr sz="2400" dirty="0"/>
           </a:p>
         </p:txBody>
       </p:sp>
@@ -8426,7 +10622,7 @@
     </p:bg>
     <p:spTree>
       <p:nvGrpSpPr>
-        <p:cNvPr id="1" name="Shape 83"/>
+        <p:cNvPr id="1" name="Shape 72"/>
         <p:cNvGrpSpPr/>
         <p:nvPr/>
       </p:nvGrpSpPr>
@@ -8440,7 +10636,7 @@
       </p:grpSpPr>
       <p:sp>
         <p:nvSpPr>
-          <p:cNvPr id="84" name="Google Shape;84;p18"/>
+          <p:cNvPr id="73" name="Google Shape;73;p16"/>
           <p:cNvSpPr txBox="1">
             <a:spLocks noGrp="1"/>
           </p:cNvSpPr>
@@ -8473,56 +10669,623 @@
               <a:buNone/>
             </a:pPr>
             <a:r>
-              <a:rPr lang="en"/>
-              <a:t>Version Control Evidence</a:t>
+              <a:rPr lang="en" dirty="0"/>
+              <a:t>Component 2 (Trello screenshot)</a:t>
             </a:r>
-            <a:endParaRPr/>
+            <a:endParaRPr dirty="0"/>
           </a:p>
         </p:txBody>
       </p:sp>
       <p:sp>
         <p:nvSpPr>
-          <p:cNvPr id="85" name="Google Shape;85;p18"/>
+          <p:cNvPr id="5" name="Google Shape;73;p16">
+            <a:extLst>
+              <a:ext uri="{FF2B5EF4-FFF2-40B4-BE49-F238E27FC236}">
+                <a16:creationId xmlns:a16="http://schemas.microsoft.com/office/drawing/2014/main" id="{F4590D88-8B1B-4158-D9CE-82EB2D2CF941}"/>
+              </a:ext>
+            </a:extLst>
+          </p:cNvPr>
           <p:cNvSpPr txBox="1">
-            <a:spLocks noGrp="1"/>
+            <a:spLocks/>
           </p:cNvSpPr>
-          <p:nvPr>
-            <p:ph type="body" idx="1"/>
-          </p:nvPr>
+          <p:nvPr/>
         </p:nvSpPr>
         <p:spPr>
           <a:xfrm>
-            <a:off x="311700" y="1152475"/>
-            <a:ext cx="8464200" cy="3739200"/>
+            <a:off x="176" y="1639572"/>
+            <a:ext cx="4479760" cy="592870"/>
+          </a:xfrm>
+          <a:prstGeom prst="rect">
+            <a:avLst/>
+          </a:prstGeom>
+          <a:noFill/>
+          <a:ln>
+            <a:noFill/>
+          </a:ln>
+        </p:spPr>
+        <p:txBody>
+          <a:bodyPr spcFirstLastPara="1" wrap="square" lIns="91425" tIns="91425" rIns="91425" bIns="91425" anchor="t" anchorCtr="0">
+            <a:noAutofit/>
+          </a:bodyPr>
+          <a:lstStyle>
+            <a:defPPr marR="0" lvl="0" algn="l" rtl="0">
+              <a:lnSpc>
+                <a:spcPct val="100000"/>
+              </a:lnSpc>
+              <a:spcBef>
+                <a:spcPts val="0"/>
+              </a:spcBef>
+              <a:spcAft>
+                <a:spcPts val="0"/>
+              </a:spcAft>
+            </a:defPPr>
+            <a:lvl1pPr marR="0" lvl="0" algn="l" rtl="0">
+              <a:lnSpc>
+                <a:spcPct val="100000"/>
+              </a:lnSpc>
+              <a:spcBef>
+                <a:spcPts val="0"/>
+              </a:spcBef>
+              <a:spcAft>
+                <a:spcPts val="0"/>
+              </a:spcAft>
+              <a:buClr>
+                <a:schemeClr val="dk1"/>
+              </a:buClr>
+              <a:buSzPts val="2800"/>
+              <a:buFont typeface="Arial"/>
+              <a:buNone/>
+              <a:defRPr sz="2800" b="0" i="0" u="none" strike="noStrike" cap="none">
+                <a:solidFill>
+                  <a:schemeClr val="dk1"/>
+                </a:solidFill>
+                <a:latin typeface="Arial"/>
+                <a:ea typeface="Arial"/>
+                <a:cs typeface="Arial"/>
+                <a:sym typeface="Arial"/>
+              </a:defRPr>
+            </a:lvl1pPr>
+            <a:lvl2pPr marR="0" lvl="1" algn="l" rtl="0">
+              <a:lnSpc>
+                <a:spcPct val="100000"/>
+              </a:lnSpc>
+              <a:spcBef>
+                <a:spcPts val="0"/>
+              </a:spcBef>
+              <a:spcAft>
+                <a:spcPts val="0"/>
+              </a:spcAft>
+              <a:buClr>
+                <a:schemeClr val="dk1"/>
+              </a:buClr>
+              <a:buSzPts val="2800"/>
+              <a:buFont typeface="Arial"/>
+              <a:buNone/>
+              <a:defRPr sz="2800" b="0" i="0" u="none" strike="noStrike" cap="none">
+                <a:solidFill>
+                  <a:schemeClr val="dk1"/>
+                </a:solidFill>
+                <a:latin typeface="Arial"/>
+                <a:ea typeface="Arial"/>
+                <a:cs typeface="Arial"/>
+                <a:sym typeface="Arial"/>
+              </a:defRPr>
+            </a:lvl2pPr>
+            <a:lvl3pPr marR="0" lvl="2" algn="l" rtl="0">
+              <a:lnSpc>
+                <a:spcPct val="100000"/>
+              </a:lnSpc>
+              <a:spcBef>
+                <a:spcPts val="0"/>
+              </a:spcBef>
+              <a:spcAft>
+                <a:spcPts val="0"/>
+              </a:spcAft>
+              <a:buClr>
+                <a:schemeClr val="dk1"/>
+              </a:buClr>
+              <a:buSzPts val="2800"/>
+              <a:buFont typeface="Arial"/>
+              <a:buNone/>
+              <a:defRPr sz="2800" b="0" i="0" u="none" strike="noStrike" cap="none">
+                <a:solidFill>
+                  <a:schemeClr val="dk1"/>
+                </a:solidFill>
+                <a:latin typeface="Arial"/>
+                <a:ea typeface="Arial"/>
+                <a:cs typeface="Arial"/>
+                <a:sym typeface="Arial"/>
+              </a:defRPr>
+            </a:lvl3pPr>
+            <a:lvl4pPr marR="0" lvl="3" algn="l" rtl="0">
+              <a:lnSpc>
+                <a:spcPct val="100000"/>
+              </a:lnSpc>
+              <a:spcBef>
+                <a:spcPts val="0"/>
+              </a:spcBef>
+              <a:spcAft>
+                <a:spcPts val="0"/>
+              </a:spcAft>
+              <a:buClr>
+                <a:schemeClr val="dk1"/>
+              </a:buClr>
+              <a:buSzPts val="2800"/>
+              <a:buFont typeface="Arial"/>
+              <a:buNone/>
+              <a:defRPr sz="2800" b="0" i="0" u="none" strike="noStrike" cap="none">
+                <a:solidFill>
+                  <a:schemeClr val="dk1"/>
+                </a:solidFill>
+                <a:latin typeface="Arial"/>
+                <a:ea typeface="Arial"/>
+                <a:cs typeface="Arial"/>
+                <a:sym typeface="Arial"/>
+              </a:defRPr>
+            </a:lvl4pPr>
+            <a:lvl5pPr marR="0" lvl="4" algn="l" rtl="0">
+              <a:lnSpc>
+                <a:spcPct val="100000"/>
+              </a:lnSpc>
+              <a:spcBef>
+                <a:spcPts val="0"/>
+              </a:spcBef>
+              <a:spcAft>
+                <a:spcPts val="0"/>
+              </a:spcAft>
+              <a:buClr>
+                <a:schemeClr val="dk1"/>
+              </a:buClr>
+              <a:buSzPts val="2800"/>
+              <a:buFont typeface="Arial"/>
+              <a:buNone/>
+              <a:defRPr sz="2800" b="0" i="0" u="none" strike="noStrike" cap="none">
+                <a:solidFill>
+                  <a:schemeClr val="dk1"/>
+                </a:solidFill>
+                <a:latin typeface="Arial"/>
+                <a:ea typeface="Arial"/>
+                <a:cs typeface="Arial"/>
+                <a:sym typeface="Arial"/>
+              </a:defRPr>
+            </a:lvl5pPr>
+            <a:lvl6pPr marR="0" lvl="5" algn="l" rtl="0">
+              <a:lnSpc>
+                <a:spcPct val="100000"/>
+              </a:lnSpc>
+              <a:spcBef>
+                <a:spcPts val="0"/>
+              </a:spcBef>
+              <a:spcAft>
+                <a:spcPts val="0"/>
+              </a:spcAft>
+              <a:buClr>
+                <a:schemeClr val="dk1"/>
+              </a:buClr>
+              <a:buSzPts val="2800"/>
+              <a:buFont typeface="Arial"/>
+              <a:buNone/>
+              <a:defRPr sz="2800" b="0" i="0" u="none" strike="noStrike" cap="none">
+                <a:solidFill>
+                  <a:schemeClr val="dk1"/>
+                </a:solidFill>
+                <a:latin typeface="Arial"/>
+                <a:ea typeface="Arial"/>
+                <a:cs typeface="Arial"/>
+                <a:sym typeface="Arial"/>
+              </a:defRPr>
+            </a:lvl6pPr>
+            <a:lvl7pPr marR="0" lvl="6" algn="l" rtl="0">
+              <a:lnSpc>
+                <a:spcPct val="100000"/>
+              </a:lnSpc>
+              <a:spcBef>
+                <a:spcPts val="0"/>
+              </a:spcBef>
+              <a:spcAft>
+                <a:spcPts val="0"/>
+              </a:spcAft>
+              <a:buClr>
+                <a:schemeClr val="dk1"/>
+              </a:buClr>
+              <a:buSzPts val="2800"/>
+              <a:buFont typeface="Arial"/>
+              <a:buNone/>
+              <a:defRPr sz="2800" b="0" i="0" u="none" strike="noStrike" cap="none">
+                <a:solidFill>
+                  <a:schemeClr val="dk1"/>
+                </a:solidFill>
+                <a:latin typeface="Arial"/>
+                <a:ea typeface="Arial"/>
+                <a:cs typeface="Arial"/>
+                <a:sym typeface="Arial"/>
+              </a:defRPr>
+            </a:lvl7pPr>
+            <a:lvl8pPr marR="0" lvl="7" algn="l" rtl="0">
+              <a:lnSpc>
+                <a:spcPct val="100000"/>
+              </a:lnSpc>
+              <a:spcBef>
+                <a:spcPts val="0"/>
+              </a:spcBef>
+              <a:spcAft>
+                <a:spcPts val="0"/>
+              </a:spcAft>
+              <a:buClr>
+                <a:schemeClr val="dk1"/>
+              </a:buClr>
+              <a:buSzPts val="2800"/>
+              <a:buFont typeface="Arial"/>
+              <a:buNone/>
+              <a:defRPr sz="2800" b="0" i="0" u="none" strike="noStrike" cap="none">
+                <a:solidFill>
+                  <a:schemeClr val="dk1"/>
+                </a:solidFill>
+                <a:latin typeface="Arial"/>
+                <a:ea typeface="Arial"/>
+                <a:cs typeface="Arial"/>
+                <a:sym typeface="Arial"/>
+              </a:defRPr>
+            </a:lvl8pPr>
+            <a:lvl9pPr marR="0" lvl="8" algn="l" rtl="0">
+              <a:lnSpc>
+                <a:spcPct val="100000"/>
+              </a:lnSpc>
+              <a:spcBef>
+                <a:spcPts val="0"/>
+              </a:spcBef>
+              <a:spcAft>
+                <a:spcPts val="0"/>
+              </a:spcAft>
+              <a:buClr>
+                <a:schemeClr val="dk1"/>
+              </a:buClr>
+              <a:buSzPts val="2800"/>
+              <a:buFont typeface="Arial"/>
+              <a:buNone/>
+              <a:defRPr sz="2800" b="0" i="0" u="none" strike="noStrike" cap="none">
+                <a:solidFill>
+                  <a:schemeClr val="dk1"/>
+                </a:solidFill>
+                <a:latin typeface="Arial"/>
+                <a:ea typeface="Arial"/>
+                <a:cs typeface="Arial"/>
+                <a:sym typeface="Arial"/>
+              </a:defRPr>
+            </a:lvl9pPr>
+          </a:lstStyle>
+          <a:p>
+            <a:pPr algn="ctr"/>
+            <a:r>
+              <a:rPr lang="en-US" dirty="0"/>
+              <a:t>Version 1</a:t>
+            </a:r>
+          </a:p>
+        </p:txBody>
+      </p:sp>
+      <p:sp>
+        <p:nvSpPr>
+          <p:cNvPr id="6" name="Google Shape;73;p16">
+            <a:extLst>
+              <a:ext uri="{FF2B5EF4-FFF2-40B4-BE49-F238E27FC236}">
+                <a16:creationId xmlns:a16="http://schemas.microsoft.com/office/drawing/2014/main" id="{B81B67BB-87B6-A245-D23C-2B334DEC1CF7}"/>
+              </a:ext>
+            </a:extLst>
+          </p:cNvPr>
+          <p:cNvSpPr txBox="1">
+            <a:spLocks/>
+          </p:cNvSpPr>
+          <p:nvPr/>
+        </p:nvSpPr>
+        <p:spPr>
+          <a:xfrm>
+            <a:off x="5163846" y="1639572"/>
+            <a:ext cx="3982219" cy="592870"/>
+          </a:xfrm>
+          <a:prstGeom prst="rect">
+            <a:avLst/>
+          </a:prstGeom>
+          <a:noFill/>
+          <a:ln>
+            <a:noFill/>
+          </a:ln>
+        </p:spPr>
+        <p:txBody>
+          <a:bodyPr spcFirstLastPara="1" wrap="square" lIns="91425" tIns="91425" rIns="91425" bIns="91425" anchor="t" anchorCtr="0">
+            <a:noAutofit/>
+          </a:bodyPr>
+          <a:lstStyle>
+            <a:defPPr marR="0" lvl="0" algn="l" rtl="0">
+              <a:lnSpc>
+                <a:spcPct val="100000"/>
+              </a:lnSpc>
+              <a:spcBef>
+                <a:spcPts val="0"/>
+              </a:spcBef>
+              <a:spcAft>
+                <a:spcPts val="0"/>
+              </a:spcAft>
+            </a:defPPr>
+            <a:lvl1pPr marR="0" lvl="0" algn="l" rtl="0">
+              <a:lnSpc>
+                <a:spcPct val="100000"/>
+              </a:lnSpc>
+              <a:spcBef>
+                <a:spcPts val="0"/>
+              </a:spcBef>
+              <a:spcAft>
+                <a:spcPts val="0"/>
+              </a:spcAft>
+              <a:buClr>
+                <a:schemeClr val="dk1"/>
+              </a:buClr>
+              <a:buSzPts val="2800"/>
+              <a:buFont typeface="Arial"/>
+              <a:buNone/>
+              <a:defRPr sz="2800" b="0" i="0" u="none" strike="noStrike" cap="none">
+                <a:solidFill>
+                  <a:schemeClr val="dk1"/>
+                </a:solidFill>
+                <a:latin typeface="Arial"/>
+                <a:ea typeface="Arial"/>
+                <a:cs typeface="Arial"/>
+                <a:sym typeface="Arial"/>
+              </a:defRPr>
+            </a:lvl1pPr>
+            <a:lvl2pPr marR="0" lvl="1" algn="l" rtl="0">
+              <a:lnSpc>
+                <a:spcPct val="100000"/>
+              </a:lnSpc>
+              <a:spcBef>
+                <a:spcPts val="0"/>
+              </a:spcBef>
+              <a:spcAft>
+                <a:spcPts val="0"/>
+              </a:spcAft>
+              <a:buClr>
+                <a:schemeClr val="dk1"/>
+              </a:buClr>
+              <a:buSzPts val="2800"/>
+              <a:buFont typeface="Arial"/>
+              <a:buNone/>
+              <a:defRPr sz="2800" b="0" i="0" u="none" strike="noStrike" cap="none">
+                <a:solidFill>
+                  <a:schemeClr val="dk1"/>
+                </a:solidFill>
+                <a:latin typeface="Arial"/>
+                <a:ea typeface="Arial"/>
+                <a:cs typeface="Arial"/>
+                <a:sym typeface="Arial"/>
+              </a:defRPr>
+            </a:lvl2pPr>
+            <a:lvl3pPr marR="0" lvl="2" algn="l" rtl="0">
+              <a:lnSpc>
+                <a:spcPct val="100000"/>
+              </a:lnSpc>
+              <a:spcBef>
+                <a:spcPts val="0"/>
+              </a:spcBef>
+              <a:spcAft>
+                <a:spcPts val="0"/>
+              </a:spcAft>
+              <a:buClr>
+                <a:schemeClr val="dk1"/>
+              </a:buClr>
+              <a:buSzPts val="2800"/>
+              <a:buFont typeface="Arial"/>
+              <a:buNone/>
+              <a:defRPr sz="2800" b="0" i="0" u="none" strike="noStrike" cap="none">
+                <a:solidFill>
+                  <a:schemeClr val="dk1"/>
+                </a:solidFill>
+                <a:latin typeface="Arial"/>
+                <a:ea typeface="Arial"/>
+                <a:cs typeface="Arial"/>
+                <a:sym typeface="Arial"/>
+              </a:defRPr>
+            </a:lvl3pPr>
+            <a:lvl4pPr marR="0" lvl="3" algn="l" rtl="0">
+              <a:lnSpc>
+                <a:spcPct val="100000"/>
+              </a:lnSpc>
+              <a:spcBef>
+                <a:spcPts val="0"/>
+              </a:spcBef>
+              <a:spcAft>
+                <a:spcPts val="0"/>
+              </a:spcAft>
+              <a:buClr>
+                <a:schemeClr val="dk1"/>
+              </a:buClr>
+              <a:buSzPts val="2800"/>
+              <a:buFont typeface="Arial"/>
+              <a:buNone/>
+              <a:defRPr sz="2800" b="0" i="0" u="none" strike="noStrike" cap="none">
+                <a:solidFill>
+                  <a:schemeClr val="dk1"/>
+                </a:solidFill>
+                <a:latin typeface="Arial"/>
+                <a:ea typeface="Arial"/>
+                <a:cs typeface="Arial"/>
+                <a:sym typeface="Arial"/>
+              </a:defRPr>
+            </a:lvl4pPr>
+            <a:lvl5pPr marR="0" lvl="4" algn="l" rtl="0">
+              <a:lnSpc>
+                <a:spcPct val="100000"/>
+              </a:lnSpc>
+              <a:spcBef>
+                <a:spcPts val="0"/>
+              </a:spcBef>
+              <a:spcAft>
+                <a:spcPts val="0"/>
+              </a:spcAft>
+              <a:buClr>
+                <a:schemeClr val="dk1"/>
+              </a:buClr>
+              <a:buSzPts val="2800"/>
+              <a:buFont typeface="Arial"/>
+              <a:buNone/>
+              <a:defRPr sz="2800" b="0" i="0" u="none" strike="noStrike" cap="none">
+                <a:solidFill>
+                  <a:schemeClr val="dk1"/>
+                </a:solidFill>
+                <a:latin typeface="Arial"/>
+                <a:ea typeface="Arial"/>
+                <a:cs typeface="Arial"/>
+                <a:sym typeface="Arial"/>
+              </a:defRPr>
+            </a:lvl5pPr>
+            <a:lvl6pPr marR="0" lvl="5" algn="l" rtl="0">
+              <a:lnSpc>
+                <a:spcPct val="100000"/>
+              </a:lnSpc>
+              <a:spcBef>
+                <a:spcPts val="0"/>
+              </a:spcBef>
+              <a:spcAft>
+                <a:spcPts val="0"/>
+              </a:spcAft>
+              <a:buClr>
+                <a:schemeClr val="dk1"/>
+              </a:buClr>
+              <a:buSzPts val="2800"/>
+              <a:buFont typeface="Arial"/>
+              <a:buNone/>
+              <a:defRPr sz="2800" b="0" i="0" u="none" strike="noStrike" cap="none">
+                <a:solidFill>
+                  <a:schemeClr val="dk1"/>
+                </a:solidFill>
+                <a:latin typeface="Arial"/>
+                <a:ea typeface="Arial"/>
+                <a:cs typeface="Arial"/>
+                <a:sym typeface="Arial"/>
+              </a:defRPr>
+            </a:lvl6pPr>
+            <a:lvl7pPr marR="0" lvl="6" algn="l" rtl="0">
+              <a:lnSpc>
+                <a:spcPct val="100000"/>
+              </a:lnSpc>
+              <a:spcBef>
+                <a:spcPts val="0"/>
+              </a:spcBef>
+              <a:spcAft>
+                <a:spcPts val="0"/>
+              </a:spcAft>
+              <a:buClr>
+                <a:schemeClr val="dk1"/>
+              </a:buClr>
+              <a:buSzPts val="2800"/>
+              <a:buFont typeface="Arial"/>
+              <a:buNone/>
+              <a:defRPr sz="2800" b="0" i="0" u="none" strike="noStrike" cap="none">
+                <a:solidFill>
+                  <a:schemeClr val="dk1"/>
+                </a:solidFill>
+                <a:latin typeface="Arial"/>
+                <a:ea typeface="Arial"/>
+                <a:cs typeface="Arial"/>
+                <a:sym typeface="Arial"/>
+              </a:defRPr>
+            </a:lvl7pPr>
+            <a:lvl8pPr marR="0" lvl="7" algn="l" rtl="0">
+              <a:lnSpc>
+                <a:spcPct val="100000"/>
+              </a:lnSpc>
+              <a:spcBef>
+                <a:spcPts val="0"/>
+              </a:spcBef>
+              <a:spcAft>
+                <a:spcPts val="0"/>
+              </a:spcAft>
+              <a:buClr>
+                <a:schemeClr val="dk1"/>
+              </a:buClr>
+              <a:buSzPts val="2800"/>
+              <a:buFont typeface="Arial"/>
+              <a:buNone/>
+              <a:defRPr sz="2800" b="0" i="0" u="none" strike="noStrike" cap="none">
+                <a:solidFill>
+                  <a:schemeClr val="dk1"/>
+                </a:solidFill>
+                <a:latin typeface="Arial"/>
+                <a:ea typeface="Arial"/>
+                <a:cs typeface="Arial"/>
+                <a:sym typeface="Arial"/>
+              </a:defRPr>
+            </a:lvl8pPr>
+            <a:lvl9pPr marR="0" lvl="8" algn="l" rtl="0">
+              <a:lnSpc>
+                <a:spcPct val="100000"/>
+              </a:lnSpc>
+              <a:spcBef>
+                <a:spcPts val="0"/>
+              </a:spcBef>
+              <a:spcAft>
+                <a:spcPts val="0"/>
+              </a:spcAft>
+              <a:buClr>
+                <a:schemeClr val="dk1"/>
+              </a:buClr>
+              <a:buSzPts val="2800"/>
+              <a:buFont typeface="Arial"/>
+              <a:buNone/>
+              <a:defRPr sz="2800" b="0" i="0" u="none" strike="noStrike" cap="none">
+                <a:solidFill>
+                  <a:schemeClr val="dk1"/>
+                </a:solidFill>
+                <a:latin typeface="Arial"/>
+                <a:ea typeface="Arial"/>
+                <a:cs typeface="Arial"/>
+                <a:sym typeface="Arial"/>
+              </a:defRPr>
+            </a:lvl9pPr>
+          </a:lstStyle>
+          <a:p>
+            <a:pPr algn="ctr"/>
+            <a:r>
+              <a:rPr lang="en-US" dirty="0"/>
+              <a:t>Version 2</a:t>
+            </a:r>
+          </a:p>
+        </p:txBody>
+      </p:sp>
+      <p:pic>
+        <p:nvPicPr>
+          <p:cNvPr id="4" name="Picture 6" descr="Graphical user interface, text, application&#10;&#10;Description automatically generated">
+            <a:extLst>
+              <a:ext uri="{FF2B5EF4-FFF2-40B4-BE49-F238E27FC236}">
+                <a16:creationId xmlns:a16="http://schemas.microsoft.com/office/drawing/2014/main" id="{F0D1DE80-0CCE-9E41-BE45-6E14F007F838}"/>
+              </a:ext>
+            </a:extLst>
+          </p:cNvPr>
+          <p:cNvPicPr>
+            <a:picLocks noChangeAspect="1"/>
+          </p:cNvPicPr>
+          <p:nvPr/>
+        </p:nvPicPr>
+        <p:blipFill>
+          <a:blip r:embed="rId3"/>
+          <a:stretch>
+            <a:fillRect/>
+          </a:stretch>
+        </p:blipFill>
+        <p:spPr>
+          <a:xfrm>
+            <a:off x="1" y="2229323"/>
+            <a:ext cx="4693023" cy="1283248"/>
           </a:xfrm>
           <a:prstGeom prst="rect">
             <a:avLst/>
           </a:prstGeom>
         </p:spPr>
-        <p:txBody>
-          <a:bodyPr spcFirstLastPara="1" wrap="square" lIns="91425" tIns="91425" rIns="91425" bIns="91425" anchor="t" anchorCtr="0">
-            <a:noAutofit/>
-          </a:bodyPr>
-          <a:lstStyle/>
-          <a:p>
-            <a:pPr marL="0" lvl="0" indent="0" algn="l" rtl="0">
-              <a:spcBef>
-                <a:spcPts val="0"/>
-              </a:spcBef>
-              <a:spcAft>
-                <a:spcPts val="1600"/>
-              </a:spcAft>
-              <a:buNone/>
-            </a:pPr>
-            <a:r>
-              <a:rPr lang="en" i="1"/>
-              <a:t>Your version control evidence should go here.  This could be in the form of annotated screenshots which show you you managed this process or you could make a brief screencast explaining how you implemented version control.</a:t>
-            </a:r>
-            <a:endParaRPr i="1"/>
-          </a:p>
-        </p:txBody>
-      </p:sp>
+      </p:pic>
     </p:spTree>
+    <p:extLst>
+      <p:ext uri="{BB962C8B-B14F-4D97-AF65-F5344CB8AC3E}">
+        <p14:creationId xmlns:p14="http://schemas.microsoft.com/office/powerpoint/2010/main" val="1390132799"/>
+      </p:ext>
+    </p:extLst>
   </p:cSld>
   <p:clrMapOvr>
     <a:masterClrMapping/>
@@ -8533,17 +11296,9 @@
 <file path=ppt/slides/slide8.xml><?xml version="1.0" encoding="utf-8"?>
 <p:sld xmlns:a="http://schemas.openxmlformats.org/drawingml/2006/main" xmlns:r="http://schemas.openxmlformats.org/officeDocument/2006/relationships" xmlns:p="http://schemas.openxmlformats.org/presentationml/2006/main">
   <p:cSld>
-    <p:bg>
-      <p:bgPr>
-        <a:solidFill>
-          <a:srgbClr val="FFE599"/>
-        </a:solidFill>
-        <a:effectLst/>
-      </p:bgPr>
-    </p:bg>
     <p:spTree>
       <p:nvGrpSpPr>
-        <p:cNvPr id="1" name="Shape 89"/>
+        <p:cNvPr id="1" name="Shape 77"/>
         <p:cNvGrpSpPr/>
         <p:nvPr/>
       </p:nvGrpSpPr>
@@ -8557,18 +11312,18 @@
       </p:grpSpPr>
       <p:sp>
         <p:nvSpPr>
-          <p:cNvPr id="90" name="Google Shape;90;p19"/>
+          <p:cNvPr id="78" name="Google Shape;78;p17"/>
           <p:cNvSpPr txBox="1">
             <a:spLocks noGrp="1"/>
           </p:cNvSpPr>
           <p:nvPr>
-            <p:ph type="body" idx="1"/>
+            <p:ph type="title"/>
           </p:nvPr>
         </p:nvSpPr>
         <p:spPr>
           <a:xfrm>
-            <a:off x="311700" y="397700"/>
-            <a:ext cx="8520600" cy="4171200"/>
+            <a:off x="311700" y="445025"/>
+            <a:ext cx="8520600" cy="572700"/>
           </a:xfrm>
           <a:prstGeom prst="rect">
             <a:avLst/>
@@ -8580,28 +11335,515 @@
           </a:bodyPr>
           <a:lstStyle/>
           <a:p>
-            <a:pPr marL="0" lvl="0" indent="0" algn="l" rtl="0">
-              <a:spcBef>
-                <a:spcPts val="0"/>
-              </a:spcBef>
-              <a:spcAft>
-                <a:spcPts val="1600"/>
-              </a:spcAft>
-              <a:buNone/>
-            </a:pPr>
             <a:r>
-              <a:rPr lang="en" b="1" i="1">
-                <a:solidFill>
-                  <a:srgbClr val="595959"/>
-                </a:solidFill>
-              </a:rPr>
-              <a:t>Discusses how the information from planning, testing and trialling of components assisted in the development of a high-quality outcome</a:t>
+              <a:rPr lang="en" sz="2400" dirty="0"/>
+              <a:t>Component 2 Version 1 - Test Plan (?and screenshot)</a:t>
             </a:r>
-            <a:endParaRPr/>
+            <a:endParaRPr sz="2400" dirty="0"/>
           </a:p>
         </p:txBody>
       </p:sp>
+      <p:graphicFrame>
+        <p:nvGraphicFramePr>
+          <p:cNvPr id="79" name="Google Shape;79;p17"/>
+          <p:cNvGraphicFramePr/>
+          <p:nvPr>
+            <p:extLst>
+              <p:ext uri="{D42A27DB-BD31-4B8C-83A1-F6EECF244321}">
+                <p14:modId xmlns:p14="http://schemas.microsoft.com/office/powerpoint/2010/main" val="3273574905"/>
+              </p:ext>
+            </p:extLst>
+          </p:nvPr>
+        </p:nvGraphicFramePr>
+        <p:xfrm>
+          <a:off x="382475" y="1267725"/>
+          <a:ext cx="8520600" cy="1462980"/>
+        </p:xfrm>
+        <a:graphic>
+          <a:graphicData uri="http://schemas.openxmlformats.org/drawingml/2006/table">
+            <a:tbl>
+              <a:tblPr>
+                <a:noFill/>
+                <a:tableStyleId>{E1099E06-0E6B-448D-9D27-60429F06E6F4}</a:tableStyleId>
+              </a:tblPr>
+              <a:tblGrid>
+                <a:gridCol w="4260300">
+                  <a:extLst>
+                    <a:ext uri="{9D8B030D-6E8A-4147-A177-3AD203B41FA5}">
+                      <a16:colId xmlns:a16="http://schemas.microsoft.com/office/drawing/2014/main" val="20000"/>
+                    </a:ext>
+                  </a:extLst>
+                </a:gridCol>
+                <a:gridCol w="4260300">
+                  <a:extLst>
+                    <a:ext uri="{9D8B030D-6E8A-4147-A177-3AD203B41FA5}">
+                      <a16:colId xmlns:a16="http://schemas.microsoft.com/office/drawing/2014/main" val="20001"/>
+                    </a:ext>
+                  </a:extLst>
+                </a:gridCol>
+              </a:tblGrid>
+              <a:tr h="381000">
+                <a:tc>
+                  <a:txBody>
+                    <a:bodyPr/>
+                    <a:lstStyle/>
+                    <a:p>
+                      <a:pPr marL="0" lvl="0" indent="0" algn="l" rtl="0">
+                        <a:spcBef>
+                          <a:spcPts val="0"/>
+                        </a:spcBef>
+                        <a:spcAft>
+                          <a:spcPts val="0"/>
+                        </a:spcAft>
+                        <a:buNone/>
+                      </a:pPr>
+                      <a:r>
+                        <a:rPr lang="en" sz="1800" b="1" dirty="0"/>
+                        <a:t>Test Case</a:t>
+                      </a:r>
+                      <a:endParaRPr sz="1800" b="1" dirty="0"/>
+                    </a:p>
+                  </a:txBody>
+                  <a:tcPr marL="91425" marR="91425" marT="91425" marB="91425">
+                    <a:solidFill>
+                      <a:srgbClr val="CCCCCC"/>
+                    </a:solidFill>
+                  </a:tcPr>
+                </a:tc>
+                <a:tc>
+                  <a:txBody>
+                    <a:bodyPr/>
+                    <a:lstStyle/>
+                    <a:p>
+                      <a:pPr marL="0" lvl="0" indent="0" algn="l" rtl="0">
+                        <a:spcBef>
+                          <a:spcPts val="0"/>
+                        </a:spcBef>
+                        <a:spcAft>
+                          <a:spcPts val="0"/>
+                        </a:spcAft>
+                        <a:buNone/>
+                      </a:pPr>
+                      <a:r>
+                        <a:rPr lang="en" sz="1800" b="1" dirty="0"/>
+                        <a:t>Expected Values</a:t>
+                      </a:r>
+                      <a:endParaRPr sz="1800" b="1" dirty="0"/>
+                    </a:p>
+                  </a:txBody>
+                  <a:tcPr marL="91425" marR="91425" marT="91425" marB="91425">
+                    <a:solidFill>
+                      <a:srgbClr val="CCCCCC"/>
+                    </a:solidFill>
+                  </a:tcPr>
+                </a:tc>
+                <a:extLst>
+                  <a:ext uri="{0D108BD9-81ED-4DB2-BD59-A6C34878D82A}">
+                    <a16:rowId xmlns:a16="http://schemas.microsoft.com/office/drawing/2014/main" val="10000"/>
+                  </a:ext>
+                </a:extLst>
+              </a:tr>
+              <a:tr h="396200">
+                <a:tc>
+                  <a:txBody>
+                    <a:bodyPr/>
+                    <a:lstStyle/>
+                    <a:p>
+                      <a:pPr marL="0" lvl="0" indent="0" algn="l" rtl="0">
+                        <a:spcBef>
+                          <a:spcPts val="0"/>
+                        </a:spcBef>
+                        <a:spcAft>
+                          <a:spcPts val="0"/>
+                        </a:spcAft>
+                        <a:buNone/>
+                      </a:pPr>
+                      <a:r>
+                        <a:rPr lang="en-NZ" sz="1800" dirty="0"/>
+                        <a:t>Ran program</a:t>
+                      </a:r>
+                      <a:endParaRPr sz="1800" dirty="0"/>
+                    </a:p>
+                  </a:txBody>
+                  <a:tcPr marL="91425" marR="91425" marT="91425" marB="91425"/>
+                </a:tc>
+                <a:tc>
+                  <a:txBody>
+                    <a:bodyPr/>
+                    <a:lstStyle/>
+                    <a:p>
+                      <a:pPr marL="0" lvl="0" indent="0" algn="l" rtl="0">
+                        <a:spcBef>
+                          <a:spcPts val="0"/>
+                        </a:spcBef>
+                        <a:spcAft>
+                          <a:spcPts val="0"/>
+                        </a:spcAft>
+                        <a:buNone/>
+                      </a:pPr>
+                      <a:r>
+                        <a:rPr lang="en-NZ" sz="1800" dirty="0"/>
+                        <a:t>Entered p – Program prints pickup</a:t>
+                      </a:r>
+                    </a:p>
+                    <a:p>
+                      <a:pPr marL="0" lvl="0" indent="0" algn="l">
+                        <a:spcBef>
+                          <a:spcPts val="0"/>
+                        </a:spcBef>
+                        <a:spcAft>
+                          <a:spcPts val="0"/>
+                        </a:spcAft>
+                        <a:buNone/>
+                      </a:pPr>
+                      <a:r>
+                        <a:rPr lang="en-NZ" sz="1800" dirty="0"/>
+                        <a:t>Entered d – Program prints delivery</a:t>
+                      </a:r>
+                    </a:p>
+                    <a:p>
+                      <a:pPr marL="0" lvl="0" indent="0" algn="l">
+                        <a:spcBef>
+                          <a:spcPts val="0"/>
+                        </a:spcBef>
+                        <a:spcAft>
+                          <a:spcPts val="0"/>
+                        </a:spcAft>
+                        <a:buNone/>
+                      </a:pPr>
+                      <a:r>
+                        <a:rPr lang="en-NZ" sz="1800" dirty="0"/>
+                        <a:t>Enter invalid – Program stops</a:t>
+                      </a:r>
+                    </a:p>
+                  </a:txBody>
+                  <a:tcPr marL="91425" marR="91425" marT="91425" marB="91425"/>
+                </a:tc>
+                <a:extLst>
+                  <a:ext uri="{0D108BD9-81ED-4DB2-BD59-A6C34878D82A}">
+                    <a16:rowId xmlns:a16="http://schemas.microsoft.com/office/drawing/2014/main" val="10001"/>
+                  </a:ext>
+                </a:extLst>
+              </a:tr>
+            </a:tbl>
+          </a:graphicData>
+        </a:graphic>
+      </p:graphicFrame>
+      <p:pic>
+        <p:nvPicPr>
+          <p:cNvPr id="2" name="Picture 3" descr="Text&#10;&#10;Description automatically generated">
+            <a:extLst>
+              <a:ext uri="{FF2B5EF4-FFF2-40B4-BE49-F238E27FC236}">
+                <a16:creationId xmlns:a16="http://schemas.microsoft.com/office/drawing/2014/main" id="{AED4FB38-61A0-7B26-2EFC-9C82A5EB2C96}"/>
+              </a:ext>
+            </a:extLst>
+          </p:cNvPr>
+          <p:cNvPicPr>
+            <a:picLocks noChangeAspect="1"/>
+          </p:cNvPicPr>
+          <p:nvPr/>
+        </p:nvPicPr>
+        <p:blipFill>
+          <a:blip r:embed="rId3"/>
+          <a:stretch>
+            <a:fillRect/>
+          </a:stretch>
+        </p:blipFill>
+        <p:spPr>
+          <a:xfrm>
+            <a:off x="376516" y="2794840"/>
+            <a:ext cx="2070848" cy="2303743"/>
+          </a:xfrm>
+          <a:prstGeom prst="rect">
+            <a:avLst/>
+          </a:prstGeom>
+        </p:spPr>
+      </p:pic>
     </p:spTree>
+    <p:extLst>
+      <p:ext uri="{BB962C8B-B14F-4D97-AF65-F5344CB8AC3E}">
+        <p14:creationId xmlns:p14="http://schemas.microsoft.com/office/powerpoint/2010/main" val="3907607226"/>
+      </p:ext>
+    </p:extLst>
+  </p:cSld>
+  <p:clrMapOvr>
+    <a:masterClrMapping/>
+  </p:clrMapOvr>
+</p:sld>
+</file>
+
+<file path=ppt/slides/slide9.xml><?xml version="1.0" encoding="utf-8"?>
+<p:sld xmlns:a="http://schemas.openxmlformats.org/drawingml/2006/main" xmlns:r="http://schemas.openxmlformats.org/officeDocument/2006/relationships" xmlns:p="http://schemas.openxmlformats.org/presentationml/2006/main">
+  <p:cSld>
+    <p:spTree>
+      <p:nvGrpSpPr>
+        <p:cNvPr id="1" name="Shape 77"/>
+        <p:cNvGrpSpPr/>
+        <p:nvPr/>
+      </p:nvGrpSpPr>
+      <p:grpSpPr>
+        <a:xfrm>
+          <a:off x="0" y="0"/>
+          <a:ext cx="0" cy="0"/>
+          <a:chOff x="0" y="0"/>
+          <a:chExt cx="0" cy="0"/>
+        </a:xfrm>
+      </p:grpSpPr>
+      <p:sp>
+        <p:nvSpPr>
+          <p:cNvPr id="78" name="Google Shape;78;p17"/>
+          <p:cNvSpPr txBox="1">
+            <a:spLocks noGrp="1"/>
+          </p:cNvSpPr>
+          <p:nvPr>
+            <p:ph type="title"/>
+          </p:nvPr>
+        </p:nvSpPr>
+        <p:spPr>
+          <a:xfrm>
+            <a:off x="311700" y="445025"/>
+            <a:ext cx="8520600" cy="572700"/>
+          </a:xfrm>
+          <a:prstGeom prst="rect">
+            <a:avLst/>
+          </a:prstGeom>
+        </p:spPr>
+        <p:txBody>
+          <a:bodyPr spcFirstLastPara="1" wrap="square" lIns="91425" tIns="91425" rIns="91425" bIns="91425" anchor="t" anchorCtr="0">
+            <a:noAutofit/>
+          </a:bodyPr>
+          <a:lstStyle/>
+          <a:p>
+            <a:r>
+              <a:rPr lang="en" sz="2400" dirty="0"/>
+              <a:t>Component 2 Version 2 - Test Plan (?and screenshot)</a:t>
+            </a:r>
+            <a:endParaRPr sz="2400" dirty="0"/>
+          </a:p>
+        </p:txBody>
+      </p:sp>
+      <p:graphicFrame>
+        <p:nvGraphicFramePr>
+          <p:cNvPr id="79" name="Google Shape;79;p17"/>
+          <p:cNvGraphicFramePr/>
+          <p:nvPr>
+            <p:extLst>
+              <p:ext uri="{D42A27DB-BD31-4B8C-83A1-F6EECF244321}">
+                <p14:modId xmlns:p14="http://schemas.microsoft.com/office/powerpoint/2010/main" val="126669710"/>
+              </p:ext>
+            </p:extLst>
+          </p:nvPr>
+        </p:nvGraphicFramePr>
+        <p:xfrm>
+          <a:off x="382475" y="1267725"/>
+          <a:ext cx="8520600" cy="1341060"/>
+        </p:xfrm>
+        <a:graphic>
+          <a:graphicData uri="http://schemas.openxmlformats.org/drawingml/2006/table">
+            <a:tbl>
+              <a:tblPr>
+                <a:noFill/>
+                <a:tableStyleId>{E1099E06-0E6B-448D-9D27-60429F06E6F4}</a:tableStyleId>
+              </a:tblPr>
+              <a:tblGrid>
+                <a:gridCol w="4260300">
+                  <a:extLst>
+                    <a:ext uri="{9D8B030D-6E8A-4147-A177-3AD203B41FA5}">
+                      <a16:colId xmlns:a16="http://schemas.microsoft.com/office/drawing/2014/main" val="20000"/>
+                    </a:ext>
+                  </a:extLst>
+                </a:gridCol>
+                <a:gridCol w="4260300">
+                  <a:extLst>
+                    <a:ext uri="{9D8B030D-6E8A-4147-A177-3AD203B41FA5}">
+                      <a16:colId xmlns:a16="http://schemas.microsoft.com/office/drawing/2014/main" val="20001"/>
+                    </a:ext>
+                  </a:extLst>
+                </a:gridCol>
+              </a:tblGrid>
+              <a:tr h="381000">
+                <a:tc>
+                  <a:txBody>
+                    <a:bodyPr/>
+                    <a:lstStyle/>
+                    <a:p>
+                      <a:pPr marL="0" lvl="0" indent="0" algn="l" rtl="0">
+                        <a:spcBef>
+                          <a:spcPts val="0"/>
+                        </a:spcBef>
+                        <a:spcAft>
+                          <a:spcPts val="0"/>
+                        </a:spcAft>
+                        <a:buNone/>
+                      </a:pPr>
+                      <a:r>
+                        <a:rPr lang="en" sz="1600" b="1" dirty="0"/>
+                        <a:t>Test Case</a:t>
+                      </a:r>
+                      <a:endParaRPr sz="1600" b="1"/>
+                    </a:p>
+                  </a:txBody>
+                  <a:tcPr marL="91425" marR="91425" marT="91425" marB="91425">
+                    <a:solidFill>
+                      <a:srgbClr val="CCCCCC"/>
+                    </a:solidFill>
+                  </a:tcPr>
+                </a:tc>
+                <a:tc>
+                  <a:txBody>
+                    <a:bodyPr/>
+                    <a:lstStyle/>
+                    <a:p>
+                      <a:pPr marL="0" lvl="0" indent="0" algn="l" rtl="0">
+                        <a:spcBef>
+                          <a:spcPts val="0"/>
+                        </a:spcBef>
+                        <a:spcAft>
+                          <a:spcPts val="0"/>
+                        </a:spcAft>
+                        <a:buNone/>
+                      </a:pPr>
+                      <a:r>
+                        <a:rPr lang="en" sz="1600" b="1" dirty="0"/>
+                        <a:t>Expected Values</a:t>
+                      </a:r>
+                      <a:endParaRPr sz="1600" b="1"/>
+                    </a:p>
+                  </a:txBody>
+                  <a:tcPr marL="91425" marR="91425" marT="91425" marB="91425">
+                    <a:solidFill>
+                      <a:srgbClr val="CCCCCC"/>
+                    </a:solidFill>
+                  </a:tcPr>
+                </a:tc>
+                <a:extLst>
+                  <a:ext uri="{0D108BD9-81ED-4DB2-BD59-A6C34878D82A}">
+                    <a16:rowId xmlns:a16="http://schemas.microsoft.com/office/drawing/2014/main" val="10000"/>
+                  </a:ext>
+                </a:extLst>
+              </a:tr>
+              <a:tr h="396200">
+                <a:tc>
+                  <a:txBody>
+                    <a:bodyPr/>
+                    <a:lstStyle/>
+                    <a:p>
+                      <a:pPr marL="0" lvl="0" indent="0" algn="l" rtl="0">
+                        <a:spcBef>
+                          <a:spcPts val="0"/>
+                        </a:spcBef>
+                        <a:spcAft>
+                          <a:spcPts val="0"/>
+                        </a:spcAft>
+                        <a:buNone/>
+                      </a:pPr>
+                      <a:r>
+                        <a:rPr lang="en-NZ" sz="1600" dirty="0"/>
+                        <a:t>Ran program</a:t>
+                      </a:r>
+                      <a:endParaRPr sz="1600"/>
+                    </a:p>
+                  </a:txBody>
+                  <a:tcPr marL="91425" marR="91425" marT="91425" marB="91425"/>
+                </a:tc>
+                <a:tc>
+                  <a:txBody>
+                    <a:bodyPr/>
+                    <a:lstStyle/>
+                    <a:p>
+                      <a:pPr marL="0" lvl="0" indent="0" algn="l" rtl="0">
+                        <a:spcBef>
+                          <a:spcPts val="0"/>
+                        </a:spcBef>
+                        <a:spcAft>
+                          <a:spcPts val="0"/>
+                        </a:spcAft>
+                        <a:buNone/>
+                      </a:pPr>
+                      <a:r>
+                        <a:rPr lang="en-NZ" sz="1600" dirty="0"/>
+                        <a:t>Entered p – Program prints pickup</a:t>
+                      </a:r>
+                    </a:p>
+                    <a:p>
+                      <a:pPr marL="0" lvl="0" indent="0" algn="l">
+                        <a:spcBef>
+                          <a:spcPts val="0"/>
+                        </a:spcBef>
+                        <a:spcAft>
+                          <a:spcPts val="0"/>
+                        </a:spcAft>
+                        <a:buNone/>
+                      </a:pPr>
+                      <a:r>
+                        <a:rPr lang="en-NZ" sz="1600" dirty="0"/>
+                        <a:t>Entered d – Program prints delivery</a:t>
+                      </a:r>
+                    </a:p>
+                    <a:p>
+                      <a:pPr marL="0" lvl="0" indent="0" algn="l">
+                        <a:spcBef>
+                          <a:spcPts val="0"/>
+                        </a:spcBef>
+                        <a:spcAft>
+                          <a:spcPts val="0"/>
+                        </a:spcAft>
+                        <a:buNone/>
+                      </a:pPr>
+                      <a:r>
+                        <a:rPr lang="en-NZ" sz="1600" dirty="0"/>
+                        <a:t>Enter invalid – Program prints error message</a:t>
+                      </a:r>
+                    </a:p>
+                  </a:txBody>
+                  <a:tcPr marL="91425" marR="91425" marT="91425" marB="91425"/>
+                </a:tc>
+                <a:extLst>
+                  <a:ext uri="{0D108BD9-81ED-4DB2-BD59-A6C34878D82A}">
+                    <a16:rowId xmlns:a16="http://schemas.microsoft.com/office/drawing/2014/main" val="10001"/>
+                  </a:ext>
+                </a:extLst>
+              </a:tr>
+            </a:tbl>
+          </a:graphicData>
+        </a:graphic>
+      </p:graphicFrame>
+      <p:pic>
+        <p:nvPicPr>
+          <p:cNvPr id="3" name="Picture 3" descr="Text&#10;&#10;Description automatically generated">
+            <a:extLst>
+              <a:ext uri="{FF2B5EF4-FFF2-40B4-BE49-F238E27FC236}">
+                <a16:creationId xmlns:a16="http://schemas.microsoft.com/office/drawing/2014/main" id="{BFF90D11-7F51-C6BB-912D-5C5889BAD0B2}"/>
+              </a:ext>
+            </a:extLst>
+          </p:cNvPr>
+          <p:cNvPicPr>
+            <a:picLocks noChangeAspect="1"/>
+          </p:cNvPicPr>
+          <p:nvPr/>
+        </p:nvPicPr>
+        <p:blipFill>
+          <a:blip r:embed="rId3"/>
+          <a:stretch>
+            <a:fillRect/>
+          </a:stretch>
+        </p:blipFill>
+        <p:spPr>
+          <a:xfrm>
+            <a:off x="376518" y="2607792"/>
+            <a:ext cx="2575112" cy="2254257"/>
+          </a:xfrm>
+          <a:prstGeom prst="rect">
+            <a:avLst/>
+          </a:prstGeom>
+        </p:spPr>
+      </p:pic>
+    </p:spTree>
+    <p:extLst>
+      <p:ext uri="{BB962C8B-B14F-4D97-AF65-F5344CB8AC3E}">
+        <p14:creationId xmlns:p14="http://schemas.microsoft.com/office/powerpoint/2010/main" val="2992748332"/>
+      </p:ext>
+    </p:extLst>
   </p:cSld>
   <p:clrMapOvr>
     <a:masterClrMapping/>

</xml_diff>

<commit_message>
Integrated pickup menu into main app
Made pickup or delivery menu into a function and integrated it into main routine
</commit_message>
<xml_diff>
--- a/022_91893+_+91897+Documentation.pptx
+++ b/022_91893+_+91897+Documentation.pptx
@@ -279,7 +279,7 @@
     <p1510:client id="{21F4134A-65B8-48FA-BC64-94661A83E768}" v="7" dt="2023-05-07T23:48:36.417"/>
     <p1510:client id="{2554FBCC-49BD-FBDF-D538-CE3319AF18E1}" v="227" dt="2023-05-10T01:20:44.771"/>
     <p1510:client id="{81A2BCD6-527D-A88D-67B8-C94274A60B24}" v="95" dt="2023-05-08T00:15:52.898"/>
-    <p1510:client id="{B82B93A9-7EAF-C4B5-E540-07BEAF1A0FB5}" v="161" dt="2023-05-11T22:43:08.631"/>
+    <p1510:client id="{B82B93A9-7EAF-C4B5-E540-07BEAF1A0FB5}" v="165" dt="2023-05-11T22:49:54.923"/>
   </p1510:revLst>
 </p1510:revInfo>
 </file>
@@ -289,7 +289,7 @@
   <pc:docChgLst>
     <pc:chgData name="Bronson Wharepapa" userId="S::18114@my.sanctamaria.school.nz::fc604165-d948-4f79-adb1-ca2376f8e399" providerId="AD" clId="Web-{B82B93A9-7EAF-C4B5-E540-07BEAF1A0FB5}"/>
     <pc:docChg chg="addSld modSld">
-      <pc:chgData name="Bronson Wharepapa" userId="S::18114@my.sanctamaria.school.nz::fc604165-d948-4f79-adb1-ca2376f8e399" providerId="AD" clId="Web-{B82B93A9-7EAF-C4B5-E540-07BEAF1A0FB5}" dt="2023-05-11T22:43:08.631" v="143" actId="1076"/>
+      <pc:chgData name="Bronson Wharepapa" userId="S::18114@my.sanctamaria.school.nz::fc604165-d948-4f79-adb1-ca2376f8e399" providerId="AD" clId="Web-{B82B93A9-7EAF-C4B5-E540-07BEAF1A0FB5}" dt="2023-05-11T22:49:54.923" v="146" actId="1076"/>
       <pc:docMkLst>
         <pc:docMk/>
       </pc:docMkLst>
@@ -357,7 +357,7 @@
         </pc:picChg>
       </pc:sldChg>
       <pc:sldChg chg="addSp delSp modSp add replId">
-        <pc:chgData name="Bronson Wharepapa" userId="S::18114@my.sanctamaria.school.nz::fc604165-d948-4f79-adb1-ca2376f8e399" providerId="AD" clId="Web-{B82B93A9-7EAF-C4B5-E540-07BEAF1A0FB5}" dt="2023-05-11T22:43:08.631" v="143" actId="1076"/>
+        <pc:chgData name="Bronson Wharepapa" userId="S::18114@my.sanctamaria.school.nz::fc604165-d948-4f79-adb1-ca2376f8e399" providerId="AD" clId="Web-{B82B93A9-7EAF-C4B5-E540-07BEAF1A0FB5}" dt="2023-05-11T22:49:54.923" v="146" actId="1076"/>
         <pc:sldMkLst>
           <pc:docMk/>
           <pc:sldMk cId="2208231927" sldId="269"/>
@@ -418,12 +418,20 @@
             <ac:picMk id="6" creationId="{8CEDC507-FBDB-D899-525C-4AE687E3C425}"/>
           </ac:picMkLst>
         </pc:picChg>
-        <pc:picChg chg="add mod">
-          <ac:chgData name="Bronson Wharepapa" userId="S::18114@my.sanctamaria.school.nz::fc604165-d948-4f79-adb1-ca2376f8e399" providerId="AD" clId="Web-{B82B93A9-7EAF-C4B5-E540-07BEAF1A0FB5}" dt="2023-05-11T22:43:08.631" v="143" actId="1076"/>
+        <pc:picChg chg="add del mod">
+          <ac:chgData name="Bronson Wharepapa" userId="S::18114@my.sanctamaria.school.nz::fc604165-d948-4f79-adb1-ca2376f8e399" providerId="AD" clId="Web-{B82B93A9-7EAF-C4B5-E540-07BEAF1A0FB5}" dt="2023-05-11T22:49:46.407" v="144"/>
           <ac:picMkLst>
             <pc:docMk/>
             <pc:sldMk cId="2208231927" sldId="269"/>
             <ac:picMk id="7" creationId="{B4792892-6EFA-2BA5-7627-E67A76F70801}"/>
+          </ac:picMkLst>
+        </pc:picChg>
+        <pc:picChg chg="add mod">
+          <ac:chgData name="Bronson Wharepapa" userId="S::18114@my.sanctamaria.school.nz::fc604165-d948-4f79-adb1-ca2376f8e399" providerId="AD" clId="Web-{B82B93A9-7EAF-C4B5-E540-07BEAF1A0FB5}" dt="2023-05-11T22:49:54.923" v="146" actId="1076"/>
+          <ac:picMkLst>
+            <pc:docMk/>
+            <pc:sldMk cId="2208231927" sldId="269"/>
+            <ac:picMk id="8" creationId="{36ECABDF-24DF-6B14-04BE-E824E37BFC71}"/>
           </ac:picMkLst>
         </pc:picChg>
       </pc:sldChg>
@@ -8823,10 +8831,10 @@
       </p:pic>
       <p:pic>
         <p:nvPicPr>
-          <p:cNvPr id="7" name="Picture 7" descr="Text&#10;&#10;Description automatically generated">
+          <p:cNvPr id="8" name="Picture 8" descr="Text&#10;&#10;Description automatically generated">
             <a:extLst>
               <a:ext uri="{FF2B5EF4-FFF2-40B4-BE49-F238E27FC236}">
-                <a16:creationId xmlns:a16="http://schemas.microsoft.com/office/drawing/2014/main" id="{B4792892-6EFA-2BA5-7627-E67A76F70801}"/>
+                <a16:creationId xmlns:a16="http://schemas.microsoft.com/office/drawing/2014/main" id="{36ECABDF-24DF-6B14-04BE-E824E37BFC71}"/>
               </a:ext>
             </a:extLst>
           </p:cNvPr>
@@ -8843,8 +8851,8 @@
         </p:blipFill>
         <p:spPr>
           <a:xfrm>
-            <a:off x="376517" y="2741986"/>
-            <a:ext cx="2407024" cy="2180853"/>
+            <a:off x="376518" y="2745054"/>
+            <a:ext cx="2743200" cy="2315910"/>
           </a:xfrm>
           <a:prstGeom prst="rect">
             <a:avLst/>

</xml_diff>

<commit_message>
Created version 1 of pickup function
Basic instructions and input for name and phone number
</commit_message>
<xml_diff>
--- a/022_91893+_+91897+Documentation.pptx
+++ b/022_91893+_+91897+Documentation.pptx
@@ -5,7 +5,7 @@
     <p:sldMasterId id="2147483659" r:id="rId1"/>
   </p:sldMasterIdLst>
   <p:notesMasterIdLst>
-    <p:notesMasterId r:id="rId16"/>
+    <p:notesMasterId r:id="rId18"/>
   </p:notesMasterIdLst>
   <p:sldIdLst>
     <p:sldId id="256" r:id="rId2"/>
@@ -20,8 +20,10 @@
     <p:sldId id="267" r:id="rId11"/>
     <p:sldId id="268" r:id="rId12"/>
     <p:sldId id="269" r:id="rId13"/>
-    <p:sldId id="261" r:id="rId14"/>
-    <p:sldId id="262" r:id="rId15"/>
+    <p:sldId id="270" r:id="rId14"/>
+    <p:sldId id="271" r:id="rId15"/>
+    <p:sldId id="261" r:id="rId16"/>
+    <p:sldId id="262" r:id="rId17"/>
   </p:sldIdLst>
   <p:sldSz cx="9144000" cy="5143500" type="screen16x9"/>
   <p:notesSz cx="6858000" cy="9144000"/>
@@ -280,6 +282,7 @@
     <p1510:client id="{2554FBCC-49BD-FBDF-D538-CE3319AF18E1}" v="227" dt="2023-05-10T01:20:44.771"/>
     <p1510:client id="{81A2BCD6-527D-A88D-67B8-C94274A60B24}" v="95" dt="2023-05-08T00:15:52.898"/>
     <p1510:client id="{B82B93A9-7EAF-C4B5-E540-07BEAF1A0FB5}" v="165" dt="2023-05-11T22:49:54.923"/>
+    <p1510:client id="{B8FDFBEC-0524-BF11-E929-3A10092CC293}" v="266" dt="2023-05-15T21:42:57.889"/>
   </p1510:revLst>
 </p1510:revInfo>
 </file>
@@ -541,6 +544,140 @@
             <pc:docMk/>
             <pc:sldMk cId="0" sldId="260"/>
             <ac:picMk id="5" creationId="{B81B4D5F-955C-BC86-7057-41A8B5F890B1}"/>
+          </ac:picMkLst>
+        </pc:picChg>
+      </pc:sldChg>
+    </pc:docChg>
+  </pc:docChgLst>
+  <pc:docChgLst>
+    <pc:chgData name="Bronson Wharepapa" userId="S::18114@my.sanctamaria.school.nz::fc604165-d948-4f79-adb1-ca2376f8e399" providerId="AD" clId="Web-{B8FDFBEC-0524-BF11-E929-3A10092CC293}"/>
+    <pc:docChg chg="addSld modSld sldOrd">
+      <pc:chgData name="Bronson Wharepapa" userId="S::18114@my.sanctamaria.school.nz::fc604165-d948-4f79-adb1-ca2376f8e399" providerId="AD" clId="Web-{B8FDFBEC-0524-BF11-E929-3A10092CC293}" dt="2023-05-15T21:42:57.889" v="253"/>
+      <pc:docMkLst>
+        <pc:docMk/>
+      </pc:docMkLst>
+      <pc:sldChg chg="addSp modSp">
+        <pc:chgData name="Bronson Wharepapa" userId="S::18114@my.sanctamaria.school.nz::fc604165-d948-4f79-adb1-ca2376f8e399" providerId="AD" clId="Web-{B8FDFBEC-0524-BF11-E929-3A10092CC293}" dt="2023-05-15T21:25:17.203" v="2" actId="1076"/>
+        <pc:sldMkLst>
+          <pc:docMk/>
+          <pc:sldMk cId="1390132799" sldId="265"/>
+        </pc:sldMkLst>
+        <pc:picChg chg="add mod">
+          <ac:chgData name="Bronson Wharepapa" userId="S::18114@my.sanctamaria.school.nz::fc604165-d948-4f79-adb1-ca2376f8e399" providerId="AD" clId="Web-{B8FDFBEC-0524-BF11-E929-3A10092CC293}" dt="2023-05-15T21:25:17.203" v="2" actId="1076"/>
+          <ac:picMkLst>
+            <pc:docMk/>
+            <pc:sldMk cId="1390132799" sldId="265"/>
+            <ac:picMk id="2" creationId="{C1F43179-E322-74D2-6E28-75537F2AD1A8}"/>
+          </ac:picMkLst>
+        </pc:picChg>
+      </pc:sldChg>
+      <pc:sldChg chg="addSp delSp modSp add ord replId">
+        <pc:chgData name="Bronson Wharepapa" userId="S::18114@my.sanctamaria.school.nz::fc604165-d948-4f79-adb1-ca2376f8e399" providerId="AD" clId="Web-{B8FDFBEC-0524-BF11-E929-3A10092CC293}" dt="2023-05-15T21:37:35.333" v="15" actId="14100"/>
+        <pc:sldMkLst>
+          <pc:docMk/>
+          <pc:sldMk cId="3441760066" sldId="270"/>
+        </pc:sldMkLst>
+        <pc:spChg chg="mod">
+          <ac:chgData name="Bronson Wharepapa" userId="S::18114@my.sanctamaria.school.nz::fc604165-d948-4f79-adb1-ca2376f8e399" providerId="AD" clId="Web-{B8FDFBEC-0524-BF11-E929-3A10092CC293}" dt="2023-05-15T21:36:58.113" v="10"/>
+          <ac:spMkLst>
+            <pc:docMk/>
+            <pc:sldMk cId="3441760066" sldId="270"/>
+            <ac:spMk id="73" creationId="{00000000-0000-0000-0000-000000000000}"/>
+          </ac:spMkLst>
+        </pc:spChg>
+        <pc:picChg chg="del">
+          <ac:chgData name="Bronson Wharepapa" userId="S::18114@my.sanctamaria.school.nz::fc604165-d948-4f79-adb1-ca2376f8e399" providerId="AD" clId="Web-{B8FDFBEC-0524-BF11-E929-3A10092CC293}" dt="2023-05-15T21:37:20.052" v="12"/>
+          <ac:picMkLst>
+            <pc:docMk/>
+            <pc:sldMk cId="3441760066" sldId="270"/>
+            <ac:picMk id="2" creationId="{C1F43179-E322-74D2-6E28-75537F2AD1A8}"/>
+          </ac:picMkLst>
+        </pc:picChg>
+        <pc:picChg chg="add mod">
+          <ac:chgData name="Bronson Wharepapa" userId="S::18114@my.sanctamaria.school.nz::fc604165-d948-4f79-adb1-ca2376f8e399" providerId="AD" clId="Web-{B8FDFBEC-0524-BF11-E929-3A10092CC293}" dt="2023-05-15T21:37:35.333" v="15" actId="14100"/>
+          <ac:picMkLst>
+            <pc:docMk/>
+            <pc:sldMk cId="3441760066" sldId="270"/>
+            <ac:picMk id="3" creationId="{24DAB135-3F72-9674-99CD-F676B0BDD14B}"/>
+          </ac:picMkLst>
+        </pc:picChg>
+        <pc:picChg chg="del">
+          <ac:chgData name="Bronson Wharepapa" userId="S::18114@my.sanctamaria.school.nz::fc604165-d948-4f79-adb1-ca2376f8e399" providerId="AD" clId="Web-{B8FDFBEC-0524-BF11-E929-3A10092CC293}" dt="2023-05-15T21:37:19.442" v="11"/>
+          <ac:picMkLst>
+            <pc:docMk/>
+            <pc:sldMk cId="3441760066" sldId="270"/>
+            <ac:picMk id="4" creationId="{F0D1DE80-0CCE-9E41-BE45-6E14F007F838}"/>
+          </ac:picMkLst>
+        </pc:picChg>
+      </pc:sldChg>
+      <pc:sldChg chg="addSp delSp modSp add ord replId">
+        <pc:chgData name="Bronson Wharepapa" userId="S::18114@my.sanctamaria.school.nz::fc604165-d948-4f79-adb1-ca2376f8e399" providerId="AD" clId="Web-{B8FDFBEC-0524-BF11-E929-3A10092CC293}" dt="2023-05-15T21:42:57.889" v="253"/>
+        <pc:sldMkLst>
+          <pc:docMk/>
+          <pc:sldMk cId="2969888906" sldId="271"/>
+        </pc:sldMkLst>
+        <pc:spChg chg="mod">
+          <ac:chgData name="Bronson Wharepapa" userId="S::18114@my.sanctamaria.school.nz::fc604165-d948-4f79-adb1-ca2376f8e399" providerId="AD" clId="Web-{B8FDFBEC-0524-BF11-E929-3A10092CC293}" dt="2023-05-15T21:38:00.881" v="20" actId="20577"/>
+          <ac:spMkLst>
+            <pc:docMk/>
+            <pc:sldMk cId="2969888906" sldId="271"/>
+            <ac:spMk id="78" creationId="{00000000-0000-0000-0000-000000000000}"/>
+          </ac:spMkLst>
+        </pc:spChg>
+        <pc:graphicFrameChg chg="mod modGraphic">
+          <ac:chgData name="Bronson Wharepapa" userId="S::18114@my.sanctamaria.school.nz::fc604165-d948-4f79-adb1-ca2376f8e399" providerId="AD" clId="Web-{B8FDFBEC-0524-BF11-E929-3A10092CC293}" dt="2023-05-15T21:42:57.889" v="253"/>
+          <ac:graphicFrameMkLst>
+            <pc:docMk/>
+            <pc:sldMk cId="2969888906" sldId="271"/>
+            <ac:graphicFrameMk id="79" creationId="{00000000-0000-0000-0000-000000000000}"/>
+          </ac:graphicFrameMkLst>
+        </pc:graphicFrameChg>
+        <pc:picChg chg="del">
+          <ac:chgData name="Bronson Wharepapa" userId="S::18114@my.sanctamaria.school.nz::fc604165-d948-4f79-adb1-ca2376f8e399" providerId="AD" clId="Web-{B8FDFBEC-0524-BF11-E929-3A10092CC293}" dt="2023-05-15T21:38:01.615" v="22"/>
+          <ac:picMkLst>
+            <pc:docMk/>
+            <pc:sldMk cId="2969888906" sldId="271"/>
+            <ac:picMk id="2" creationId="{84AF239A-D08F-17B1-41A6-F5C4EFBB0DC4}"/>
+          </ac:picMkLst>
+        </pc:picChg>
+        <pc:picChg chg="add del mod">
+          <ac:chgData name="Bronson Wharepapa" userId="S::18114@my.sanctamaria.school.nz::fc604165-d948-4f79-adb1-ca2376f8e399" providerId="AD" clId="Web-{B8FDFBEC-0524-BF11-E929-3A10092CC293}" dt="2023-05-15T21:40:25.072" v="35"/>
+          <ac:picMkLst>
+            <pc:docMk/>
+            <pc:sldMk cId="2969888906" sldId="271"/>
+            <ac:picMk id="3" creationId="{39B08F3F-2BAC-4468-46B1-2B35E2BC18B8}"/>
+          </ac:picMkLst>
+        </pc:picChg>
+        <pc:picChg chg="del">
+          <ac:chgData name="Bronson Wharepapa" userId="S::18114@my.sanctamaria.school.nz::fc604165-d948-4f79-adb1-ca2376f8e399" providerId="AD" clId="Web-{B8FDFBEC-0524-BF11-E929-3A10092CC293}" dt="2023-05-15T21:38:01.959" v="23"/>
+          <ac:picMkLst>
+            <pc:docMk/>
+            <pc:sldMk cId="2969888906" sldId="271"/>
+            <ac:picMk id="4" creationId="{08C31B73-1401-DDE5-34CB-6AF67AC68CB1}"/>
+          </ac:picMkLst>
+        </pc:picChg>
+        <pc:picChg chg="add mod">
+          <ac:chgData name="Bronson Wharepapa" userId="S::18114@my.sanctamaria.school.nz::fc604165-d948-4f79-adb1-ca2376f8e399" providerId="AD" clId="Web-{B8FDFBEC-0524-BF11-E929-3A10092CC293}" dt="2023-05-15T21:41:51.934" v="138" actId="1076"/>
+          <ac:picMkLst>
+            <pc:docMk/>
+            <pc:sldMk cId="2969888906" sldId="271"/>
+            <ac:picMk id="5" creationId="{31B1977E-CF62-C9F3-5A51-9E6AE56C4606}"/>
+          </ac:picMkLst>
+        </pc:picChg>
+        <pc:picChg chg="add mod">
+          <ac:chgData name="Bronson Wharepapa" userId="S::18114@my.sanctamaria.school.nz::fc604165-d948-4f79-adb1-ca2376f8e399" providerId="AD" clId="Web-{B8FDFBEC-0524-BF11-E929-3A10092CC293}" dt="2023-05-15T21:41:52.762" v="139" actId="1076"/>
+          <ac:picMkLst>
+            <pc:docMk/>
+            <pc:sldMk cId="2969888906" sldId="271"/>
+            <ac:picMk id="6" creationId="{8EF0A9CA-E720-1ADF-C6CA-98696ABA003E}"/>
+          </ac:picMkLst>
+        </pc:picChg>
+        <pc:picChg chg="del">
+          <ac:chgData name="Bronson Wharepapa" userId="S::18114@my.sanctamaria.school.nz::fc604165-d948-4f79-adb1-ca2376f8e399" providerId="AD" clId="Web-{B8FDFBEC-0524-BF11-E929-3A10092CC293}" dt="2023-05-15T21:38:01.146" v="21"/>
+          <ac:picMkLst>
+            <pc:docMk/>
+            <pc:sldMk cId="2969888906" sldId="271"/>
+            <ac:picMk id="8" creationId="{36ECABDF-24DF-6B14-04BE-E824E37BFC71}"/>
           </ac:picMkLst>
         </pc:picChg>
       </pc:sldChg>
@@ -1755,6 +1892,224 @@
   <p:cSld>
     <p:spTree>
       <p:nvGrpSpPr>
+        <p:cNvPr id="1" name="Shape 69"/>
+        <p:cNvGrpSpPr/>
+        <p:nvPr/>
+      </p:nvGrpSpPr>
+      <p:grpSpPr>
+        <a:xfrm>
+          <a:off x="0" y="0"/>
+          <a:ext cx="0" cy="0"/>
+          <a:chOff x="0" y="0"/>
+          <a:chExt cx="0" cy="0"/>
+        </a:xfrm>
+      </p:grpSpPr>
+      <p:sp>
+        <p:nvSpPr>
+          <p:cNvPr id="70" name="Google Shape;70;gac10fef634_0_16:notes"/>
+          <p:cNvSpPr>
+            <a:spLocks noGrp="1" noRot="1" noChangeAspect="1"/>
+          </p:cNvSpPr>
+          <p:nvPr>
+            <p:ph type="sldImg" idx="2"/>
+          </p:nvPr>
+        </p:nvSpPr>
+        <p:spPr>
+          <a:xfrm>
+            <a:off x="381000" y="685800"/>
+            <a:ext cx="6096000" cy="3429000"/>
+          </a:xfrm>
+          <a:custGeom>
+            <a:avLst/>
+            <a:gdLst/>
+            <a:ahLst/>
+            <a:cxnLst/>
+            <a:rect l="l" t="t" r="r" b="b"/>
+            <a:pathLst>
+              <a:path w="120000" h="120000" extrusionOk="0">
+                <a:moveTo>
+                  <a:pt x="0" y="0"/>
+                </a:moveTo>
+                <a:lnTo>
+                  <a:pt x="120000" y="0"/>
+                </a:lnTo>
+                <a:lnTo>
+                  <a:pt x="120000" y="120000"/>
+                </a:lnTo>
+                <a:lnTo>
+                  <a:pt x="0" y="120000"/>
+                </a:lnTo>
+                <a:close/>
+              </a:path>
+            </a:pathLst>
+          </a:custGeom>
+        </p:spPr>
+      </p:sp>
+      <p:sp>
+        <p:nvSpPr>
+          <p:cNvPr id="71" name="Google Shape;71;gac10fef634_0_16:notes"/>
+          <p:cNvSpPr txBox="1">
+            <a:spLocks noGrp="1"/>
+          </p:cNvSpPr>
+          <p:nvPr>
+            <p:ph type="body" idx="1"/>
+          </p:nvPr>
+        </p:nvSpPr>
+        <p:spPr>
+          <a:xfrm>
+            <a:off x="685800" y="4343400"/>
+            <a:ext cx="5486400" cy="4114800"/>
+          </a:xfrm>
+          <a:prstGeom prst="rect">
+            <a:avLst/>
+          </a:prstGeom>
+        </p:spPr>
+        <p:txBody>
+          <a:bodyPr spcFirstLastPara="1" wrap="square" lIns="91425" tIns="91425" rIns="91425" bIns="91425" anchor="t" anchorCtr="0">
+            <a:noAutofit/>
+          </a:bodyPr>
+          <a:lstStyle/>
+          <a:p>
+            <a:pPr marL="0" lvl="0" indent="0" algn="l" rtl="0">
+              <a:spcBef>
+                <a:spcPts val="0"/>
+              </a:spcBef>
+              <a:spcAft>
+                <a:spcPts val="0"/>
+              </a:spcAft>
+              <a:buNone/>
+            </a:pPr>
+            <a:endParaRPr/>
+          </a:p>
+        </p:txBody>
+      </p:sp>
+    </p:spTree>
+    <p:extLst>
+      <p:ext uri="{BB962C8B-B14F-4D97-AF65-F5344CB8AC3E}">
+        <p14:creationId xmlns:p14="http://schemas.microsoft.com/office/powerpoint/2010/main" val="4116821285"/>
+      </p:ext>
+    </p:extLst>
+  </p:cSld>
+  <p:clrMapOvr>
+    <a:masterClrMapping/>
+  </p:clrMapOvr>
+</p:notes>
+</file>
+
+<file path=ppt/notesSlides/notesSlide14.xml><?xml version="1.0" encoding="utf-8"?>
+<p:notes xmlns:a="http://schemas.openxmlformats.org/drawingml/2006/main" xmlns:r="http://schemas.openxmlformats.org/officeDocument/2006/relationships" xmlns:p="http://schemas.openxmlformats.org/presentationml/2006/main" showMasterSp="0" showMasterPhAnim="0">
+  <p:cSld>
+    <p:spTree>
+      <p:nvGrpSpPr>
+        <p:cNvPr id="1" name="Shape 74"/>
+        <p:cNvGrpSpPr/>
+        <p:nvPr/>
+      </p:nvGrpSpPr>
+      <p:grpSpPr>
+        <a:xfrm>
+          <a:off x="0" y="0"/>
+          <a:ext cx="0" cy="0"/>
+          <a:chOff x="0" y="0"/>
+          <a:chExt cx="0" cy="0"/>
+        </a:xfrm>
+      </p:grpSpPr>
+      <p:sp>
+        <p:nvSpPr>
+          <p:cNvPr id="75" name="Google Shape;75;gac10fef634_0_20:notes"/>
+          <p:cNvSpPr>
+            <a:spLocks noGrp="1" noRot="1" noChangeAspect="1"/>
+          </p:cNvSpPr>
+          <p:nvPr>
+            <p:ph type="sldImg" idx="2"/>
+          </p:nvPr>
+        </p:nvSpPr>
+        <p:spPr>
+          <a:xfrm>
+            <a:off x="381000" y="685800"/>
+            <a:ext cx="6096000" cy="3429000"/>
+          </a:xfrm>
+          <a:custGeom>
+            <a:avLst/>
+            <a:gdLst/>
+            <a:ahLst/>
+            <a:cxnLst/>
+            <a:rect l="l" t="t" r="r" b="b"/>
+            <a:pathLst>
+              <a:path w="120000" h="120000" extrusionOk="0">
+                <a:moveTo>
+                  <a:pt x="0" y="0"/>
+                </a:moveTo>
+                <a:lnTo>
+                  <a:pt x="120000" y="0"/>
+                </a:lnTo>
+                <a:lnTo>
+                  <a:pt x="120000" y="120000"/>
+                </a:lnTo>
+                <a:lnTo>
+                  <a:pt x="0" y="120000"/>
+                </a:lnTo>
+                <a:close/>
+              </a:path>
+            </a:pathLst>
+          </a:custGeom>
+        </p:spPr>
+      </p:sp>
+      <p:sp>
+        <p:nvSpPr>
+          <p:cNvPr id="76" name="Google Shape;76;gac10fef634_0_20:notes"/>
+          <p:cNvSpPr txBox="1">
+            <a:spLocks noGrp="1"/>
+          </p:cNvSpPr>
+          <p:nvPr>
+            <p:ph type="body" idx="1"/>
+          </p:nvPr>
+        </p:nvSpPr>
+        <p:spPr>
+          <a:xfrm>
+            <a:off x="685800" y="4343400"/>
+            <a:ext cx="5486400" cy="4114800"/>
+          </a:xfrm>
+          <a:prstGeom prst="rect">
+            <a:avLst/>
+          </a:prstGeom>
+        </p:spPr>
+        <p:txBody>
+          <a:bodyPr spcFirstLastPara="1" wrap="square" lIns="91425" tIns="91425" rIns="91425" bIns="91425" anchor="t" anchorCtr="0">
+            <a:noAutofit/>
+          </a:bodyPr>
+          <a:lstStyle/>
+          <a:p>
+            <a:pPr marL="0" lvl="0" indent="0" algn="l" rtl="0">
+              <a:spcBef>
+                <a:spcPts val="0"/>
+              </a:spcBef>
+              <a:spcAft>
+                <a:spcPts val="0"/>
+              </a:spcAft>
+              <a:buNone/>
+            </a:pPr>
+            <a:endParaRPr/>
+          </a:p>
+        </p:txBody>
+      </p:sp>
+    </p:spTree>
+    <p:extLst>
+      <p:ext uri="{BB962C8B-B14F-4D97-AF65-F5344CB8AC3E}">
+        <p14:creationId xmlns:p14="http://schemas.microsoft.com/office/powerpoint/2010/main" val="2607249347"/>
+      </p:ext>
+    </p:extLst>
+  </p:cSld>
+  <p:clrMapOvr>
+    <a:masterClrMapping/>
+  </p:clrMapOvr>
+</p:notes>
+</file>
+
+<file path=ppt/notesSlides/notesSlide15.xml><?xml version="1.0" encoding="utf-8"?>
+<p:notes xmlns:a="http://schemas.openxmlformats.org/drawingml/2006/main" xmlns:r="http://schemas.openxmlformats.org/officeDocument/2006/relationships" xmlns:p="http://schemas.openxmlformats.org/presentationml/2006/main" showMasterSp="0" showMasterPhAnim="0">
+  <p:cSld>
+    <p:spTree>
+      <p:nvGrpSpPr>
         <p:cNvPr id="1" name="Shape 80"/>
         <p:cNvGrpSpPr/>
         <p:nvPr/>
@@ -1875,7 +2230,7 @@
 </p:notes>
 </file>
 
-<file path=ppt/notesSlides/notesSlide14.xml><?xml version="1.0" encoding="utf-8"?>
+<file path=ppt/notesSlides/notesSlide16.xml><?xml version="1.0" encoding="utf-8"?>
 <p:notes xmlns:a="http://schemas.openxmlformats.org/drawingml/2006/main" xmlns:r="http://schemas.openxmlformats.org/officeDocument/2006/relationships" xmlns:p="http://schemas.openxmlformats.org/presentationml/2006/main" showMasterSp="0" showMasterPhAnim="0">
   <p:cSld>
     <p:spTree>
@@ -8885,6 +9240,1022 @@
     </p:bg>
     <p:spTree>
       <p:nvGrpSpPr>
+        <p:cNvPr id="1" name="Shape 72"/>
+        <p:cNvGrpSpPr/>
+        <p:nvPr/>
+      </p:nvGrpSpPr>
+      <p:grpSpPr>
+        <a:xfrm>
+          <a:off x="0" y="0"/>
+          <a:ext cx="0" cy="0"/>
+          <a:chOff x="0" y="0"/>
+          <a:chExt cx="0" cy="0"/>
+        </a:xfrm>
+      </p:grpSpPr>
+      <p:sp>
+        <p:nvSpPr>
+          <p:cNvPr id="73" name="Google Shape;73;p16"/>
+          <p:cNvSpPr txBox="1">
+            <a:spLocks noGrp="1"/>
+          </p:cNvSpPr>
+          <p:nvPr>
+            <p:ph type="title"/>
+          </p:nvPr>
+        </p:nvSpPr>
+        <p:spPr>
+          <a:xfrm>
+            <a:off x="311700" y="445025"/>
+            <a:ext cx="8520600" cy="572700"/>
+          </a:xfrm>
+          <a:prstGeom prst="rect">
+            <a:avLst/>
+          </a:prstGeom>
+        </p:spPr>
+        <p:txBody>
+          <a:bodyPr spcFirstLastPara="1" wrap="square" lIns="91425" tIns="91425" rIns="91425" bIns="91425" anchor="t" anchorCtr="0">
+            <a:noAutofit/>
+          </a:bodyPr>
+          <a:lstStyle/>
+          <a:p>
+            <a:r>
+              <a:rPr lang="en" sz="2400" dirty="0"/>
+              <a:t>Component 2 – Pickup information (Trello screenshot)</a:t>
+            </a:r>
+            <a:endParaRPr sz="2400" dirty="0"/>
+          </a:p>
+        </p:txBody>
+      </p:sp>
+      <p:sp>
+        <p:nvSpPr>
+          <p:cNvPr id="5" name="Google Shape;73;p16">
+            <a:extLst>
+              <a:ext uri="{FF2B5EF4-FFF2-40B4-BE49-F238E27FC236}">
+                <a16:creationId xmlns:a16="http://schemas.microsoft.com/office/drawing/2014/main" id="{F4590D88-8B1B-4158-D9CE-82EB2D2CF941}"/>
+              </a:ext>
+            </a:extLst>
+          </p:cNvPr>
+          <p:cNvSpPr txBox="1">
+            <a:spLocks/>
+          </p:cNvSpPr>
+          <p:nvPr/>
+        </p:nvSpPr>
+        <p:spPr>
+          <a:xfrm>
+            <a:off x="176" y="1639572"/>
+            <a:ext cx="4479760" cy="592870"/>
+          </a:xfrm>
+          <a:prstGeom prst="rect">
+            <a:avLst/>
+          </a:prstGeom>
+          <a:noFill/>
+          <a:ln>
+            <a:noFill/>
+          </a:ln>
+        </p:spPr>
+        <p:txBody>
+          <a:bodyPr spcFirstLastPara="1" wrap="square" lIns="91425" tIns="91425" rIns="91425" bIns="91425" anchor="t" anchorCtr="0">
+            <a:noAutofit/>
+          </a:bodyPr>
+          <a:lstStyle>
+            <a:defPPr marR="0" lvl="0" algn="l" rtl="0">
+              <a:lnSpc>
+                <a:spcPct val="100000"/>
+              </a:lnSpc>
+              <a:spcBef>
+                <a:spcPts val="0"/>
+              </a:spcBef>
+              <a:spcAft>
+                <a:spcPts val="0"/>
+              </a:spcAft>
+            </a:defPPr>
+            <a:lvl1pPr marR="0" lvl="0" algn="l" rtl="0">
+              <a:lnSpc>
+                <a:spcPct val="100000"/>
+              </a:lnSpc>
+              <a:spcBef>
+                <a:spcPts val="0"/>
+              </a:spcBef>
+              <a:spcAft>
+                <a:spcPts val="0"/>
+              </a:spcAft>
+              <a:buClr>
+                <a:schemeClr val="dk1"/>
+              </a:buClr>
+              <a:buSzPts val="2800"/>
+              <a:buFont typeface="Arial"/>
+              <a:buNone/>
+              <a:defRPr sz="2800" b="0" i="0" u="none" strike="noStrike" cap="none">
+                <a:solidFill>
+                  <a:schemeClr val="dk1"/>
+                </a:solidFill>
+                <a:latin typeface="Arial"/>
+                <a:ea typeface="Arial"/>
+                <a:cs typeface="Arial"/>
+                <a:sym typeface="Arial"/>
+              </a:defRPr>
+            </a:lvl1pPr>
+            <a:lvl2pPr marR="0" lvl="1" algn="l" rtl="0">
+              <a:lnSpc>
+                <a:spcPct val="100000"/>
+              </a:lnSpc>
+              <a:spcBef>
+                <a:spcPts val="0"/>
+              </a:spcBef>
+              <a:spcAft>
+                <a:spcPts val="0"/>
+              </a:spcAft>
+              <a:buClr>
+                <a:schemeClr val="dk1"/>
+              </a:buClr>
+              <a:buSzPts val="2800"/>
+              <a:buFont typeface="Arial"/>
+              <a:buNone/>
+              <a:defRPr sz="2800" b="0" i="0" u="none" strike="noStrike" cap="none">
+                <a:solidFill>
+                  <a:schemeClr val="dk1"/>
+                </a:solidFill>
+                <a:latin typeface="Arial"/>
+                <a:ea typeface="Arial"/>
+                <a:cs typeface="Arial"/>
+                <a:sym typeface="Arial"/>
+              </a:defRPr>
+            </a:lvl2pPr>
+            <a:lvl3pPr marR="0" lvl="2" algn="l" rtl="0">
+              <a:lnSpc>
+                <a:spcPct val="100000"/>
+              </a:lnSpc>
+              <a:spcBef>
+                <a:spcPts val="0"/>
+              </a:spcBef>
+              <a:spcAft>
+                <a:spcPts val="0"/>
+              </a:spcAft>
+              <a:buClr>
+                <a:schemeClr val="dk1"/>
+              </a:buClr>
+              <a:buSzPts val="2800"/>
+              <a:buFont typeface="Arial"/>
+              <a:buNone/>
+              <a:defRPr sz="2800" b="0" i="0" u="none" strike="noStrike" cap="none">
+                <a:solidFill>
+                  <a:schemeClr val="dk1"/>
+                </a:solidFill>
+                <a:latin typeface="Arial"/>
+                <a:ea typeface="Arial"/>
+                <a:cs typeface="Arial"/>
+                <a:sym typeface="Arial"/>
+              </a:defRPr>
+            </a:lvl3pPr>
+            <a:lvl4pPr marR="0" lvl="3" algn="l" rtl="0">
+              <a:lnSpc>
+                <a:spcPct val="100000"/>
+              </a:lnSpc>
+              <a:spcBef>
+                <a:spcPts val="0"/>
+              </a:spcBef>
+              <a:spcAft>
+                <a:spcPts val="0"/>
+              </a:spcAft>
+              <a:buClr>
+                <a:schemeClr val="dk1"/>
+              </a:buClr>
+              <a:buSzPts val="2800"/>
+              <a:buFont typeface="Arial"/>
+              <a:buNone/>
+              <a:defRPr sz="2800" b="0" i="0" u="none" strike="noStrike" cap="none">
+                <a:solidFill>
+                  <a:schemeClr val="dk1"/>
+                </a:solidFill>
+                <a:latin typeface="Arial"/>
+                <a:ea typeface="Arial"/>
+                <a:cs typeface="Arial"/>
+                <a:sym typeface="Arial"/>
+              </a:defRPr>
+            </a:lvl4pPr>
+            <a:lvl5pPr marR="0" lvl="4" algn="l" rtl="0">
+              <a:lnSpc>
+                <a:spcPct val="100000"/>
+              </a:lnSpc>
+              <a:spcBef>
+                <a:spcPts val="0"/>
+              </a:spcBef>
+              <a:spcAft>
+                <a:spcPts val="0"/>
+              </a:spcAft>
+              <a:buClr>
+                <a:schemeClr val="dk1"/>
+              </a:buClr>
+              <a:buSzPts val="2800"/>
+              <a:buFont typeface="Arial"/>
+              <a:buNone/>
+              <a:defRPr sz="2800" b="0" i="0" u="none" strike="noStrike" cap="none">
+                <a:solidFill>
+                  <a:schemeClr val="dk1"/>
+                </a:solidFill>
+                <a:latin typeface="Arial"/>
+                <a:ea typeface="Arial"/>
+                <a:cs typeface="Arial"/>
+                <a:sym typeface="Arial"/>
+              </a:defRPr>
+            </a:lvl5pPr>
+            <a:lvl6pPr marR="0" lvl="5" algn="l" rtl="0">
+              <a:lnSpc>
+                <a:spcPct val="100000"/>
+              </a:lnSpc>
+              <a:spcBef>
+                <a:spcPts val="0"/>
+              </a:spcBef>
+              <a:spcAft>
+                <a:spcPts val="0"/>
+              </a:spcAft>
+              <a:buClr>
+                <a:schemeClr val="dk1"/>
+              </a:buClr>
+              <a:buSzPts val="2800"/>
+              <a:buFont typeface="Arial"/>
+              <a:buNone/>
+              <a:defRPr sz="2800" b="0" i="0" u="none" strike="noStrike" cap="none">
+                <a:solidFill>
+                  <a:schemeClr val="dk1"/>
+                </a:solidFill>
+                <a:latin typeface="Arial"/>
+                <a:ea typeface="Arial"/>
+                <a:cs typeface="Arial"/>
+                <a:sym typeface="Arial"/>
+              </a:defRPr>
+            </a:lvl6pPr>
+            <a:lvl7pPr marR="0" lvl="6" algn="l" rtl="0">
+              <a:lnSpc>
+                <a:spcPct val="100000"/>
+              </a:lnSpc>
+              <a:spcBef>
+                <a:spcPts val="0"/>
+              </a:spcBef>
+              <a:spcAft>
+                <a:spcPts val="0"/>
+              </a:spcAft>
+              <a:buClr>
+                <a:schemeClr val="dk1"/>
+              </a:buClr>
+              <a:buSzPts val="2800"/>
+              <a:buFont typeface="Arial"/>
+              <a:buNone/>
+              <a:defRPr sz="2800" b="0" i="0" u="none" strike="noStrike" cap="none">
+                <a:solidFill>
+                  <a:schemeClr val="dk1"/>
+                </a:solidFill>
+                <a:latin typeface="Arial"/>
+                <a:ea typeface="Arial"/>
+                <a:cs typeface="Arial"/>
+                <a:sym typeface="Arial"/>
+              </a:defRPr>
+            </a:lvl7pPr>
+            <a:lvl8pPr marR="0" lvl="7" algn="l" rtl="0">
+              <a:lnSpc>
+                <a:spcPct val="100000"/>
+              </a:lnSpc>
+              <a:spcBef>
+                <a:spcPts val="0"/>
+              </a:spcBef>
+              <a:spcAft>
+                <a:spcPts val="0"/>
+              </a:spcAft>
+              <a:buClr>
+                <a:schemeClr val="dk1"/>
+              </a:buClr>
+              <a:buSzPts val="2800"/>
+              <a:buFont typeface="Arial"/>
+              <a:buNone/>
+              <a:defRPr sz="2800" b="0" i="0" u="none" strike="noStrike" cap="none">
+                <a:solidFill>
+                  <a:schemeClr val="dk1"/>
+                </a:solidFill>
+                <a:latin typeface="Arial"/>
+                <a:ea typeface="Arial"/>
+                <a:cs typeface="Arial"/>
+                <a:sym typeface="Arial"/>
+              </a:defRPr>
+            </a:lvl8pPr>
+            <a:lvl9pPr marR="0" lvl="8" algn="l" rtl="0">
+              <a:lnSpc>
+                <a:spcPct val="100000"/>
+              </a:lnSpc>
+              <a:spcBef>
+                <a:spcPts val="0"/>
+              </a:spcBef>
+              <a:spcAft>
+                <a:spcPts val="0"/>
+              </a:spcAft>
+              <a:buClr>
+                <a:schemeClr val="dk1"/>
+              </a:buClr>
+              <a:buSzPts val="2800"/>
+              <a:buFont typeface="Arial"/>
+              <a:buNone/>
+              <a:defRPr sz="2800" b="0" i="0" u="none" strike="noStrike" cap="none">
+                <a:solidFill>
+                  <a:schemeClr val="dk1"/>
+                </a:solidFill>
+                <a:latin typeface="Arial"/>
+                <a:ea typeface="Arial"/>
+                <a:cs typeface="Arial"/>
+                <a:sym typeface="Arial"/>
+              </a:defRPr>
+            </a:lvl9pPr>
+          </a:lstStyle>
+          <a:p>
+            <a:pPr algn="ctr"/>
+            <a:r>
+              <a:rPr lang="en-US" dirty="0"/>
+              <a:t>Version 1</a:t>
+            </a:r>
+          </a:p>
+        </p:txBody>
+      </p:sp>
+      <p:sp>
+        <p:nvSpPr>
+          <p:cNvPr id="6" name="Google Shape;73;p16">
+            <a:extLst>
+              <a:ext uri="{FF2B5EF4-FFF2-40B4-BE49-F238E27FC236}">
+                <a16:creationId xmlns:a16="http://schemas.microsoft.com/office/drawing/2014/main" id="{B81B67BB-87B6-A245-D23C-2B334DEC1CF7}"/>
+              </a:ext>
+            </a:extLst>
+          </p:cNvPr>
+          <p:cNvSpPr txBox="1">
+            <a:spLocks/>
+          </p:cNvSpPr>
+          <p:nvPr/>
+        </p:nvSpPr>
+        <p:spPr>
+          <a:xfrm>
+            <a:off x="5163846" y="1639572"/>
+            <a:ext cx="3982219" cy="592870"/>
+          </a:xfrm>
+          <a:prstGeom prst="rect">
+            <a:avLst/>
+          </a:prstGeom>
+          <a:noFill/>
+          <a:ln>
+            <a:noFill/>
+          </a:ln>
+        </p:spPr>
+        <p:txBody>
+          <a:bodyPr spcFirstLastPara="1" wrap="square" lIns="91425" tIns="91425" rIns="91425" bIns="91425" anchor="t" anchorCtr="0">
+            <a:noAutofit/>
+          </a:bodyPr>
+          <a:lstStyle>
+            <a:defPPr marR="0" lvl="0" algn="l" rtl="0">
+              <a:lnSpc>
+                <a:spcPct val="100000"/>
+              </a:lnSpc>
+              <a:spcBef>
+                <a:spcPts val="0"/>
+              </a:spcBef>
+              <a:spcAft>
+                <a:spcPts val="0"/>
+              </a:spcAft>
+            </a:defPPr>
+            <a:lvl1pPr marR="0" lvl="0" algn="l" rtl="0">
+              <a:lnSpc>
+                <a:spcPct val="100000"/>
+              </a:lnSpc>
+              <a:spcBef>
+                <a:spcPts val="0"/>
+              </a:spcBef>
+              <a:spcAft>
+                <a:spcPts val="0"/>
+              </a:spcAft>
+              <a:buClr>
+                <a:schemeClr val="dk1"/>
+              </a:buClr>
+              <a:buSzPts val="2800"/>
+              <a:buFont typeface="Arial"/>
+              <a:buNone/>
+              <a:defRPr sz="2800" b="0" i="0" u="none" strike="noStrike" cap="none">
+                <a:solidFill>
+                  <a:schemeClr val="dk1"/>
+                </a:solidFill>
+                <a:latin typeface="Arial"/>
+                <a:ea typeface="Arial"/>
+                <a:cs typeface="Arial"/>
+                <a:sym typeface="Arial"/>
+              </a:defRPr>
+            </a:lvl1pPr>
+            <a:lvl2pPr marR="0" lvl="1" algn="l" rtl="0">
+              <a:lnSpc>
+                <a:spcPct val="100000"/>
+              </a:lnSpc>
+              <a:spcBef>
+                <a:spcPts val="0"/>
+              </a:spcBef>
+              <a:spcAft>
+                <a:spcPts val="0"/>
+              </a:spcAft>
+              <a:buClr>
+                <a:schemeClr val="dk1"/>
+              </a:buClr>
+              <a:buSzPts val="2800"/>
+              <a:buFont typeface="Arial"/>
+              <a:buNone/>
+              <a:defRPr sz="2800" b="0" i="0" u="none" strike="noStrike" cap="none">
+                <a:solidFill>
+                  <a:schemeClr val="dk1"/>
+                </a:solidFill>
+                <a:latin typeface="Arial"/>
+                <a:ea typeface="Arial"/>
+                <a:cs typeface="Arial"/>
+                <a:sym typeface="Arial"/>
+              </a:defRPr>
+            </a:lvl2pPr>
+            <a:lvl3pPr marR="0" lvl="2" algn="l" rtl="0">
+              <a:lnSpc>
+                <a:spcPct val="100000"/>
+              </a:lnSpc>
+              <a:spcBef>
+                <a:spcPts val="0"/>
+              </a:spcBef>
+              <a:spcAft>
+                <a:spcPts val="0"/>
+              </a:spcAft>
+              <a:buClr>
+                <a:schemeClr val="dk1"/>
+              </a:buClr>
+              <a:buSzPts val="2800"/>
+              <a:buFont typeface="Arial"/>
+              <a:buNone/>
+              <a:defRPr sz="2800" b="0" i="0" u="none" strike="noStrike" cap="none">
+                <a:solidFill>
+                  <a:schemeClr val="dk1"/>
+                </a:solidFill>
+                <a:latin typeface="Arial"/>
+                <a:ea typeface="Arial"/>
+                <a:cs typeface="Arial"/>
+                <a:sym typeface="Arial"/>
+              </a:defRPr>
+            </a:lvl3pPr>
+            <a:lvl4pPr marR="0" lvl="3" algn="l" rtl="0">
+              <a:lnSpc>
+                <a:spcPct val="100000"/>
+              </a:lnSpc>
+              <a:spcBef>
+                <a:spcPts val="0"/>
+              </a:spcBef>
+              <a:spcAft>
+                <a:spcPts val="0"/>
+              </a:spcAft>
+              <a:buClr>
+                <a:schemeClr val="dk1"/>
+              </a:buClr>
+              <a:buSzPts val="2800"/>
+              <a:buFont typeface="Arial"/>
+              <a:buNone/>
+              <a:defRPr sz="2800" b="0" i="0" u="none" strike="noStrike" cap="none">
+                <a:solidFill>
+                  <a:schemeClr val="dk1"/>
+                </a:solidFill>
+                <a:latin typeface="Arial"/>
+                <a:ea typeface="Arial"/>
+                <a:cs typeface="Arial"/>
+                <a:sym typeface="Arial"/>
+              </a:defRPr>
+            </a:lvl4pPr>
+            <a:lvl5pPr marR="0" lvl="4" algn="l" rtl="0">
+              <a:lnSpc>
+                <a:spcPct val="100000"/>
+              </a:lnSpc>
+              <a:spcBef>
+                <a:spcPts val="0"/>
+              </a:spcBef>
+              <a:spcAft>
+                <a:spcPts val="0"/>
+              </a:spcAft>
+              <a:buClr>
+                <a:schemeClr val="dk1"/>
+              </a:buClr>
+              <a:buSzPts val="2800"/>
+              <a:buFont typeface="Arial"/>
+              <a:buNone/>
+              <a:defRPr sz="2800" b="0" i="0" u="none" strike="noStrike" cap="none">
+                <a:solidFill>
+                  <a:schemeClr val="dk1"/>
+                </a:solidFill>
+                <a:latin typeface="Arial"/>
+                <a:ea typeface="Arial"/>
+                <a:cs typeface="Arial"/>
+                <a:sym typeface="Arial"/>
+              </a:defRPr>
+            </a:lvl5pPr>
+            <a:lvl6pPr marR="0" lvl="5" algn="l" rtl="0">
+              <a:lnSpc>
+                <a:spcPct val="100000"/>
+              </a:lnSpc>
+              <a:spcBef>
+                <a:spcPts val="0"/>
+              </a:spcBef>
+              <a:spcAft>
+                <a:spcPts val="0"/>
+              </a:spcAft>
+              <a:buClr>
+                <a:schemeClr val="dk1"/>
+              </a:buClr>
+              <a:buSzPts val="2800"/>
+              <a:buFont typeface="Arial"/>
+              <a:buNone/>
+              <a:defRPr sz="2800" b="0" i="0" u="none" strike="noStrike" cap="none">
+                <a:solidFill>
+                  <a:schemeClr val="dk1"/>
+                </a:solidFill>
+                <a:latin typeface="Arial"/>
+                <a:ea typeface="Arial"/>
+                <a:cs typeface="Arial"/>
+                <a:sym typeface="Arial"/>
+              </a:defRPr>
+            </a:lvl6pPr>
+            <a:lvl7pPr marR="0" lvl="6" algn="l" rtl="0">
+              <a:lnSpc>
+                <a:spcPct val="100000"/>
+              </a:lnSpc>
+              <a:spcBef>
+                <a:spcPts val="0"/>
+              </a:spcBef>
+              <a:spcAft>
+                <a:spcPts val="0"/>
+              </a:spcAft>
+              <a:buClr>
+                <a:schemeClr val="dk1"/>
+              </a:buClr>
+              <a:buSzPts val="2800"/>
+              <a:buFont typeface="Arial"/>
+              <a:buNone/>
+              <a:defRPr sz="2800" b="0" i="0" u="none" strike="noStrike" cap="none">
+                <a:solidFill>
+                  <a:schemeClr val="dk1"/>
+                </a:solidFill>
+                <a:latin typeface="Arial"/>
+                <a:ea typeface="Arial"/>
+                <a:cs typeface="Arial"/>
+                <a:sym typeface="Arial"/>
+              </a:defRPr>
+            </a:lvl7pPr>
+            <a:lvl8pPr marR="0" lvl="7" algn="l" rtl="0">
+              <a:lnSpc>
+                <a:spcPct val="100000"/>
+              </a:lnSpc>
+              <a:spcBef>
+                <a:spcPts val="0"/>
+              </a:spcBef>
+              <a:spcAft>
+                <a:spcPts val="0"/>
+              </a:spcAft>
+              <a:buClr>
+                <a:schemeClr val="dk1"/>
+              </a:buClr>
+              <a:buSzPts val="2800"/>
+              <a:buFont typeface="Arial"/>
+              <a:buNone/>
+              <a:defRPr sz="2800" b="0" i="0" u="none" strike="noStrike" cap="none">
+                <a:solidFill>
+                  <a:schemeClr val="dk1"/>
+                </a:solidFill>
+                <a:latin typeface="Arial"/>
+                <a:ea typeface="Arial"/>
+                <a:cs typeface="Arial"/>
+                <a:sym typeface="Arial"/>
+              </a:defRPr>
+            </a:lvl8pPr>
+            <a:lvl9pPr marR="0" lvl="8" algn="l" rtl="0">
+              <a:lnSpc>
+                <a:spcPct val="100000"/>
+              </a:lnSpc>
+              <a:spcBef>
+                <a:spcPts val="0"/>
+              </a:spcBef>
+              <a:spcAft>
+                <a:spcPts val="0"/>
+              </a:spcAft>
+              <a:buClr>
+                <a:schemeClr val="dk1"/>
+              </a:buClr>
+              <a:buSzPts val="2800"/>
+              <a:buFont typeface="Arial"/>
+              <a:buNone/>
+              <a:defRPr sz="2800" b="0" i="0" u="none" strike="noStrike" cap="none">
+                <a:solidFill>
+                  <a:schemeClr val="dk1"/>
+                </a:solidFill>
+                <a:latin typeface="Arial"/>
+                <a:ea typeface="Arial"/>
+                <a:cs typeface="Arial"/>
+                <a:sym typeface="Arial"/>
+              </a:defRPr>
+            </a:lvl9pPr>
+          </a:lstStyle>
+          <a:p>
+            <a:pPr algn="ctr"/>
+            <a:r>
+              <a:rPr lang="en-US" dirty="0"/>
+              <a:t>Version 2</a:t>
+            </a:r>
+          </a:p>
+        </p:txBody>
+      </p:sp>
+      <p:pic>
+        <p:nvPicPr>
+          <p:cNvPr id="3" name="Picture 6" descr="Graphical user interface, application&#10;&#10;Description automatically generated">
+            <a:extLst>
+              <a:ext uri="{FF2B5EF4-FFF2-40B4-BE49-F238E27FC236}">
+                <a16:creationId xmlns:a16="http://schemas.microsoft.com/office/drawing/2014/main" id="{24DAB135-3F72-9674-99CD-F676B0BDD14B}"/>
+              </a:ext>
+            </a:extLst>
+          </p:cNvPr>
+          <p:cNvPicPr>
+            <a:picLocks noChangeAspect="1"/>
+          </p:cNvPicPr>
+          <p:nvPr/>
+        </p:nvPicPr>
+        <p:blipFill>
+          <a:blip r:embed="rId3"/>
+          <a:stretch>
+            <a:fillRect/>
+          </a:stretch>
+        </p:blipFill>
+        <p:spPr>
+          <a:xfrm>
+            <a:off x="0" y="2229133"/>
+            <a:ext cx="4572000" cy="2204751"/>
+          </a:xfrm>
+          <a:prstGeom prst="rect">
+            <a:avLst/>
+          </a:prstGeom>
+        </p:spPr>
+      </p:pic>
+    </p:spTree>
+    <p:extLst>
+      <p:ext uri="{BB962C8B-B14F-4D97-AF65-F5344CB8AC3E}">
+        <p14:creationId xmlns:p14="http://schemas.microsoft.com/office/powerpoint/2010/main" val="3441760066"/>
+      </p:ext>
+    </p:extLst>
+  </p:cSld>
+  <p:clrMapOvr>
+    <a:masterClrMapping/>
+  </p:clrMapOvr>
+</p:sld>
+</file>
+
+<file path=ppt/slides/slide14.xml><?xml version="1.0" encoding="utf-8"?>
+<p:sld xmlns:a="http://schemas.openxmlformats.org/drawingml/2006/main" xmlns:r="http://schemas.openxmlformats.org/officeDocument/2006/relationships" xmlns:p="http://schemas.openxmlformats.org/presentationml/2006/main">
+  <p:cSld>
+    <p:spTree>
+      <p:nvGrpSpPr>
+        <p:cNvPr id="1" name="Shape 77"/>
+        <p:cNvGrpSpPr/>
+        <p:nvPr/>
+      </p:nvGrpSpPr>
+      <p:grpSpPr>
+        <a:xfrm>
+          <a:off x="0" y="0"/>
+          <a:ext cx="0" cy="0"/>
+          <a:chOff x="0" y="0"/>
+          <a:chExt cx="0" cy="0"/>
+        </a:xfrm>
+      </p:grpSpPr>
+      <p:sp>
+        <p:nvSpPr>
+          <p:cNvPr id="78" name="Google Shape;78;p17"/>
+          <p:cNvSpPr txBox="1">
+            <a:spLocks noGrp="1"/>
+          </p:cNvSpPr>
+          <p:nvPr>
+            <p:ph type="title"/>
+          </p:nvPr>
+        </p:nvSpPr>
+        <p:spPr>
+          <a:xfrm>
+            <a:off x="311700" y="445025"/>
+            <a:ext cx="8520600" cy="572700"/>
+          </a:xfrm>
+          <a:prstGeom prst="rect">
+            <a:avLst/>
+          </a:prstGeom>
+        </p:spPr>
+        <p:txBody>
+          <a:bodyPr spcFirstLastPara="1" wrap="square" lIns="91425" tIns="91425" rIns="91425" bIns="91425" anchor="t" anchorCtr="0">
+            <a:noAutofit/>
+          </a:bodyPr>
+          <a:lstStyle/>
+          <a:p>
+            <a:r>
+              <a:rPr lang="en" sz="2400" dirty="0"/>
+              <a:t>Component 3 Version 1 - Test Plan (?and screenshot)</a:t>
+            </a:r>
+            <a:endParaRPr sz="2400" dirty="0"/>
+          </a:p>
+        </p:txBody>
+      </p:sp>
+      <p:graphicFrame>
+        <p:nvGraphicFramePr>
+          <p:cNvPr id="79" name="Google Shape;79;p17"/>
+          <p:cNvGraphicFramePr/>
+          <p:nvPr>
+            <p:extLst>
+              <p:ext uri="{D42A27DB-BD31-4B8C-83A1-F6EECF244321}">
+                <p14:modId xmlns:p14="http://schemas.microsoft.com/office/powerpoint/2010/main" val="1265041736"/>
+              </p:ext>
+            </p:extLst>
+          </p:nvPr>
+        </p:nvGraphicFramePr>
+        <p:xfrm>
+          <a:off x="382475" y="1267725"/>
+          <a:ext cx="8520600" cy="1112490"/>
+        </p:xfrm>
+        <a:graphic>
+          <a:graphicData uri="http://schemas.openxmlformats.org/drawingml/2006/table">
+            <a:tbl>
+              <a:tblPr>
+                <a:noFill/>
+                <a:tableStyleId>{E1099E06-0E6B-448D-9D27-60429F06E6F4}</a:tableStyleId>
+              </a:tblPr>
+              <a:tblGrid>
+                <a:gridCol w="4260300">
+                  <a:extLst>
+                    <a:ext uri="{9D8B030D-6E8A-4147-A177-3AD203B41FA5}">
+                      <a16:colId xmlns:a16="http://schemas.microsoft.com/office/drawing/2014/main" val="20000"/>
+                    </a:ext>
+                  </a:extLst>
+                </a:gridCol>
+                <a:gridCol w="4260300">
+                  <a:extLst>
+                    <a:ext uri="{9D8B030D-6E8A-4147-A177-3AD203B41FA5}">
+                      <a16:colId xmlns:a16="http://schemas.microsoft.com/office/drawing/2014/main" val="20001"/>
+                    </a:ext>
+                  </a:extLst>
+                </a:gridCol>
+              </a:tblGrid>
+              <a:tr h="381000">
+                <a:tc>
+                  <a:txBody>
+                    <a:bodyPr/>
+                    <a:lstStyle/>
+                    <a:p>
+                      <a:pPr marL="0" lvl="0" indent="0" algn="l" rtl="0">
+                        <a:spcBef>
+                          <a:spcPts val="0"/>
+                        </a:spcBef>
+                        <a:spcAft>
+                          <a:spcPts val="0"/>
+                        </a:spcAft>
+                        <a:buNone/>
+                      </a:pPr>
+                      <a:r>
+                        <a:rPr lang="en" sz="1200" b="1" dirty="0"/>
+                        <a:t>Test Case</a:t>
+                      </a:r>
+                      <a:endParaRPr sz="1200" b="1"/>
+                    </a:p>
+                  </a:txBody>
+                  <a:tcPr marL="91425" marR="91425" marT="91425" marB="91425">
+                    <a:solidFill>
+                      <a:srgbClr val="CCCCCC"/>
+                    </a:solidFill>
+                  </a:tcPr>
+                </a:tc>
+                <a:tc>
+                  <a:txBody>
+                    <a:bodyPr/>
+                    <a:lstStyle/>
+                    <a:p>
+                      <a:pPr marL="0" lvl="0" indent="0" algn="l" rtl="0">
+                        <a:spcBef>
+                          <a:spcPts val="0"/>
+                        </a:spcBef>
+                        <a:spcAft>
+                          <a:spcPts val="0"/>
+                        </a:spcAft>
+                        <a:buNone/>
+                      </a:pPr>
+                      <a:r>
+                        <a:rPr lang="en" sz="1200" b="1" dirty="0"/>
+                        <a:t>Expected Values</a:t>
+                      </a:r>
+                      <a:endParaRPr sz="1200" b="1"/>
+                    </a:p>
+                  </a:txBody>
+                  <a:tcPr marL="91425" marR="91425" marT="91425" marB="91425">
+                    <a:solidFill>
+                      <a:srgbClr val="CCCCCC"/>
+                    </a:solidFill>
+                  </a:tcPr>
+                </a:tc>
+                <a:extLst>
+                  <a:ext uri="{0D108BD9-81ED-4DB2-BD59-A6C34878D82A}">
+                    <a16:rowId xmlns:a16="http://schemas.microsoft.com/office/drawing/2014/main" val="10000"/>
+                  </a:ext>
+                </a:extLst>
+              </a:tr>
+              <a:tr h="396200">
+                <a:tc>
+                  <a:txBody>
+                    <a:bodyPr/>
+                    <a:lstStyle/>
+                    <a:p>
+                      <a:pPr marL="0" lvl="0" indent="0" algn="l" rtl="0">
+                        <a:spcBef>
+                          <a:spcPts val="0"/>
+                        </a:spcBef>
+                        <a:spcAft>
+                          <a:spcPts val="0"/>
+                        </a:spcAft>
+                        <a:buNone/>
+                      </a:pPr>
+                      <a:r>
+                        <a:rPr lang="en-NZ" sz="1200" dirty="0"/>
+                        <a:t>Input name</a:t>
+                      </a:r>
+                    </a:p>
+                    <a:p>
+                      <a:pPr marL="0" lvl="0" indent="0" algn="l">
+                        <a:spcBef>
+                          <a:spcPts val="0"/>
+                        </a:spcBef>
+                        <a:spcAft>
+                          <a:spcPts val="0"/>
+                        </a:spcAft>
+                        <a:buNone/>
+                      </a:pPr>
+                      <a:r>
+                        <a:rPr lang="en-NZ" sz="1200" dirty="0"/>
+                        <a:t>Input phone number</a:t>
+                      </a:r>
+                    </a:p>
+                    <a:p>
+                      <a:pPr marL="0" lvl="0" indent="0" algn="l">
+                        <a:spcBef>
+                          <a:spcPts val="0"/>
+                        </a:spcBef>
+                        <a:spcAft>
+                          <a:spcPts val="0"/>
+                        </a:spcAft>
+                        <a:buNone/>
+                      </a:pPr>
+                      <a:r>
+                        <a:rPr lang="en-NZ" sz="1200"/>
+                        <a:t>Left input blank</a:t>
+                      </a:r>
+                      <a:endParaRPr lang="en-NZ" sz="1200" dirty="0"/>
+                    </a:p>
+                  </a:txBody>
+                  <a:tcPr marL="91425" marR="91425" marT="91425" marB="91425"/>
+                </a:tc>
+                <a:tc>
+                  <a:txBody>
+                    <a:bodyPr/>
+                    <a:lstStyle/>
+                    <a:p>
+                      <a:pPr marL="0" lvl="0" indent="0" algn="l" rtl="0">
+                        <a:spcBef>
+                          <a:spcPts val="0"/>
+                        </a:spcBef>
+                        <a:spcAft>
+                          <a:spcPts val="0"/>
+                        </a:spcAft>
+                        <a:buNone/>
+                      </a:pPr>
+                      <a:r>
+                        <a:rPr lang="en-NZ" sz="1200"/>
+                        <a:t>Printed name correctly.</a:t>
+                      </a:r>
+                      <a:endParaRPr lang="en-NZ" sz="1200" dirty="0"/>
+                    </a:p>
+                    <a:p>
+                      <a:pPr marL="0" lvl="0" indent="0" algn="l">
+                        <a:spcBef>
+                          <a:spcPts val="0"/>
+                        </a:spcBef>
+                        <a:spcAft>
+                          <a:spcPts val="0"/>
+                        </a:spcAft>
+                        <a:buNone/>
+                      </a:pPr>
+                      <a:r>
+                        <a:rPr lang="en-NZ" sz="1200"/>
+                        <a:t>Printed phone number correctly.</a:t>
+                      </a:r>
+                    </a:p>
+                    <a:p>
+                      <a:pPr marL="0" lvl="0" indent="0" algn="l">
+                        <a:spcBef>
+                          <a:spcPts val="0"/>
+                        </a:spcBef>
+                        <a:spcAft>
+                          <a:spcPts val="0"/>
+                        </a:spcAft>
+                        <a:buNone/>
+                      </a:pPr>
+                      <a:r>
+                        <a:rPr lang="en-NZ" sz="1200"/>
+                        <a:t>Accepted blank and printed blank input.</a:t>
+                      </a:r>
+                      <a:endParaRPr lang="en-NZ" sz="1200" dirty="0"/>
+                    </a:p>
+                  </a:txBody>
+                  <a:tcPr marL="91425" marR="91425" marT="91425" marB="91425"/>
+                </a:tc>
+                <a:extLst>
+                  <a:ext uri="{0D108BD9-81ED-4DB2-BD59-A6C34878D82A}">
+                    <a16:rowId xmlns:a16="http://schemas.microsoft.com/office/drawing/2014/main" val="10001"/>
+                  </a:ext>
+                </a:extLst>
+              </a:tr>
+            </a:tbl>
+          </a:graphicData>
+        </a:graphic>
+      </p:graphicFrame>
+      <p:pic>
+        <p:nvPicPr>
+          <p:cNvPr id="5" name="Picture 5" descr="Text&#10;&#10;Description automatically generated">
+            <a:extLst>
+              <a:ext uri="{FF2B5EF4-FFF2-40B4-BE49-F238E27FC236}">
+                <a16:creationId xmlns:a16="http://schemas.microsoft.com/office/drawing/2014/main" id="{31B1977E-CF62-C9F3-5A51-9E6AE56C4606}"/>
+              </a:ext>
+            </a:extLst>
+          </p:cNvPr>
+          <p:cNvPicPr>
+            <a:picLocks noChangeAspect="1"/>
+          </p:cNvPicPr>
+          <p:nvPr/>
+        </p:nvPicPr>
+        <p:blipFill>
+          <a:blip r:embed="rId3"/>
+          <a:stretch>
+            <a:fillRect/>
+          </a:stretch>
+        </p:blipFill>
+        <p:spPr>
+          <a:xfrm>
+            <a:off x="437030" y="3081314"/>
+            <a:ext cx="3980329" cy="1703901"/>
+          </a:xfrm>
+          <a:prstGeom prst="rect">
+            <a:avLst/>
+          </a:prstGeom>
+        </p:spPr>
+      </p:pic>
+      <p:pic>
+        <p:nvPicPr>
+          <p:cNvPr id="6" name="Picture 6" descr="Text&#10;&#10;Description automatically generated">
+            <a:extLst>
+              <a:ext uri="{FF2B5EF4-FFF2-40B4-BE49-F238E27FC236}">
+                <a16:creationId xmlns:a16="http://schemas.microsoft.com/office/drawing/2014/main" id="{8EF0A9CA-E720-1ADF-C6CA-98696ABA003E}"/>
+              </a:ext>
+            </a:extLst>
+          </p:cNvPr>
+          <p:cNvPicPr>
+            <a:picLocks noChangeAspect="1"/>
+          </p:cNvPicPr>
+          <p:nvPr/>
+        </p:nvPicPr>
+        <p:blipFill>
+          <a:blip r:embed="rId4"/>
+          <a:stretch>
+            <a:fillRect/>
+          </a:stretch>
+        </p:blipFill>
+        <p:spPr>
+          <a:xfrm>
+            <a:off x="4645959" y="3078265"/>
+            <a:ext cx="4282888" cy="1461228"/>
+          </a:xfrm>
+          <a:prstGeom prst="rect">
+            <a:avLst/>
+          </a:prstGeom>
+        </p:spPr>
+      </p:pic>
+    </p:spTree>
+    <p:extLst>
+      <p:ext uri="{BB962C8B-B14F-4D97-AF65-F5344CB8AC3E}">
+        <p14:creationId xmlns:p14="http://schemas.microsoft.com/office/powerpoint/2010/main" val="2969888906"/>
+      </p:ext>
+    </p:extLst>
+  </p:cSld>
+  <p:clrMapOvr>
+    <a:masterClrMapping/>
+  </p:clrMapOvr>
+</p:sld>
+</file>
+
+<file path=ppt/slides/slide15.xml><?xml version="1.0" encoding="utf-8"?>
+<p:sld xmlns:a="http://schemas.openxmlformats.org/drawingml/2006/main" xmlns:r="http://schemas.openxmlformats.org/officeDocument/2006/relationships" xmlns:p="http://schemas.openxmlformats.org/presentationml/2006/main">
+  <p:cSld>
+    <p:bg>
+      <p:bgPr>
+        <a:solidFill>
+          <a:srgbClr val="D9EAD3"/>
+        </a:solidFill>
+        <a:effectLst/>
+      </p:bgPr>
+    </p:bg>
+    <p:spTree>
+      <p:nvGrpSpPr>
         <p:cNvPr id="1" name="Shape 83"/>
         <p:cNvGrpSpPr/>
         <p:nvPr/>
@@ -8989,7 +10360,7 @@
 </p:sld>
 </file>
 
-<file path=ppt/slides/slide14.xml><?xml version="1.0" encoding="utf-8"?>
+<file path=ppt/slides/slide16.xml><?xml version="1.0" encoding="utf-8"?>
 <p:sld xmlns:a="http://schemas.openxmlformats.org/drawingml/2006/main" xmlns:r="http://schemas.openxmlformats.org/officeDocument/2006/relationships" xmlns:p="http://schemas.openxmlformats.org/presentationml/2006/main">
   <p:cSld>
     <p:bg>
@@ -11282,6 +12653,36 @@
           <a:xfrm>
             <a:off x="1" y="2229323"/>
             <a:ext cx="4693023" cy="1283248"/>
+          </a:xfrm>
+          <a:prstGeom prst="rect">
+            <a:avLst/>
+          </a:prstGeom>
+        </p:spPr>
+      </p:pic>
+      <p:pic>
+        <p:nvPicPr>
+          <p:cNvPr id="2" name="Picture 2" descr="Graphical user interface, application, website&#10;&#10;Description automatically generated">
+            <a:extLst>
+              <a:ext uri="{FF2B5EF4-FFF2-40B4-BE49-F238E27FC236}">
+                <a16:creationId xmlns:a16="http://schemas.microsoft.com/office/drawing/2014/main" id="{C1F43179-E322-74D2-6E28-75537F2AD1A8}"/>
+              </a:ext>
+            </a:extLst>
+          </p:cNvPr>
+          <p:cNvPicPr>
+            <a:picLocks noChangeAspect="1"/>
+          </p:cNvPicPr>
+          <p:nvPr/>
+        </p:nvPicPr>
+        <p:blipFill>
+          <a:blip r:embed="rId4"/>
+          <a:stretch>
+            <a:fillRect/>
+          </a:stretch>
+        </p:blipFill>
+        <p:spPr>
+          <a:xfrm>
+            <a:off x="4881282" y="2228617"/>
+            <a:ext cx="4262717" cy="1802373"/>
           </a:xfrm>
           <a:prstGeom prst="rect">
             <a:avLst/>

</xml_diff>